<commit_message>
Update of the presentation for lapr5
Presentation of the January, 11 of 2023
</commit_message>
<xml_diff>
--- a/Documentation/presentation_lapr5_11_01_2023.pptx
+++ b/Documentation/presentation_lapr5_11_01_2023.pptx
@@ -5,14 +5,20 @@
     <p:sldMasterId id="2147483901" r:id="rId1"/>
   </p:sldMasterIdLst>
   <p:notesMasterIdLst>
-    <p:notesMasterId r:id="rId7"/>
+    <p:notesMasterId r:id="rId13"/>
   </p:notesMasterIdLst>
   <p:sldIdLst>
     <p:sldId id="256" r:id="rId2"/>
-    <p:sldId id="257" r:id="rId3"/>
+    <p:sldId id="267" r:id="rId3"/>
     <p:sldId id="258" r:id="rId4"/>
     <p:sldId id="259" r:id="rId5"/>
     <p:sldId id="260" r:id="rId6"/>
+    <p:sldId id="261" r:id="rId7"/>
+    <p:sldId id="262" r:id="rId8"/>
+    <p:sldId id="263" r:id="rId9"/>
+    <p:sldId id="264" r:id="rId10"/>
+    <p:sldId id="265" r:id="rId11"/>
+    <p:sldId id="266" r:id="rId12"/>
   </p:sldIdLst>
   <p:sldSz cx="12192000" cy="6858000"/>
   <p:notesSz cx="6858000" cy="9144000"/>
@@ -111,6 +117,11 @@
       </a:defRPr>
     </a:lvl9pPr>
   </p:defaultTextStyle>
+  <p:extLst>
+    <p:ext uri="{EFAFB233-063F-42B5-8137-9DF3F51BA10A}">
+      <p15:sldGuideLst xmlns:p15="http://schemas.microsoft.com/office/powerpoint/2012/main"/>
+    </p:ext>
+  </p:extLst>
 </p:presentation>
 </file>
 
@@ -8866,6 +8877,3686 @@
 </p:sld>
 </file>
 
+<file path=ppt/slides/slide10.xml><?xml version="1.0" encoding="utf-8"?>
+<p:sld xmlns:a="http://schemas.openxmlformats.org/drawingml/2006/main" xmlns:r="http://schemas.openxmlformats.org/officeDocument/2006/relationships" xmlns:p="http://schemas.openxmlformats.org/presentationml/2006/main">
+  <p:cSld>
+    <p:bg>
+      <p:bgPr>
+        <a:gradFill flip="none" rotWithShape="1">
+          <a:gsLst>
+            <a:gs pos="0">
+              <a:schemeClr val="accent2">
+                <a:lumMod val="94000"/>
+              </a:schemeClr>
+            </a:gs>
+            <a:gs pos="46000">
+              <a:schemeClr val="accent2">
+                <a:lumMod val="64000"/>
+              </a:schemeClr>
+            </a:gs>
+            <a:gs pos="100000">
+              <a:schemeClr val="accent2">
+                <a:lumMod val="60000"/>
+              </a:schemeClr>
+            </a:gs>
+          </a:gsLst>
+          <a:path path="circle">
+            <a:fillToRect l="50000" t="130000" r="50000" b="-30000"/>
+          </a:path>
+          <a:tileRect/>
+        </a:gradFill>
+        <a:effectLst/>
+      </p:bgPr>
+    </p:bg>
+    <p:spTree>
+      <p:nvGrpSpPr>
+        <p:cNvPr id="1" name=""/>
+        <p:cNvGrpSpPr/>
+        <p:nvPr/>
+      </p:nvGrpSpPr>
+      <p:grpSpPr>
+        <a:xfrm>
+          <a:off x="0" y="0"/>
+          <a:ext cx="0" cy="0"/>
+          <a:chOff x="0" y="0"/>
+          <a:chExt cx="0" cy="0"/>
+        </a:xfrm>
+      </p:grpSpPr>
+      <p:pic>
+        <p:nvPicPr>
+          <p:cNvPr id="12" name="Graphique 11" descr="Croissance de l'activité avec un remplissage uni">
+            <a:extLst>
+              <a:ext uri="{FF2B5EF4-FFF2-40B4-BE49-F238E27FC236}">
+                <a16:creationId xmlns:a16="http://schemas.microsoft.com/office/drawing/2014/main" id="{AF14DDD8-2EF0-4901-3924-A07B6A0317C8}"/>
+              </a:ext>
+            </a:extLst>
+          </p:cNvPr>
+          <p:cNvPicPr>
+            <a:picLocks noChangeAspect="1"/>
+          </p:cNvPicPr>
+          <p:nvPr/>
+        </p:nvPicPr>
+        <p:blipFill>
+          <a:blip r:embed="rId2">
+            <a:extLst>
+              <a:ext uri="{28A0092B-C50C-407E-A947-70E740481C1C}">
+                <a14:useLocalDpi xmlns:a14="http://schemas.microsoft.com/office/drawing/2010/main" val="0"/>
+              </a:ext>
+              <a:ext uri="{96DAC541-7B7A-43D3-8B79-37D633B846F1}">
+                <asvg:svgBlip xmlns:asvg="http://schemas.microsoft.com/office/drawing/2016/SVG/main" r:embed="rId3"/>
+              </a:ext>
+            </a:extLst>
+          </a:blip>
+          <a:stretch>
+            <a:fillRect/>
+          </a:stretch>
+        </p:blipFill>
+        <p:spPr>
+          <a:xfrm>
+            <a:off x="9545777" y="833595"/>
+            <a:ext cx="1715078" cy="1715078"/>
+          </a:xfrm>
+          <a:prstGeom prst="rect">
+            <a:avLst/>
+          </a:prstGeom>
+        </p:spPr>
+      </p:pic>
+      <p:sp>
+        <p:nvSpPr>
+          <p:cNvPr id="2" name="Titre 1">
+            <a:extLst>
+              <a:ext uri="{FF2B5EF4-FFF2-40B4-BE49-F238E27FC236}">
+                <a16:creationId xmlns:a16="http://schemas.microsoft.com/office/drawing/2014/main" id="{04B8AE57-027B-D80E-35E3-A20E9A18B0C9}"/>
+              </a:ext>
+            </a:extLst>
+          </p:cNvPr>
+          <p:cNvSpPr>
+            <a:spLocks noGrp="1"/>
+          </p:cNvSpPr>
+          <p:nvPr>
+            <p:ph type="title"/>
+          </p:nvPr>
+        </p:nvSpPr>
+        <p:spPr/>
+        <p:txBody>
+          <a:bodyPr>
+            <a:normAutofit fontScale="90000"/>
+          </a:bodyPr>
+          <a:lstStyle/>
+          <a:p>
+            <a:r>
+              <a:rPr lang="fr-FR" dirty="0"/>
+              <a:t>Auto and </a:t>
+            </a:r>
+            <a:r>
+              <a:rPr lang="fr-FR" dirty="0" err="1"/>
+              <a:t>peer</a:t>
+            </a:r>
+            <a:r>
+              <a:rPr lang="fr-FR" dirty="0"/>
+              <a:t> </a:t>
+            </a:r>
+            <a:r>
+              <a:rPr lang="fr-FR" dirty="0" err="1"/>
+              <a:t>evaluation</a:t>
+            </a:r>
+            <a:br>
+              <a:rPr lang="fr-FR" dirty="0"/>
+            </a:br>
+            <a:endParaRPr lang="fr-FR" dirty="0"/>
+          </a:p>
+        </p:txBody>
+      </p:sp>
+      <p:sp>
+        <p:nvSpPr>
+          <p:cNvPr id="4" name="Espace réservé du numéro de diapositive 3">
+            <a:extLst>
+              <a:ext uri="{FF2B5EF4-FFF2-40B4-BE49-F238E27FC236}">
+                <a16:creationId xmlns:a16="http://schemas.microsoft.com/office/drawing/2014/main" id="{F24BEE6C-26EC-EBA8-1F53-8B9C9B19143F}"/>
+              </a:ext>
+            </a:extLst>
+          </p:cNvPr>
+          <p:cNvSpPr>
+            <a:spLocks noGrp="1"/>
+          </p:cNvSpPr>
+          <p:nvPr>
+            <p:ph type="sldNum" sz="quarter" idx="12"/>
+          </p:nvPr>
+        </p:nvSpPr>
+        <p:spPr/>
+        <p:txBody>
+          <a:bodyPr/>
+          <a:lstStyle/>
+          <a:p>
+            <a:fld id="{DBA1B0FB-D917-4C8C-928F-313BD683BF39}" type="slidenum">
+              <a:rPr lang="en-US" smtClean="0"/>
+              <a:t>10</a:t>
+            </a:fld>
+            <a:endParaRPr lang="en-US"/>
+          </a:p>
+        </p:txBody>
+      </p:sp>
+      <p:graphicFrame>
+        <p:nvGraphicFramePr>
+          <p:cNvPr id="8" name="Tableau 7">
+            <a:extLst>
+              <a:ext uri="{FF2B5EF4-FFF2-40B4-BE49-F238E27FC236}">
+                <a16:creationId xmlns:a16="http://schemas.microsoft.com/office/drawing/2014/main" id="{5A1E667B-2687-35BC-F39A-12D799898444}"/>
+              </a:ext>
+            </a:extLst>
+          </p:cNvPr>
+          <p:cNvGraphicFramePr>
+            <a:graphicFrameLocks noGrp="1"/>
+          </p:cNvGraphicFramePr>
+          <p:nvPr>
+            <p:extLst>
+              <p:ext uri="{D42A27DB-BD31-4B8C-83A1-F6EECF244321}">
+                <p14:modId xmlns:p14="http://schemas.microsoft.com/office/powerpoint/2010/main" val="1048472414"/>
+              </p:ext>
+            </p:extLst>
+          </p:nvPr>
+        </p:nvGraphicFramePr>
+        <p:xfrm>
+          <a:off x="934999" y="2702561"/>
+          <a:ext cx="10322002" cy="2680566"/>
+        </p:xfrm>
+        <a:graphic>
+          <a:graphicData uri="http://schemas.openxmlformats.org/drawingml/2006/table">
+            <a:tbl>
+              <a:tblPr/>
+              <a:tblGrid>
+                <a:gridCol w="668091">
+                  <a:extLst>
+                    <a:ext uri="{9D8B030D-6E8A-4147-A177-3AD203B41FA5}">
+                      <a16:colId xmlns:a16="http://schemas.microsoft.com/office/drawing/2014/main" val="2171086533"/>
+                    </a:ext>
+                  </a:extLst>
+                </a:gridCol>
+                <a:gridCol w="1319479">
+                  <a:extLst>
+                    <a:ext uri="{9D8B030D-6E8A-4147-A177-3AD203B41FA5}">
+                      <a16:colId xmlns:a16="http://schemas.microsoft.com/office/drawing/2014/main" val="26873103"/>
+                    </a:ext>
+                  </a:extLst>
+                </a:gridCol>
+                <a:gridCol w="1469800">
+                  <a:extLst>
+                    <a:ext uri="{9D8B030D-6E8A-4147-A177-3AD203B41FA5}">
+                      <a16:colId xmlns:a16="http://schemas.microsoft.com/office/drawing/2014/main" val="220294600"/>
+                    </a:ext>
+                  </a:extLst>
+                </a:gridCol>
+                <a:gridCol w="1853952">
+                  <a:extLst>
+                    <a:ext uri="{9D8B030D-6E8A-4147-A177-3AD203B41FA5}">
+                      <a16:colId xmlns:a16="http://schemas.microsoft.com/office/drawing/2014/main" val="2506399173"/>
+                    </a:ext>
+                  </a:extLst>
+                </a:gridCol>
+                <a:gridCol w="1002136">
+                  <a:extLst>
+                    <a:ext uri="{9D8B030D-6E8A-4147-A177-3AD203B41FA5}">
+                      <a16:colId xmlns:a16="http://schemas.microsoft.com/office/drawing/2014/main" val="2020190775"/>
+                    </a:ext>
+                  </a:extLst>
+                </a:gridCol>
+                <a:gridCol w="1002136">
+                  <a:extLst>
+                    <a:ext uri="{9D8B030D-6E8A-4147-A177-3AD203B41FA5}">
+                      <a16:colId xmlns:a16="http://schemas.microsoft.com/office/drawing/2014/main" val="1234655607"/>
+                    </a:ext>
+                  </a:extLst>
+                </a:gridCol>
+                <a:gridCol w="1002136">
+                  <a:extLst>
+                    <a:ext uri="{9D8B030D-6E8A-4147-A177-3AD203B41FA5}">
+                      <a16:colId xmlns:a16="http://schemas.microsoft.com/office/drawing/2014/main" val="1648449347"/>
+                    </a:ext>
+                  </a:extLst>
+                </a:gridCol>
+                <a:gridCol w="1002136">
+                  <a:extLst>
+                    <a:ext uri="{9D8B030D-6E8A-4147-A177-3AD203B41FA5}">
+                      <a16:colId xmlns:a16="http://schemas.microsoft.com/office/drawing/2014/main" val="3092278641"/>
+                    </a:ext>
+                  </a:extLst>
+                </a:gridCol>
+                <a:gridCol w="1002136">
+                  <a:extLst>
+                    <a:ext uri="{9D8B030D-6E8A-4147-A177-3AD203B41FA5}">
+                      <a16:colId xmlns:a16="http://schemas.microsoft.com/office/drawing/2014/main" val="1590935076"/>
+                    </a:ext>
+                  </a:extLst>
+                </a:gridCol>
+              </a:tblGrid>
+              <a:tr h="382938">
+                <a:tc>
+                  <a:txBody>
+                    <a:bodyPr/>
+                    <a:lstStyle/>
+                    <a:p>
+                      <a:pPr algn="l" fontAlgn="b"/>
+                      <a:r>
+                        <a:rPr lang="fr-FR" sz="1100" b="0" i="0" u="none" strike="noStrike">
+                          <a:solidFill>
+                            <a:srgbClr val="FFFFFF"/>
+                          </a:solidFill>
+                          <a:effectLst/>
+                          <a:latin typeface="Calibri" panose="020F0502020204030204" pitchFamily="34" charset="0"/>
+                        </a:rPr>
+                        <a:t> </a:t>
+                      </a:r>
+                    </a:p>
+                  </a:txBody>
+                  <a:tcPr marL="6350" marR="6350" marT="6350" marB="0" anchor="b">
+                    <a:lnL w="6350" cap="flat" cmpd="sng" algn="ctr">
+                      <a:solidFill>
+                        <a:srgbClr val="000000"/>
+                      </a:solidFill>
+                      <a:prstDash val="solid"/>
+                      <a:round/>
+                      <a:headEnd type="none" w="med" len="med"/>
+                      <a:tailEnd type="none" w="med" len="med"/>
+                    </a:lnL>
+                    <a:lnR w="6350" cap="flat" cmpd="sng" algn="ctr">
+                      <a:solidFill>
+                        <a:srgbClr val="000000"/>
+                      </a:solidFill>
+                      <a:prstDash val="solid"/>
+                      <a:round/>
+                      <a:headEnd type="none" w="med" len="med"/>
+                      <a:tailEnd type="none" w="med" len="med"/>
+                    </a:lnR>
+                    <a:lnT w="6350" cap="flat" cmpd="sng" algn="ctr">
+                      <a:solidFill>
+                        <a:srgbClr val="000000"/>
+                      </a:solidFill>
+                      <a:prstDash val="solid"/>
+                      <a:round/>
+                      <a:headEnd type="none" w="med" len="med"/>
+                      <a:tailEnd type="none" w="med" len="med"/>
+                    </a:lnT>
+                    <a:lnB>
+                      <a:noFill/>
+                    </a:lnB>
+                    <a:solidFill>
+                      <a:srgbClr val="4472C4"/>
+                    </a:solidFill>
+                  </a:tcPr>
+                </a:tc>
+                <a:tc>
+                  <a:txBody>
+                    <a:bodyPr/>
+                    <a:lstStyle/>
+                    <a:p>
+                      <a:pPr algn="l" fontAlgn="b"/>
+                      <a:r>
+                        <a:rPr lang="fr-FR" sz="1100" b="0" i="0" u="none" strike="noStrike">
+                          <a:solidFill>
+                            <a:srgbClr val="FFFFFF"/>
+                          </a:solidFill>
+                          <a:effectLst/>
+                          <a:latin typeface="Calibri" panose="020F0502020204030204" pitchFamily="34" charset="0"/>
+                        </a:rPr>
+                        <a:t>Student number</a:t>
+                      </a:r>
+                    </a:p>
+                  </a:txBody>
+                  <a:tcPr marL="6350" marR="6350" marT="6350" marB="0" anchor="b">
+                    <a:lnL w="6350" cap="flat" cmpd="sng" algn="ctr">
+                      <a:solidFill>
+                        <a:srgbClr val="000000"/>
+                      </a:solidFill>
+                      <a:prstDash val="solid"/>
+                      <a:round/>
+                      <a:headEnd type="none" w="med" len="med"/>
+                      <a:tailEnd type="none" w="med" len="med"/>
+                    </a:lnL>
+                    <a:lnR w="6350" cap="flat" cmpd="sng" algn="ctr">
+                      <a:solidFill>
+                        <a:srgbClr val="000000"/>
+                      </a:solidFill>
+                      <a:prstDash val="solid"/>
+                      <a:round/>
+                      <a:headEnd type="none" w="med" len="med"/>
+                      <a:tailEnd type="none" w="med" len="med"/>
+                    </a:lnR>
+                    <a:lnT w="6350" cap="flat" cmpd="sng" algn="ctr">
+                      <a:solidFill>
+                        <a:srgbClr val="000000"/>
+                      </a:solidFill>
+                      <a:prstDash val="solid"/>
+                      <a:round/>
+                      <a:headEnd type="none" w="med" len="med"/>
+                      <a:tailEnd type="none" w="med" len="med"/>
+                    </a:lnT>
+                    <a:lnB>
+                      <a:noFill/>
+                    </a:lnB>
+                    <a:solidFill>
+                      <a:srgbClr val="4472C4"/>
+                    </a:solidFill>
+                  </a:tcPr>
+                </a:tc>
+                <a:tc>
+                  <a:txBody>
+                    <a:bodyPr/>
+                    <a:lstStyle/>
+                    <a:p>
+                      <a:pPr algn="l" fontAlgn="b"/>
+                      <a:r>
+                        <a:rPr lang="fr-FR" sz="1100" b="0" i="0" u="none" strike="noStrike">
+                          <a:solidFill>
+                            <a:srgbClr val="FFFFFF"/>
+                          </a:solidFill>
+                          <a:effectLst/>
+                          <a:latin typeface="Calibri" panose="020F0502020204030204" pitchFamily="34" charset="0"/>
+                        </a:rPr>
+                        <a:t>Name</a:t>
+                      </a:r>
+                    </a:p>
+                  </a:txBody>
+                  <a:tcPr marL="6350" marR="6350" marT="6350" marB="0" anchor="b">
+                    <a:lnL w="6350" cap="flat" cmpd="sng" algn="ctr">
+                      <a:solidFill>
+                        <a:srgbClr val="000000"/>
+                      </a:solidFill>
+                      <a:prstDash val="solid"/>
+                      <a:round/>
+                      <a:headEnd type="none" w="med" len="med"/>
+                      <a:tailEnd type="none" w="med" len="med"/>
+                    </a:lnL>
+                    <a:lnR w="6350" cap="flat" cmpd="sng" algn="ctr">
+                      <a:solidFill>
+                        <a:srgbClr val="000000"/>
+                      </a:solidFill>
+                      <a:prstDash val="solid"/>
+                      <a:round/>
+                      <a:headEnd type="none" w="med" len="med"/>
+                      <a:tailEnd type="none" w="med" len="med"/>
+                    </a:lnR>
+                    <a:lnT w="6350" cap="flat" cmpd="sng" algn="ctr">
+                      <a:solidFill>
+                        <a:srgbClr val="000000"/>
+                      </a:solidFill>
+                      <a:prstDash val="solid"/>
+                      <a:round/>
+                      <a:headEnd type="none" w="med" len="med"/>
+                      <a:tailEnd type="none" w="med" len="med"/>
+                    </a:lnT>
+                    <a:lnB>
+                      <a:noFill/>
+                    </a:lnB>
+                    <a:solidFill>
+                      <a:srgbClr val="4472C4"/>
+                    </a:solidFill>
+                  </a:tcPr>
+                </a:tc>
+                <a:tc>
+                  <a:txBody>
+                    <a:bodyPr/>
+                    <a:lstStyle/>
+                    <a:p>
+                      <a:pPr algn="l" fontAlgn="b"/>
+                      <a:r>
+                        <a:rPr lang="fr-FR" sz="1100" b="0" i="0" u="none" strike="noStrike">
+                          <a:solidFill>
+                            <a:srgbClr val="FFFFFF"/>
+                          </a:solidFill>
+                          <a:effectLst/>
+                          <a:latin typeface="Calibri" panose="020F0502020204030204" pitchFamily="34" charset="0"/>
+                        </a:rPr>
+                        <a:t>Auto-evaluation</a:t>
+                      </a:r>
+                    </a:p>
+                  </a:txBody>
+                  <a:tcPr marL="6350" marR="6350" marT="6350" marB="0" anchor="b">
+                    <a:lnL w="6350" cap="flat" cmpd="sng" algn="ctr">
+                      <a:solidFill>
+                        <a:srgbClr val="000000"/>
+                      </a:solidFill>
+                      <a:prstDash val="solid"/>
+                      <a:round/>
+                      <a:headEnd type="none" w="med" len="med"/>
+                      <a:tailEnd type="none" w="med" len="med"/>
+                    </a:lnL>
+                    <a:lnR w="6350" cap="flat" cmpd="sng" algn="ctr">
+                      <a:solidFill>
+                        <a:srgbClr val="000000"/>
+                      </a:solidFill>
+                      <a:prstDash val="solid"/>
+                      <a:round/>
+                      <a:headEnd type="none" w="med" len="med"/>
+                      <a:tailEnd type="none" w="med" len="med"/>
+                    </a:lnR>
+                    <a:lnT w="6350" cap="flat" cmpd="sng" algn="ctr">
+                      <a:solidFill>
+                        <a:srgbClr val="000000"/>
+                      </a:solidFill>
+                      <a:prstDash val="solid"/>
+                      <a:round/>
+                      <a:headEnd type="none" w="med" len="med"/>
+                      <a:tailEnd type="none" w="med" len="med"/>
+                    </a:lnT>
+                    <a:lnB>
+                      <a:noFill/>
+                    </a:lnB>
+                    <a:solidFill>
+                      <a:srgbClr val="4472C4"/>
+                    </a:solidFill>
+                  </a:tcPr>
+                </a:tc>
+                <a:tc>
+                  <a:txBody>
+                    <a:bodyPr/>
+                    <a:lstStyle/>
+                    <a:p>
+                      <a:pPr algn="ctr" fontAlgn="b"/>
+                      <a:r>
+                        <a:rPr lang="fr-FR" sz="1100" b="0" i="0" u="none" strike="noStrike">
+                          <a:solidFill>
+                            <a:srgbClr val="FFFFFF"/>
+                          </a:solidFill>
+                          <a:effectLst/>
+                          <a:latin typeface="Calibri" panose="020F0502020204030204" pitchFamily="34" charset="0"/>
+                        </a:rPr>
+                        <a:t>Peer review</a:t>
+                      </a:r>
+                    </a:p>
+                  </a:txBody>
+                  <a:tcPr marL="6350" marR="6350" marT="6350" marB="0" anchor="b">
+                    <a:lnL w="6350" cap="flat" cmpd="sng" algn="ctr">
+                      <a:solidFill>
+                        <a:srgbClr val="000000"/>
+                      </a:solidFill>
+                      <a:prstDash val="solid"/>
+                      <a:round/>
+                      <a:headEnd type="none" w="med" len="med"/>
+                      <a:tailEnd type="none" w="med" len="med"/>
+                    </a:lnL>
+                    <a:lnR>
+                      <a:noFill/>
+                    </a:lnR>
+                    <a:lnT w="6350" cap="flat" cmpd="sng" algn="ctr">
+                      <a:solidFill>
+                        <a:srgbClr val="000000"/>
+                      </a:solidFill>
+                      <a:prstDash val="solid"/>
+                      <a:round/>
+                      <a:headEnd type="none" w="med" len="med"/>
+                      <a:tailEnd type="none" w="med" len="med"/>
+                    </a:lnT>
+                    <a:lnB w="6350" cap="flat" cmpd="sng" algn="ctr">
+                      <a:solidFill>
+                        <a:srgbClr val="000000"/>
+                      </a:solidFill>
+                      <a:prstDash val="solid"/>
+                      <a:round/>
+                      <a:headEnd type="none" w="med" len="med"/>
+                      <a:tailEnd type="none" w="med" len="med"/>
+                    </a:lnB>
+                    <a:solidFill>
+                      <a:srgbClr val="4472C4"/>
+                    </a:solidFill>
+                  </a:tcPr>
+                </a:tc>
+                <a:tc>
+                  <a:txBody>
+                    <a:bodyPr/>
+                    <a:lstStyle/>
+                    <a:p>
+                      <a:pPr algn="ctr" fontAlgn="b"/>
+                      <a:r>
+                        <a:rPr lang="fr-FR" sz="1100" b="0" i="0" u="none" strike="noStrike">
+                          <a:solidFill>
+                            <a:srgbClr val="FFFFFF"/>
+                          </a:solidFill>
+                          <a:effectLst/>
+                          <a:latin typeface="Calibri" panose="020F0502020204030204" pitchFamily="34" charset="0"/>
+                        </a:rPr>
+                        <a:t> </a:t>
+                      </a:r>
+                    </a:p>
+                  </a:txBody>
+                  <a:tcPr marL="6350" marR="6350" marT="6350" marB="0" anchor="b">
+                    <a:lnL>
+                      <a:noFill/>
+                    </a:lnL>
+                    <a:lnR>
+                      <a:noFill/>
+                    </a:lnR>
+                    <a:lnT w="6350" cap="flat" cmpd="sng" algn="ctr">
+                      <a:solidFill>
+                        <a:srgbClr val="000000"/>
+                      </a:solidFill>
+                      <a:prstDash val="solid"/>
+                      <a:round/>
+                      <a:headEnd type="none" w="med" len="med"/>
+                      <a:tailEnd type="none" w="med" len="med"/>
+                    </a:lnT>
+                    <a:lnB w="6350" cap="flat" cmpd="sng" algn="ctr">
+                      <a:solidFill>
+                        <a:srgbClr val="000000"/>
+                      </a:solidFill>
+                      <a:prstDash val="solid"/>
+                      <a:round/>
+                      <a:headEnd type="none" w="med" len="med"/>
+                      <a:tailEnd type="none" w="med" len="med"/>
+                    </a:lnB>
+                    <a:solidFill>
+                      <a:srgbClr val="4472C4"/>
+                    </a:solidFill>
+                  </a:tcPr>
+                </a:tc>
+                <a:tc>
+                  <a:txBody>
+                    <a:bodyPr/>
+                    <a:lstStyle/>
+                    <a:p>
+                      <a:pPr algn="ctr" fontAlgn="b"/>
+                      <a:r>
+                        <a:rPr lang="fr-FR" sz="1100" b="0" i="0" u="none" strike="noStrike">
+                          <a:solidFill>
+                            <a:srgbClr val="FFFFFF"/>
+                          </a:solidFill>
+                          <a:effectLst/>
+                          <a:latin typeface="Calibri" panose="020F0502020204030204" pitchFamily="34" charset="0"/>
+                        </a:rPr>
+                        <a:t> </a:t>
+                      </a:r>
+                    </a:p>
+                  </a:txBody>
+                  <a:tcPr marL="6350" marR="6350" marT="6350" marB="0" anchor="b">
+                    <a:lnL>
+                      <a:noFill/>
+                    </a:lnL>
+                    <a:lnR>
+                      <a:noFill/>
+                    </a:lnR>
+                    <a:lnT w="6350" cap="flat" cmpd="sng" algn="ctr">
+                      <a:solidFill>
+                        <a:srgbClr val="000000"/>
+                      </a:solidFill>
+                      <a:prstDash val="solid"/>
+                      <a:round/>
+                      <a:headEnd type="none" w="med" len="med"/>
+                      <a:tailEnd type="none" w="med" len="med"/>
+                    </a:lnT>
+                    <a:lnB w="6350" cap="flat" cmpd="sng" algn="ctr">
+                      <a:solidFill>
+                        <a:srgbClr val="000000"/>
+                      </a:solidFill>
+                      <a:prstDash val="solid"/>
+                      <a:round/>
+                      <a:headEnd type="none" w="med" len="med"/>
+                      <a:tailEnd type="none" w="med" len="med"/>
+                    </a:lnB>
+                    <a:solidFill>
+                      <a:srgbClr val="4472C4"/>
+                    </a:solidFill>
+                  </a:tcPr>
+                </a:tc>
+                <a:tc>
+                  <a:txBody>
+                    <a:bodyPr/>
+                    <a:lstStyle/>
+                    <a:p>
+                      <a:pPr algn="ctr" fontAlgn="b"/>
+                      <a:r>
+                        <a:rPr lang="fr-FR" sz="1100" b="0" i="0" u="none" strike="noStrike">
+                          <a:solidFill>
+                            <a:srgbClr val="FFFFFF"/>
+                          </a:solidFill>
+                          <a:effectLst/>
+                          <a:latin typeface="Calibri" panose="020F0502020204030204" pitchFamily="34" charset="0"/>
+                        </a:rPr>
+                        <a:t> </a:t>
+                      </a:r>
+                    </a:p>
+                  </a:txBody>
+                  <a:tcPr marL="6350" marR="6350" marT="6350" marB="0" anchor="b">
+                    <a:lnL>
+                      <a:noFill/>
+                    </a:lnL>
+                    <a:lnR>
+                      <a:noFill/>
+                    </a:lnR>
+                    <a:lnT w="6350" cap="flat" cmpd="sng" algn="ctr">
+                      <a:solidFill>
+                        <a:srgbClr val="000000"/>
+                      </a:solidFill>
+                      <a:prstDash val="solid"/>
+                      <a:round/>
+                      <a:headEnd type="none" w="med" len="med"/>
+                      <a:tailEnd type="none" w="med" len="med"/>
+                    </a:lnT>
+                    <a:lnB w="6350" cap="flat" cmpd="sng" algn="ctr">
+                      <a:solidFill>
+                        <a:srgbClr val="000000"/>
+                      </a:solidFill>
+                      <a:prstDash val="solid"/>
+                      <a:round/>
+                      <a:headEnd type="none" w="med" len="med"/>
+                      <a:tailEnd type="none" w="med" len="med"/>
+                    </a:lnB>
+                    <a:solidFill>
+                      <a:srgbClr val="4472C4"/>
+                    </a:solidFill>
+                  </a:tcPr>
+                </a:tc>
+                <a:tc>
+                  <a:txBody>
+                    <a:bodyPr/>
+                    <a:lstStyle/>
+                    <a:p>
+                      <a:pPr algn="ctr" fontAlgn="b"/>
+                      <a:r>
+                        <a:rPr lang="fr-FR" sz="1100" b="0" i="0" u="none" strike="noStrike">
+                          <a:solidFill>
+                            <a:srgbClr val="FFFFFF"/>
+                          </a:solidFill>
+                          <a:effectLst/>
+                          <a:latin typeface="Calibri" panose="020F0502020204030204" pitchFamily="34" charset="0"/>
+                        </a:rPr>
+                        <a:t> </a:t>
+                      </a:r>
+                    </a:p>
+                  </a:txBody>
+                  <a:tcPr marL="6350" marR="6350" marT="6350" marB="0" anchor="b">
+                    <a:lnL>
+                      <a:noFill/>
+                    </a:lnL>
+                    <a:lnR w="6350" cap="flat" cmpd="sng" algn="ctr">
+                      <a:solidFill>
+                        <a:srgbClr val="000000"/>
+                      </a:solidFill>
+                      <a:prstDash val="solid"/>
+                      <a:round/>
+                      <a:headEnd type="none" w="med" len="med"/>
+                      <a:tailEnd type="none" w="med" len="med"/>
+                    </a:lnR>
+                    <a:lnT w="6350" cap="flat" cmpd="sng" algn="ctr">
+                      <a:solidFill>
+                        <a:srgbClr val="000000"/>
+                      </a:solidFill>
+                      <a:prstDash val="solid"/>
+                      <a:round/>
+                      <a:headEnd type="none" w="med" len="med"/>
+                      <a:tailEnd type="none" w="med" len="med"/>
+                    </a:lnT>
+                    <a:lnB w="6350" cap="flat" cmpd="sng" algn="ctr">
+                      <a:solidFill>
+                        <a:srgbClr val="000000"/>
+                      </a:solidFill>
+                      <a:prstDash val="solid"/>
+                      <a:round/>
+                      <a:headEnd type="none" w="med" len="med"/>
+                      <a:tailEnd type="none" w="med" len="med"/>
+                    </a:lnB>
+                    <a:solidFill>
+                      <a:srgbClr val="4472C4"/>
+                    </a:solidFill>
+                  </a:tcPr>
+                </a:tc>
+                <a:extLst>
+                  <a:ext uri="{0D108BD9-81ED-4DB2-BD59-A6C34878D82A}">
+                    <a16:rowId xmlns:a16="http://schemas.microsoft.com/office/drawing/2014/main" val="3724640851"/>
+                  </a:ext>
+                </a:extLst>
+              </a:tr>
+              <a:tr h="382938">
+                <a:tc>
+                  <a:txBody>
+                    <a:bodyPr/>
+                    <a:lstStyle/>
+                    <a:p>
+                      <a:pPr algn="l" fontAlgn="b"/>
+                      <a:r>
+                        <a:rPr lang="fr-FR" sz="1100" b="0" i="0" u="none" strike="noStrike">
+                          <a:solidFill>
+                            <a:srgbClr val="FFFFFF"/>
+                          </a:solidFill>
+                          <a:effectLst/>
+                          <a:latin typeface="Calibri" panose="020F0502020204030204" pitchFamily="34" charset="0"/>
+                        </a:rPr>
+                        <a:t> </a:t>
+                      </a:r>
+                    </a:p>
+                  </a:txBody>
+                  <a:tcPr marL="6350" marR="6350" marT="6350" marB="0" anchor="b">
+                    <a:lnL w="6350" cap="flat" cmpd="sng" algn="ctr">
+                      <a:solidFill>
+                        <a:srgbClr val="000000"/>
+                      </a:solidFill>
+                      <a:prstDash val="solid"/>
+                      <a:round/>
+                      <a:headEnd type="none" w="med" len="med"/>
+                      <a:tailEnd type="none" w="med" len="med"/>
+                    </a:lnL>
+                    <a:lnR w="6350" cap="flat" cmpd="sng" algn="ctr">
+                      <a:solidFill>
+                        <a:srgbClr val="000000"/>
+                      </a:solidFill>
+                      <a:prstDash val="solid"/>
+                      <a:round/>
+                      <a:headEnd type="none" w="med" len="med"/>
+                      <a:tailEnd type="none" w="med" len="med"/>
+                    </a:lnR>
+                    <a:lnT>
+                      <a:noFill/>
+                    </a:lnT>
+                    <a:lnB w="6350" cap="flat" cmpd="sng" algn="ctr">
+                      <a:solidFill>
+                        <a:srgbClr val="000000"/>
+                      </a:solidFill>
+                      <a:prstDash val="solid"/>
+                      <a:round/>
+                      <a:headEnd type="none" w="med" len="med"/>
+                      <a:tailEnd type="none" w="med" len="med"/>
+                    </a:lnB>
+                    <a:solidFill>
+                      <a:srgbClr val="4472C4"/>
+                    </a:solidFill>
+                  </a:tcPr>
+                </a:tc>
+                <a:tc>
+                  <a:txBody>
+                    <a:bodyPr/>
+                    <a:lstStyle/>
+                    <a:p>
+                      <a:pPr algn="l" fontAlgn="b"/>
+                      <a:r>
+                        <a:rPr lang="fr-FR" sz="1100" b="0" i="0" u="none" strike="noStrike">
+                          <a:solidFill>
+                            <a:srgbClr val="FFFFFF"/>
+                          </a:solidFill>
+                          <a:effectLst/>
+                          <a:latin typeface="Calibri" panose="020F0502020204030204" pitchFamily="34" charset="0"/>
+                        </a:rPr>
+                        <a:t> </a:t>
+                      </a:r>
+                    </a:p>
+                  </a:txBody>
+                  <a:tcPr marL="6350" marR="6350" marT="6350" marB="0" anchor="b">
+                    <a:lnL w="6350" cap="flat" cmpd="sng" algn="ctr">
+                      <a:solidFill>
+                        <a:srgbClr val="000000"/>
+                      </a:solidFill>
+                      <a:prstDash val="solid"/>
+                      <a:round/>
+                      <a:headEnd type="none" w="med" len="med"/>
+                      <a:tailEnd type="none" w="med" len="med"/>
+                    </a:lnL>
+                    <a:lnR w="6350" cap="flat" cmpd="sng" algn="ctr">
+                      <a:solidFill>
+                        <a:srgbClr val="000000"/>
+                      </a:solidFill>
+                      <a:prstDash val="solid"/>
+                      <a:round/>
+                      <a:headEnd type="none" w="med" len="med"/>
+                      <a:tailEnd type="none" w="med" len="med"/>
+                    </a:lnR>
+                    <a:lnT>
+                      <a:noFill/>
+                    </a:lnT>
+                    <a:lnB w="6350" cap="flat" cmpd="sng" algn="ctr">
+                      <a:solidFill>
+                        <a:srgbClr val="000000"/>
+                      </a:solidFill>
+                      <a:prstDash val="solid"/>
+                      <a:round/>
+                      <a:headEnd type="none" w="med" len="med"/>
+                      <a:tailEnd type="none" w="med" len="med"/>
+                    </a:lnB>
+                    <a:solidFill>
+                      <a:srgbClr val="4472C4"/>
+                    </a:solidFill>
+                  </a:tcPr>
+                </a:tc>
+                <a:tc>
+                  <a:txBody>
+                    <a:bodyPr/>
+                    <a:lstStyle/>
+                    <a:p>
+                      <a:pPr algn="l" fontAlgn="b"/>
+                      <a:r>
+                        <a:rPr lang="fr-FR" sz="1100" b="0" i="0" u="none" strike="noStrike">
+                          <a:solidFill>
+                            <a:srgbClr val="FFFFFF"/>
+                          </a:solidFill>
+                          <a:effectLst/>
+                          <a:latin typeface="Calibri" panose="020F0502020204030204" pitchFamily="34" charset="0"/>
+                        </a:rPr>
+                        <a:t> </a:t>
+                      </a:r>
+                    </a:p>
+                  </a:txBody>
+                  <a:tcPr marL="6350" marR="6350" marT="6350" marB="0" anchor="b">
+                    <a:lnL w="6350" cap="flat" cmpd="sng" algn="ctr">
+                      <a:solidFill>
+                        <a:srgbClr val="000000"/>
+                      </a:solidFill>
+                      <a:prstDash val="solid"/>
+                      <a:round/>
+                      <a:headEnd type="none" w="med" len="med"/>
+                      <a:tailEnd type="none" w="med" len="med"/>
+                    </a:lnL>
+                    <a:lnR w="6350" cap="flat" cmpd="sng" algn="ctr">
+                      <a:solidFill>
+                        <a:srgbClr val="000000"/>
+                      </a:solidFill>
+                      <a:prstDash val="solid"/>
+                      <a:round/>
+                      <a:headEnd type="none" w="med" len="med"/>
+                      <a:tailEnd type="none" w="med" len="med"/>
+                    </a:lnR>
+                    <a:lnT>
+                      <a:noFill/>
+                    </a:lnT>
+                    <a:lnB w="6350" cap="flat" cmpd="sng" algn="ctr">
+                      <a:solidFill>
+                        <a:srgbClr val="000000"/>
+                      </a:solidFill>
+                      <a:prstDash val="solid"/>
+                      <a:round/>
+                      <a:headEnd type="none" w="med" len="med"/>
+                      <a:tailEnd type="none" w="med" len="med"/>
+                    </a:lnB>
+                    <a:solidFill>
+                      <a:srgbClr val="4472C4"/>
+                    </a:solidFill>
+                  </a:tcPr>
+                </a:tc>
+                <a:tc>
+                  <a:txBody>
+                    <a:bodyPr/>
+                    <a:lstStyle/>
+                    <a:p>
+                      <a:pPr algn="l" fontAlgn="b"/>
+                      <a:r>
+                        <a:rPr lang="fr-FR" sz="1100" b="0" i="0" u="none" strike="noStrike">
+                          <a:solidFill>
+                            <a:srgbClr val="FFFFFF"/>
+                          </a:solidFill>
+                          <a:effectLst/>
+                          <a:latin typeface="Calibri" panose="020F0502020204030204" pitchFamily="34" charset="0"/>
+                        </a:rPr>
+                        <a:t> </a:t>
+                      </a:r>
+                    </a:p>
+                  </a:txBody>
+                  <a:tcPr marL="6350" marR="6350" marT="6350" marB="0" anchor="b">
+                    <a:lnL w="6350" cap="flat" cmpd="sng" algn="ctr">
+                      <a:solidFill>
+                        <a:srgbClr val="000000"/>
+                      </a:solidFill>
+                      <a:prstDash val="solid"/>
+                      <a:round/>
+                      <a:headEnd type="none" w="med" len="med"/>
+                      <a:tailEnd type="none" w="med" len="med"/>
+                    </a:lnL>
+                    <a:lnR w="6350" cap="flat" cmpd="sng" algn="ctr">
+                      <a:solidFill>
+                        <a:srgbClr val="000000"/>
+                      </a:solidFill>
+                      <a:prstDash val="solid"/>
+                      <a:round/>
+                      <a:headEnd type="none" w="med" len="med"/>
+                      <a:tailEnd type="none" w="med" len="med"/>
+                    </a:lnR>
+                    <a:lnT>
+                      <a:noFill/>
+                    </a:lnT>
+                    <a:lnB w="6350" cap="flat" cmpd="sng" algn="ctr">
+                      <a:solidFill>
+                        <a:srgbClr val="000000"/>
+                      </a:solidFill>
+                      <a:prstDash val="solid"/>
+                      <a:round/>
+                      <a:headEnd type="none" w="med" len="med"/>
+                      <a:tailEnd type="none" w="med" len="med"/>
+                    </a:lnB>
+                    <a:solidFill>
+                      <a:srgbClr val="4472C4"/>
+                    </a:solidFill>
+                  </a:tcPr>
+                </a:tc>
+                <a:tc>
+                  <a:txBody>
+                    <a:bodyPr/>
+                    <a:lstStyle/>
+                    <a:p>
+                      <a:pPr algn="r" fontAlgn="b"/>
+                      <a:r>
+                        <a:rPr lang="fr-FR" sz="1100" b="0" i="0" u="none" strike="noStrike">
+                          <a:solidFill>
+                            <a:srgbClr val="FFFFFF"/>
+                          </a:solidFill>
+                          <a:effectLst/>
+                          <a:latin typeface="Calibri" panose="020F0502020204030204" pitchFamily="34" charset="0"/>
+                        </a:rPr>
+                        <a:t>1</a:t>
+                      </a:r>
+                    </a:p>
+                  </a:txBody>
+                  <a:tcPr marL="6350" marR="6350" marT="6350" marB="0" anchor="b">
+                    <a:lnL w="6350" cap="flat" cmpd="sng" algn="ctr">
+                      <a:solidFill>
+                        <a:srgbClr val="000000"/>
+                      </a:solidFill>
+                      <a:prstDash val="solid"/>
+                      <a:round/>
+                      <a:headEnd type="none" w="med" len="med"/>
+                      <a:tailEnd type="none" w="med" len="med"/>
+                    </a:lnL>
+                    <a:lnR w="6350" cap="flat" cmpd="sng" algn="ctr">
+                      <a:solidFill>
+                        <a:srgbClr val="000000"/>
+                      </a:solidFill>
+                      <a:prstDash val="solid"/>
+                      <a:round/>
+                      <a:headEnd type="none" w="med" len="med"/>
+                      <a:tailEnd type="none" w="med" len="med"/>
+                    </a:lnR>
+                    <a:lnT w="6350" cap="flat" cmpd="sng" algn="ctr">
+                      <a:solidFill>
+                        <a:srgbClr val="000000"/>
+                      </a:solidFill>
+                      <a:prstDash val="solid"/>
+                      <a:round/>
+                      <a:headEnd type="none" w="med" len="med"/>
+                      <a:tailEnd type="none" w="med" len="med"/>
+                    </a:lnT>
+                    <a:lnB w="6350" cap="flat" cmpd="sng" algn="ctr">
+                      <a:solidFill>
+                        <a:srgbClr val="000000"/>
+                      </a:solidFill>
+                      <a:prstDash val="solid"/>
+                      <a:round/>
+                      <a:headEnd type="none" w="med" len="med"/>
+                      <a:tailEnd type="none" w="med" len="med"/>
+                    </a:lnB>
+                    <a:solidFill>
+                      <a:srgbClr val="4472C4"/>
+                    </a:solidFill>
+                  </a:tcPr>
+                </a:tc>
+                <a:tc>
+                  <a:txBody>
+                    <a:bodyPr/>
+                    <a:lstStyle/>
+                    <a:p>
+                      <a:pPr algn="r" fontAlgn="b"/>
+                      <a:r>
+                        <a:rPr lang="fr-FR" sz="1100" b="0" i="0" u="none" strike="noStrike">
+                          <a:solidFill>
+                            <a:srgbClr val="FFFFFF"/>
+                          </a:solidFill>
+                          <a:effectLst/>
+                          <a:latin typeface="Calibri" panose="020F0502020204030204" pitchFamily="34" charset="0"/>
+                        </a:rPr>
+                        <a:t>2</a:t>
+                      </a:r>
+                    </a:p>
+                  </a:txBody>
+                  <a:tcPr marL="6350" marR="6350" marT="6350" marB="0" anchor="b">
+                    <a:lnL w="6350" cap="flat" cmpd="sng" algn="ctr">
+                      <a:solidFill>
+                        <a:srgbClr val="000000"/>
+                      </a:solidFill>
+                      <a:prstDash val="solid"/>
+                      <a:round/>
+                      <a:headEnd type="none" w="med" len="med"/>
+                      <a:tailEnd type="none" w="med" len="med"/>
+                    </a:lnL>
+                    <a:lnR w="6350" cap="flat" cmpd="sng" algn="ctr">
+                      <a:solidFill>
+                        <a:srgbClr val="000000"/>
+                      </a:solidFill>
+                      <a:prstDash val="solid"/>
+                      <a:round/>
+                      <a:headEnd type="none" w="med" len="med"/>
+                      <a:tailEnd type="none" w="med" len="med"/>
+                    </a:lnR>
+                    <a:lnT w="6350" cap="flat" cmpd="sng" algn="ctr">
+                      <a:solidFill>
+                        <a:srgbClr val="000000"/>
+                      </a:solidFill>
+                      <a:prstDash val="solid"/>
+                      <a:round/>
+                      <a:headEnd type="none" w="med" len="med"/>
+                      <a:tailEnd type="none" w="med" len="med"/>
+                    </a:lnT>
+                    <a:lnB w="6350" cap="flat" cmpd="sng" algn="ctr">
+                      <a:solidFill>
+                        <a:srgbClr val="000000"/>
+                      </a:solidFill>
+                      <a:prstDash val="solid"/>
+                      <a:round/>
+                      <a:headEnd type="none" w="med" len="med"/>
+                      <a:tailEnd type="none" w="med" len="med"/>
+                    </a:lnB>
+                    <a:solidFill>
+                      <a:srgbClr val="4472C4"/>
+                    </a:solidFill>
+                  </a:tcPr>
+                </a:tc>
+                <a:tc>
+                  <a:txBody>
+                    <a:bodyPr/>
+                    <a:lstStyle/>
+                    <a:p>
+                      <a:pPr algn="r" fontAlgn="b"/>
+                      <a:r>
+                        <a:rPr lang="fr-FR" sz="1100" b="0" i="0" u="none" strike="noStrike">
+                          <a:solidFill>
+                            <a:srgbClr val="FFFFFF"/>
+                          </a:solidFill>
+                          <a:effectLst/>
+                          <a:latin typeface="Calibri" panose="020F0502020204030204" pitchFamily="34" charset="0"/>
+                        </a:rPr>
+                        <a:t>3</a:t>
+                      </a:r>
+                    </a:p>
+                  </a:txBody>
+                  <a:tcPr marL="6350" marR="6350" marT="6350" marB="0" anchor="b">
+                    <a:lnL w="6350" cap="flat" cmpd="sng" algn="ctr">
+                      <a:solidFill>
+                        <a:srgbClr val="000000"/>
+                      </a:solidFill>
+                      <a:prstDash val="solid"/>
+                      <a:round/>
+                      <a:headEnd type="none" w="med" len="med"/>
+                      <a:tailEnd type="none" w="med" len="med"/>
+                    </a:lnL>
+                    <a:lnR w="6350" cap="flat" cmpd="sng" algn="ctr">
+                      <a:solidFill>
+                        <a:srgbClr val="000000"/>
+                      </a:solidFill>
+                      <a:prstDash val="solid"/>
+                      <a:round/>
+                      <a:headEnd type="none" w="med" len="med"/>
+                      <a:tailEnd type="none" w="med" len="med"/>
+                    </a:lnR>
+                    <a:lnT w="6350" cap="flat" cmpd="sng" algn="ctr">
+                      <a:solidFill>
+                        <a:srgbClr val="000000"/>
+                      </a:solidFill>
+                      <a:prstDash val="solid"/>
+                      <a:round/>
+                      <a:headEnd type="none" w="med" len="med"/>
+                      <a:tailEnd type="none" w="med" len="med"/>
+                    </a:lnT>
+                    <a:lnB w="6350" cap="flat" cmpd="sng" algn="ctr">
+                      <a:solidFill>
+                        <a:srgbClr val="000000"/>
+                      </a:solidFill>
+                      <a:prstDash val="solid"/>
+                      <a:round/>
+                      <a:headEnd type="none" w="med" len="med"/>
+                      <a:tailEnd type="none" w="med" len="med"/>
+                    </a:lnB>
+                    <a:solidFill>
+                      <a:srgbClr val="4472C4"/>
+                    </a:solidFill>
+                  </a:tcPr>
+                </a:tc>
+                <a:tc>
+                  <a:txBody>
+                    <a:bodyPr/>
+                    <a:lstStyle/>
+                    <a:p>
+                      <a:pPr algn="r" fontAlgn="b"/>
+                      <a:r>
+                        <a:rPr lang="fr-FR" sz="1100" b="0" i="0" u="none" strike="noStrike">
+                          <a:solidFill>
+                            <a:srgbClr val="FFFFFF"/>
+                          </a:solidFill>
+                          <a:effectLst/>
+                          <a:latin typeface="Calibri" panose="020F0502020204030204" pitchFamily="34" charset="0"/>
+                        </a:rPr>
+                        <a:t>4</a:t>
+                      </a:r>
+                    </a:p>
+                  </a:txBody>
+                  <a:tcPr marL="6350" marR="6350" marT="6350" marB="0" anchor="b">
+                    <a:lnL w="6350" cap="flat" cmpd="sng" algn="ctr">
+                      <a:solidFill>
+                        <a:srgbClr val="000000"/>
+                      </a:solidFill>
+                      <a:prstDash val="solid"/>
+                      <a:round/>
+                      <a:headEnd type="none" w="med" len="med"/>
+                      <a:tailEnd type="none" w="med" len="med"/>
+                    </a:lnL>
+                    <a:lnR w="6350" cap="flat" cmpd="sng" algn="ctr">
+                      <a:solidFill>
+                        <a:srgbClr val="000000"/>
+                      </a:solidFill>
+                      <a:prstDash val="solid"/>
+                      <a:round/>
+                      <a:headEnd type="none" w="med" len="med"/>
+                      <a:tailEnd type="none" w="med" len="med"/>
+                    </a:lnR>
+                    <a:lnT w="6350" cap="flat" cmpd="sng" algn="ctr">
+                      <a:solidFill>
+                        <a:srgbClr val="000000"/>
+                      </a:solidFill>
+                      <a:prstDash val="solid"/>
+                      <a:round/>
+                      <a:headEnd type="none" w="med" len="med"/>
+                      <a:tailEnd type="none" w="med" len="med"/>
+                    </a:lnT>
+                    <a:lnB w="6350" cap="flat" cmpd="sng" algn="ctr">
+                      <a:solidFill>
+                        <a:srgbClr val="000000"/>
+                      </a:solidFill>
+                      <a:prstDash val="solid"/>
+                      <a:round/>
+                      <a:headEnd type="none" w="med" len="med"/>
+                      <a:tailEnd type="none" w="med" len="med"/>
+                    </a:lnB>
+                    <a:solidFill>
+                      <a:srgbClr val="4472C4"/>
+                    </a:solidFill>
+                  </a:tcPr>
+                </a:tc>
+                <a:tc>
+                  <a:txBody>
+                    <a:bodyPr/>
+                    <a:lstStyle/>
+                    <a:p>
+                      <a:pPr algn="r" fontAlgn="b"/>
+                      <a:r>
+                        <a:rPr lang="fr-FR" sz="1100" b="0" i="0" u="none" strike="noStrike">
+                          <a:solidFill>
+                            <a:srgbClr val="FFFFFF"/>
+                          </a:solidFill>
+                          <a:effectLst/>
+                          <a:latin typeface="Calibri" panose="020F0502020204030204" pitchFamily="34" charset="0"/>
+                        </a:rPr>
+                        <a:t>5</a:t>
+                      </a:r>
+                    </a:p>
+                  </a:txBody>
+                  <a:tcPr marL="6350" marR="6350" marT="6350" marB="0" anchor="b">
+                    <a:lnL w="6350" cap="flat" cmpd="sng" algn="ctr">
+                      <a:solidFill>
+                        <a:srgbClr val="000000"/>
+                      </a:solidFill>
+                      <a:prstDash val="solid"/>
+                      <a:round/>
+                      <a:headEnd type="none" w="med" len="med"/>
+                      <a:tailEnd type="none" w="med" len="med"/>
+                    </a:lnL>
+                    <a:lnR w="6350" cap="flat" cmpd="sng" algn="ctr">
+                      <a:solidFill>
+                        <a:srgbClr val="000000"/>
+                      </a:solidFill>
+                      <a:prstDash val="solid"/>
+                      <a:round/>
+                      <a:headEnd type="none" w="med" len="med"/>
+                      <a:tailEnd type="none" w="med" len="med"/>
+                    </a:lnR>
+                    <a:lnT w="6350" cap="flat" cmpd="sng" algn="ctr">
+                      <a:solidFill>
+                        <a:srgbClr val="000000"/>
+                      </a:solidFill>
+                      <a:prstDash val="solid"/>
+                      <a:round/>
+                      <a:headEnd type="none" w="med" len="med"/>
+                      <a:tailEnd type="none" w="med" len="med"/>
+                    </a:lnT>
+                    <a:lnB w="6350" cap="flat" cmpd="sng" algn="ctr">
+                      <a:solidFill>
+                        <a:srgbClr val="000000"/>
+                      </a:solidFill>
+                      <a:prstDash val="solid"/>
+                      <a:round/>
+                      <a:headEnd type="none" w="med" len="med"/>
+                      <a:tailEnd type="none" w="med" len="med"/>
+                    </a:lnB>
+                    <a:solidFill>
+                      <a:srgbClr val="4472C4"/>
+                    </a:solidFill>
+                  </a:tcPr>
+                </a:tc>
+                <a:extLst>
+                  <a:ext uri="{0D108BD9-81ED-4DB2-BD59-A6C34878D82A}">
+                    <a16:rowId xmlns:a16="http://schemas.microsoft.com/office/drawing/2014/main" val="3870117245"/>
+                  </a:ext>
+                </a:extLst>
+              </a:tr>
+              <a:tr h="382938">
+                <a:tc>
+                  <a:txBody>
+                    <a:bodyPr/>
+                    <a:lstStyle/>
+                    <a:p>
+                      <a:pPr algn="r" fontAlgn="b"/>
+                      <a:r>
+                        <a:rPr lang="fr-FR" sz="1100" b="0" i="0" u="none" strike="noStrike">
+                          <a:solidFill>
+                            <a:srgbClr val="000000"/>
+                          </a:solidFill>
+                          <a:effectLst/>
+                          <a:latin typeface="Calibri" panose="020F0502020204030204" pitchFamily="34" charset="0"/>
+                        </a:rPr>
+                        <a:t>1</a:t>
+                      </a:r>
+                    </a:p>
+                  </a:txBody>
+                  <a:tcPr marL="6350" marR="6350" marT="6350" marB="0" anchor="b">
+                    <a:lnL w="6350" cap="flat" cmpd="sng" algn="ctr">
+                      <a:solidFill>
+                        <a:srgbClr val="000000"/>
+                      </a:solidFill>
+                      <a:prstDash val="solid"/>
+                      <a:round/>
+                      <a:headEnd type="none" w="med" len="med"/>
+                      <a:tailEnd type="none" w="med" len="med"/>
+                    </a:lnL>
+                    <a:lnR w="6350" cap="flat" cmpd="sng" algn="ctr">
+                      <a:solidFill>
+                        <a:srgbClr val="000000"/>
+                      </a:solidFill>
+                      <a:prstDash val="solid"/>
+                      <a:round/>
+                      <a:headEnd type="none" w="med" len="med"/>
+                      <a:tailEnd type="none" w="med" len="med"/>
+                    </a:lnR>
+                    <a:lnT w="6350" cap="flat" cmpd="sng" algn="ctr">
+                      <a:solidFill>
+                        <a:srgbClr val="000000"/>
+                      </a:solidFill>
+                      <a:prstDash val="solid"/>
+                      <a:round/>
+                      <a:headEnd type="none" w="med" len="med"/>
+                      <a:tailEnd type="none" w="med" len="med"/>
+                    </a:lnT>
+                    <a:lnB>
+                      <a:noFill/>
+                    </a:lnB>
+                    <a:solidFill>
+                      <a:srgbClr val="FFFFFF"/>
+                    </a:solidFill>
+                  </a:tcPr>
+                </a:tc>
+                <a:tc>
+                  <a:txBody>
+                    <a:bodyPr/>
+                    <a:lstStyle/>
+                    <a:p>
+                      <a:pPr algn="r" fontAlgn="b"/>
+                      <a:r>
+                        <a:rPr lang="fr-FR" sz="1100" b="0" i="0" u="none" strike="noStrike">
+                          <a:solidFill>
+                            <a:srgbClr val="000000"/>
+                          </a:solidFill>
+                          <a:effectLst/>
+                          <a:latin typeface="Calibri" panose="020F0502020204030204" pitchFamily="34" charset="0"/>
+                        </a:rPr>
+                        <a:t>1220448</a:t>
+                      </a:r>
+                    </a:p>
+                  </a:txBody>
+                  <a:tcPr marL="6350" marR="6350" marT="6350" marB="0" anchor="b">
+                    <a:lnL w="6350" cap="flat" cmpd="sng" algn="ctr">
+                      <a:solidFill>
+                        <a:srgbClr val="000000"/>
+                      </a:solidFill>
+                      <a:prstDash val="solid"/>
+                      <a:round/>
+                      <a:headEnd type="none" w="med" len="med"/>
+                      <a:tailEnd type="none" w="med" len="med"/>
+                    </a:lnL>
+                    <a:lnR w="6350" cap="flat" cmpd="sng" algn="ctr">
+                      <a:solidFill>
+                        <a:srgbClr val="000000"/>
+                      </a:solidFill>
+                      <a:prstDash val="solid"/>
+                      <a:round/>
+                      <a:headEnd type="none" w="med" len="med"/>
+                      <a:tailEnd type="none" w="med" len="med"/>
+                    </a:lnR>
+                    <a:lnT w="6350" cap="flat" cmpd="sng" algn="ctr">
+                      <a:solidFill>
+                        <a:srgbClr val="000000"/>
+                      </a:solidFill>
+                      <a:prstDash val="solid"/>
+                      <a:round/>
+                      <a:headEnd type="none" w="med" len="med"/>
+                      <a:tailEnd type="none" w="med" len="med"/>
+                    </a:lnT>
+                    <a:lnB>
+                      <a:noFill/>
+                    </a:lnB>
+                    <a:solidFill>
+                      <a:srgbClr val="FFFFFF"/>
+                    </a:solidFill>
+                  </a:tcPr>
+                </a:tc>
+                <a:tc>
+                  <a:txBody>
+                    <a:bodyPr/>
+                    <a:lstStyle/>
+                    <a:p>
+                      <a:pPr algn="l" fontAlgn="b"/>
+                      <a:r>
+                        <a:rPr lang="fr-FR" sz="1100" b="0" i="0" u="none" strike="noStrike">
+                          <a:solidFill>
+                            <a:srgbClr val="000000"/>
+                          </a:solidFill>
+                          <a:effectLst/>
+                          <a:latin typeface="Calibri" panose="020F0502020204030204" pitchFamily="34" charset="0"/>
+                        </a:rPr>
+                        <a:t>Miika</a:t>
+                      </a:r>
+                    </a:p>
+                  </a:txBody>
+                  <a:tcPr marL="6350" marR="6350" marT="6350" marB="0" anchor="b">
+                    <a:lnL w="6350" cap="flat" cmpd="sng" algn="ctr">
+                      <a:solidFill>
+                        <a:srgbClr val="000000"/>
+                      </a:solidFill>
+                      <a:prstDash val="solid"/>
+                      <a:round/>
+                      <a:headEnd type="none" w="med" len="med"/>
+                      <a:tailEnd type="none" w="med" len="med"/>
+                    </a:lnL>
+                    <a:lnR w="6350" cap="flat" cmpd="sng" algn="ctr">
+                      <a:solidFill>
+                        <a:srgbClr val="000000"/>
+                      </a:solidFill>
+                      <a:prstDash val="solid"/>
+                      <a:round/>
+                      <a:headEnd type="none" w="med" len="med"/>
+                      <a:tailEnd type="none" w="med" len="med"/>
+                    </a:lnR>
+                    <a:lnT w="6350" cap="flat" cmpd="sng" algn="ctr">
+                      <a:solidFill>
+                        <a:srgbClr val="000000"/>
+                      </a:solidFill>
+                      <a:prstDash val="solid"/>
+                      <a:round/>
+                      <a:headEnd type="none" w="med" len="med"/>
+                      <a:tailEnd type="none" w="med" len="med"/>
+                    </a:lnT>
+                    <a:lnB>
+                      <a:noFill/>
+                    </a:lnB>
+                    <a:solidFill>
+                      <a:srgbClr val="FFFFFF"/>
+                    </a:solidFill>
+                  </a:tcPr>
+                </a:tc>
+                <a:tc>
+                  <a:txBody>
+                    <a:bodyPr/>
+                    <a:lstStyle/>
+                    <a:p>
+                      <a:pPr algn="l" fontAlgn="b"/>
+                      <a:r>
+                        <a:rPr lang="fr-FR" sz="1100" b="0" i="0" u="none" strike="noStrike">
+                          <a:solidFill>
+                            <a:srgbClr val="000000"/>
+                          </a:solidFill>
+                          <a:effectLst/>
+                          <a:latin typeface="Calibri" panose="020F0502020204030204" pitchFamily="34" charset="0"/>
+                        </a:rPr>
+                        <a:t>Fair</a:t>
+                      </a:r>
+                    </a:p>
+                  </a:txBody>
+                  <a:tcPr marL="6350" marR="6350" marT="6350" marB="0" anchor="b">
+                    <a:lnL w="6350" cap="flat" cmpd="sng" algn="ctr">
+                      <a:solidFill>
+                        <a:srgbClr val="000000"/>
+                      </a:solidFill>
+                      <a:prstDash val="solid"/>
+                      <a:round/>
+                      <a:headEnd type="none" w="med" len="med"/>
+                      <a:tailEnd type="none" w="med" len="med"/>
+                    </a:lnL>
+                    <a:lnR w="6350" cap="flat" cmpd="sng" algn="ctr">
+                      <a:solidFill>
+                        <a:srgbClr val="000000"/>
+                      </a:solidFill>
+                      <a:prstDash val="solid"/>
+                      <a:round/>
+                      <a:headEnd type="none" w="med" len="med"/>
+                      <a:tailEnd type="none" w="med" len="med"/>
+                    </a:lnR>
+                    <a:lnT w="6350" cap="flat" cmpd="sng" algn="ctr">
+                      <a:solidFill>
+                        <a:srgbClr val="000000"/>
+                      </a:solidFill>
+                      <a:prstDash val="solid"/>
+                      <a:round/>
+                      <a:headEnd type="none" w="med" len="med"/>
+                      <a:tailEnd type="none" w="med" len="med"/>
+                    </a:lnT>
+                    <a:lnB>
+                      <a:noFill/>
+                    </a:lnB>
+                    <a:solidFill>
+                      <a:srgbClr val="FFFFFF"/>
+                    </a:solidFill>
+                  </a:tcPr>
+                </a:tc>
+                <a:tc>
+                  <a:txBody>
+                    <a:bodyPr/>
+                    <a:lstStyle/>
+                    <a:p>
+                      <a:pPr algn="l" fontAlgn="b"/>
+                      <a:r>
+                        <a:rPr lang="fr-FR" sz="1100" b="0" i="0" u="none" strike="noStrike">
+                          <a:solidFill>
+                            <a:srgbClr val="FFFFFF"/>
+                          </a:solidFill>
+                          <a:effectLst/>
+                          <a:latin typeface="Calibri" panose="020F0502020204030204" pitchFamily="34" charset="0"/>
+                        </a:rPr>
+                        <a:t> </a:t>
+                      </a:r>
+                    </a:p>
+                  </a:txBody>
+                  <a:tcPr marL="6350" marR="6350" marT="6350" marB="0" anchor="b">
+                    <a:lnL w="6350" cap="flat" cmpd="sng" algn="ctr">
+                      <a:solidFill>
+                        <a:srgbClr val="000000"/>
+                      </a:solidFill>
+                      <a:prstDash val="solid"/>
+                      <a:round/>
+                      <a:headEnd type="none" w="med" len="med"/>
+                      <a:tailEnd type="none" w="med" len="med"/>
+                    </a:lnL>
+                    <a:lnR>
+                      <a:noFill/>
+                    </a:lnR>
+                    <a:lnT w="6350" cap="flat" cmpd="sng" algn="ctr">
+                      <a:solidFill>
+                        <a:srgbClr val="000000"/>
+                      </a:solidFill>
+                      <a:prstDash val="solid"/>
+                      <a:round/>
+                      <a:headEnd type="none" w="med" len="med"/>
+                      <a:tailEnd type="none" w="med" len="med"/>
+                    </a:lnT>
+                    <a:lnB>
+                      <a:noFill/>
+                    </a:lnB>
+                    <a:solidFill>
+                      <a:srgbClr val="4472C4"/>
+                    </a:solidFill>
+                  </a:tcPr>
+                </a:tc>
+                <a:tc>
+                  <a:txBody>
+                    <a:bodyPr/>
+                    <a:lstStyle/>
+                    <a:p>
+                      <a:pPr algn="l" fontAlgn="b"/>
+                      <a:r>
+                        <a:rPr lang="fr-FR" sz="1100" b="0" i="0" u="none" strike="noStrike">
+                          <a:solidFill>
+                            <a:srgbClr val="000000"/>
+                          </a:solidFill>
+                          <a:effectLst/>
+                          <a:latin typeface="Calibri" panose="020F0502020204030204" pitchFamily="34" charset="0"/>
+                        </a:rPr>
+                        <a:t>Outstanding</a:t>
+                      </a:r>
+                    </a:p>
+                  </a:txBody>
+                  <a:tcPr marL="6350" marR="6350" marT="6350" marB="0" anchor="b">
+                    <a:lnL>
+                      <a:noFill/>
+                    </a:lnL>
+                    <a:lnR w="6350" cap="flat" cmpd="sng" algn="ctr">
+                      <a:solidFill>
+                        <a:srgbClr val="000000"/>
+                      </a:solidFill>
+                      <a:prstDash val="solid"/>
+                      <a:round/>
+                      <a:headEnd type="none" w="med" len="med"/>
+                      <a:tailEnd type="none" w="med" len="med"/>
+                    </a:lnR>
+                    <a:lnT w="6350" cap="flat" cmpd="sng" algn="ctr">
+                      <a:solidFill>
+                        <a:srgbClr val="000000"/>
+                      </a:solidFill>
+                      <a:prstDash val="solid"/>
+                      <a:round/>
+                      <a:headEnd type="none" w="med" len="med"/>
+                      <a:tailEnd type="none" w="med" len="med"/>
+                    </a:lnT>
+                    <a:lnB>
+                      <a:noFill/>
+                    </a:lnB>
+                    <a:solidFill>
+                      <a:srgbClr val="FFFFFF"/>
+                    </a:solidFill>
+                  </a:tcPr>
+                </a:tc>
+                <a:tc>
+                  <a:txBody>
+                    <a:bodyPr/>
+                    <a:lstStyle/>
+                    <a:p>
+                      <a:pPr algn="l" fontAlgn="b"/>
+                      <a:r>
+                        <a:rPr lang="fr-FR" sz="1100" b="0" i="0" u="none" strike="noStrike">
+                          <a:solidFill>
+                            <a:srgbClr val="000000"/>
+                          </a:solidFill>
+                          <a:effectLst/>
+                          <a:latin typeface="Calibri" panose="020F0502020204030204" pitchFamily="34" charset="0"/>
+                        </a:rPr>
+                        <a:t>Fair</a:t>
+                      </a:r>
+                    </a:p>
+                  </a:txBody>
+                  <a:tcPr marL="6350" marR="6350" marT="6350" marB="0" anchor="b">
+                    <a:lnL w="6350" cap="flat" cmpd="sng" algn="ctr">
+                      <a:solidFill>
+                        <a:srgbClr val="000000"/>
+                      </a:solidFill>
+                      <a:prstDash val="solid"/>
+                      <a:round/>
+                      <a:headEnd type="none" w="med" len="med"/>
+                      <a:tailEnd type="none" w="med" len="med"/>
+                    </a:lnL>
+                    <a:lnR w="6350" cap="flat" cmpd="sng" algn="ctr">
+                      <a:solidFill>
+                        <a:srgbClr val="000000"/>
+                      </a:solidFill>
+                      <a:prstDash val="solid"/>
+                      <a:round/>
+                      <a:headEnd type="none" w="med" len="med"/>
+                      <a:tailEnd type="none" w="med" len="med"/>
+                    </a:lnR>
+                    <a:lnT w="6350" cap="flat" cmpd="sng" algn="ctr">
+                      <a:solidFill>
+                        <a:srgbClr val="000000"/>
+                      </a:solidFill>
+                      <a:prstDash val="solid"/>
+                      <a:round/>
+                      <a:headEnd type="none" w="med" len="med"/>
+                      <a:tailEnd type="none" w="med" len="med"/>
+                    </a:lnT>
+                    <a:lnB>
+                      <a:noFill/>
+                    </a:lnB>
+                    <a:solidFill>
+                      <a:srgbClr val="FFFFFF"/>
+                    </a:solidFill>
+                  </a:tcPr>
+                </a:tc>
+                <a:tc>
+                  <a:txBody>
+                    <a:bodyPr/>
+                    <a:lstStyle/>
+                    <a:p>
+                      <a:pPr algn="l" fontAlgn="b"/>
+                      <a:r>
+                        <a:rPr lang="fr-FR" sz="1100" b="0" i="0" u="none" strike="noStrike">
+                          <a:solidFill>
+                            <a:srgbClr val="000000"/>
+                          </a:solidFill>
+                          <a:effectLst/>
+                          <a:latin typeface="Calibri" panose="020F0502020204030204" pitchFamily="34" charset="0"/>
+                        </a:rPr>
+                        <a:t>Fair</a:t>
+                      </a:r>
+                    </a:p>
+                  </a:txBody>
+                  <a:tcPr marL="6350" marR="6350" marT="6350" marB="0" anchor="b">
+                    <a:lnL w="6350" cap="flat" cmpd="sng" algn="ctr">
+                      <a:solidFill>
+                        <a:srgbClr val="000000"/>
+                      </a:solidFill>
+                      <a:prstDash val="solid"/>
+                      <a:round/>
+                      <a:headEnd type="none" w="med" len="med"/>
+                      <a:tailEnd type="none" w="med" len="med"/>
+                    </a:lnL>
+                    <a:lnR w="6350" cap="flat" cmpd="sng" algn="ctr">
+                      <a:solidFill>
+                        <a:srgbClr val="000000"/>
+                      </a:solidFill>
+                      <a:prstDash val="solid"/>
+                      <a:round/>
+                      <a:headEnd type="none" w="med" len="med"/>
+                      <a:tailEnd type="none" w="med" len="med"/>
+                    </a:lnR>
+                    <a:lnT w="6350" cap="flat" cmpd="sng" algn="ctr">
+                      <a:solidFill>
+                        <a:srgbClr val="000000"/>
+                      </a:solidFill>
+                      <a:prstDash val="solid"/>
+                      <a:round/>
+                      <a:headEnd type="none" w="med" len="med"/>
+                      <a:tailEnd type="none" w="med" len="med"/>
+                    </a:lnT>
+                    <a:lnB>
+                      <a:noFill/>
+                    </a:lnB>
+                    <a:solidFill>
+                      <a:srgbClr val="FFFFFF"/>
+                    </a:solidFill>
+                  </a:tcPr>
+                </a:tc>
+                <a:tc>
+                  <a:txBody>
+                    <a:bodyPr/>
+                    <a:lstStyle/>
+                    <a:p>
+                      <a:pPr algn="l" fontAlgn="b"/>
+                      <a:r>
+                        <a:rPr lang="fr-FR" sz="1100" b="0" i="0" u="none" strike="noStrike">
+                          <a:solidFill>
+                            <a:srgbClr val="000000"/>
+                          </a:solidFill>
+                          <a:effectLst/>
+                          <a:latin typeface="Calibri" panose="020F0502020204030204" pitchFamily="34" charset="0"/>
+                        </a:rPr>
+                        <a:t>Fair</a:t>
+                      </a:r>
+                    </a:p>
+                  </a:txBody>
+                  <a:tcPr marL="6350" marR="6350" marT="6350" marB="0" anchor="b">
+                    <a:lnL w="6350" cap="flat" cmpd="sng" algn="ctr">
+                      <a:solidFill>
+                        <a:srgbClr val="000000"/>
+                      </a:solidFill>
+                      <a:prstDash val="solid"/>
+                      <a:round/>
+                      <a:headEnd type="none" w="med" len="med"/>
+                      <a:tailEnd type="none" w="med" len="med"/>
+                    </a:lnL>
+                    <a:lnR>
+                      <a:noFill/>
+                    </a:lnR>
+                    <a:lnT w="6350" cap="flat" cmpd="sng" algn="ctr">
+                      <a:solidFill>
+                        <a:srgbClr val="000000"/>
+                      </a:solidFill>
+                      <a:prstDash val="solid"/>
+                      <a:round/>
+                      <a:headEnd type="none" w="med" len="med"/>
+                      <a:tailEnd type="none" w="med" len="med"/>
+                    </a:lnT>
+                    <a:lnB>
+                      <a:noFill/>
+                    </a:lnB>
+                    <a:solidFill>
+                      <a:srgbClr val="FFFFFF"/>
+                    </a:solidFill>
+                  </a:tcPr>
+                </a:tc>
+                <a:extLst>
+                  <a:ext uri="{0D108BD9-81ED-4DB2-BD59-A6C34878D82A}">
+                    <a16:rowId xmlns:a16="http://schemas.microsoft.com/office/drawing/2014/main" val="3199656848"/>
+                  </a:ext>
+                </a:extLst>
+              </a:tr>
+              <a:tr h="382938">
+                <a:tc>
+                  <a:txBody>
+                    <a:bodyPr/>
+                    <a:lstStyle/>
+                    <a:p>
+                      <a:pPr algn="r" fontAlgn="b"/>
+                      <a:r>
+                        <a:rPr lang="fr-FR" sz="1100" b="0" i="0" u="none" strike="noStrike">
+                          <a:solidFill>
+                            <a:srgbClr val="000000"/>
+                          </a:solidFill>
+                          <a:effectLst/>
+                          <a:latin typeface="Calibri" panose="020F0502020204030204" pitchFamily="34" charset="0"/>
+                        </a:rPr>
+                        <a:t>2</a:t>
+                      </a:r>
+                    </a:p>
+                  </a:txBody>
+                  <a:tcPr marL="6350" marR="6350" marT="6350" marB="0" anchor="b">
+                    <a:lnL w="6350" cap="flat" cmpd="sng" algn="ctr">
+                      <a:solidFill>
+                        <a:srgbClr val="000000"/>
+                      </a:solidFill>
+                      <a:prstDash val="solid"/>
+                      <a:round/>
+                      <a:headEnd type="none" w="med" len="med"/>
+                      <a:tailEnd type="none" w="med" len="med"/>
+                    </a:lnL>
+                    <a:lnR w="6350" cap="flat" cmpd="sng" algn="ctr">
+                      <a:solidFill>
+                        <a:srgbClr val="000000"/>
+                      </a:solidFill>
+                      <a:prstDash val="solid"/>
+                      <a:round/>
+                      <a:headEnd type="none" w="med" len="med"/>
+                      <a:tailEnd type="none" w="med" len="med"/>
+                    </a:lnR>
+                    <a:lnT>
+                      <a:noFill/>
+                    </a:lnT>
+                    <a:lnB>
+                      <a:noFill/>
+                    </a:lnB>
+                    <a:solidFill>
+                      <a:srgbClr val="B4C6E7"/>
+                    </a:solidFill>
+                  </a:tcPr>
+                </a:tc>
+                <a:tc>
+                  <a:txBody>
+                    <a:bodyPr/>
+                    <a:lstStyle/>
+                    <a:p>
+                      <a:pPr algn="r" fontAlgn="b"/>
+                      <a:r>
+                        <a:rPr lang="fr-FR" sz="1100" b="0" i="0" u="none" strike="noStrike">
+                          <a:solidFill>
+                            <a:srgbClr val="000000"/>
+                          </a:solidFill>
+                          <a:effectLst/>
+                          <a:latin typeface="Calibri" panose="020F0502020204030204" pitchFamily="34" charset="0"/>
+                        </a:rPr>
+                        <a:t>1220514</a:t>
+                      </a:r>
+                    </a:p>
+                  </a:txBody>
+                  <a:tcPr marL="6350" marR="6350" marT="6350" marB="0" anchor="b">
+                    <a:lnL w="6350" cap="flat" cmpd="sng" algn="ctr">
+                      <a:solidFill>
+                        <a:srgbClr val="000000"/>
+                      </a:solidFill>
+                      <a:prstDash val="solid"/>
+                      <a:round/>
+                      <a:headEnd type="none" w="med" len="med"/>
+                      <a:tailEnd type="none" w="med" len="med"/>
+                    </a:lnL>
+                    <a:lnR w="6350" cap="flat" cmpd="sng" algn="ctr">
+                      <a:solidFill>
+                        <a:srgbClr val="000000"/>
+                      </a:solidFill>
+                      <a:prstDash val="solid"/>
+                      <a:round/>
+                      <a:headEnd type="none" w="med" len="med"/>
+                      <a:tailEnd type="none" w="med" len="med"/>
+                    </a:lnR>
+                    <a:lnT>
+                      <a:noFill/>
+                    </a:lnT>
+                    <a:lnB>
+                      <a:noFill/>
+                    </a:lnB>
+                    <a:solidFill>
+                      <a:srgbClr val="B4C6E7"/>
+                    </a:solidFill>
+                  </a:tcPr>
+                </a:tc>
+                <a:tc>
+                  <a:txBody>
+                    <a:bodyPr/>
+                    <a:lstStyle/>
+                    <a:p>
+                      <a:pPr algn="l" fontAlgn="b"/>
+                      <a:r>
+                        <a:rPr lang="fr-FR" sz="1100" b="0" i="0" u="none" strike="noStrike">
+                          <a:solidFill>
+                            <a:srgbClr val="000000"/>
+                          </a:solidFill>
+                          <a:effectLst/>
+                          <a:latin typeface="Calibri" panose="020F0502020204030204" pitchFamily="34" charset="0"/>
+                        </a:rPr>
+                        <a:t>Liam</a:t>
+                      </a:r>
+                    </a:p>
+                  </a:txBody>
+                  <a:tcPr marL="6350" marR="6350" marT="6350" marB="0" anchor="b">
+                    <a:lnL w="6350" cap="flat" cmpd="sng" algn="ctr">
+                      <a:solidFill>
+                        <a:srgbClr val="000000"/>
+                      </a:solidFill>
+                      <a:prstDash val="solid"/>
+                      <a:round/>
+                      <a:headEnd type="none" w="med" len="med"/>
+                      <a:tailEnd type="none" w="med" len="med"/>
+                    </a:lnL>
+                    <a:lnR w="6350" cap="flat" cmpd="sng" algn="ctr">
+                      <a:solidFill>
+                        <a:srgbClr val="000000"/>
+                      </a:solidFill>
+                      <a:prstDash val="solid"/>
+                      <a:round/>
+                      <a:headEnd type="none" w="med" len="med"/>
+                      <a:tailEnd type="none" w="med" len="med"/>
+                    </a:lnR>
+                    <a:lnT>
+                      <a:noFill/>
+                    </a:lnT>
+                    <a:lnB>
+                      <a:noFill/>
+                    </a:lnB>
+                    <a:solidFill>
+                      <a:srgbClr val="B4C6E7"/>
+                    </a:solidFill>
+                  </a:tcPr>
+                </a:tc>
+                <a:tc>
+                  <a:txBody>
+                    <a:bodyPr/>
+                    <a:lstStyle/>
+                    <a:p>
+                      <a:pPr algn="l" fontAlgn="b"/>
+                      <a:r>
+                        <a:rPr lang="fr-FR" sz="1100" b="0" i="0" u="none" strike="noStrike">
+                          <a:solidFill>
+                            <a:srgbClr val="000000"/>
+                          </a:solidFill>
+                          <a:effectLst/>
+                          <a:latin typeface="Calibri" panose="020F0502020204030204" pitchFamily="34" charset="0"/>
+                        </a:rPr>
+                        <a:t>Outstanding</a:t>
+                      </a:r>
+                    </a:p>
+                  </a:txBody>
+                  <a:tcPr marL="6350" marR="6350" marT="6350" marB="0" anchor="b">
+                    <a:lnL w="6350" cap="flat" cmpd="sng" algn="ctr">
+                      <a:solidFill>
+                        <a:srgbClr val="000000"/>
+                      </a:solidFill>
+                      <a:prstDash val="solid"/>
+                      <a:round/>
+                      <a:headEnd type="none" w="med" len="med"/>
+                      <a:tailEnd type="none" w="med" len="med"/>
+                    </a:lnL>
+                    <a:lnR w="6350" cap="flat" cmpd="sng" algn="ctr">
+                      <a:solidFill>
+                        <a:srgbClr val="000000"/>
+                      </a:solidFill>
+                      <a:prstDash val="solid"/>
+                      <a:round/>
+                      <a:headEnd type="none" w="med" len="med"/>
+                      <a:tailEnd type="none" w="med" len="med"/>
+                    </a:lnR>
+                    <a:lnT>
+                      <a:noFill/>
+                    </a:lnT>
+                    <a:lnB>
+                      <a:noFill/>
+                    </a:lnB>
+                    <a:solidFill>
+                      <a:srgbClr val="B4C6E7"/>
+                    </a:solidFill>
+                  </a:tcPr>
+                </a:tc>
+                <a:tc>
+                  <a:txBody>
+                    <a:bodyPr/>
+                    <a:lstStyle/>
+                    <a:p>
+                      <a:pPr algn="l" fontAlgn="b"/>
+                      <a:r>
+                        <a:rPr lang="fr-FR" sz="1100" b="0" i="0" u="none" strike="noStrike">
+                          <a:solidFill>
+                            <a:srgbClr val="000000"/>
+                          </a:solidFill>
+                          <a:effectLst/>
+                          <a:latin typeface="Calibri" panose="020F0502020204030204" pitchFamily="34" charset="0"/>
+                        </a:rPr>
+                        <a:t>Fair</a:t>
+                      </a:r>
+                    </a:p>
+                  </a:txBody>
+                  <a:tcPr marL="6350" marR="6350" marT="6350" marB="0" anchor="b">
+                    <a:lnL w="6350" cap="flat" cmpd="sng" algn="ctr">
+                      <a:solidFill>
+                        <a:srgbClr val="000000"/>
+                      </a:solidFill>
+                      <a:prstDash val="solid"/>
+                      <a:round/>
+                      <a:headEnd type="none" w="med" len="med"/>
+                      <a:tailEnd type="none" w="med" len="med"/>
+                    </a:lnL>
+                    <a:lnR w="6350" cap="flat" cmpd="sng" algn="ctr">
+                      <a:solidFill>
+                        <a:srgbClr val="000000"/>
+                      </a:solidFill>
+                      <a:prstDash val="solid"/>
+                      <a:round/>
+                      <a:headEnd type="none" w="med" len="med"/>
+                      <a:tailEnd type="none" w="med" len="med"/>
+                    </a:lnR>
+                    <a:lnT>
+                      <a:noFill/>
+                    </a:lnT>
+                    <a:lnB>
+                      <a:noFill/>
+                    </a:lnB>
+                    <a:solidFill>
+                      <a:srgbClr val="B4C6E7"/>
+                    </a:solidFill>
+                  </a:tcPr>
+                </a:tc>
+                <a:tc>
+                  <a:txBody>
+                    <a:bodyPr/>
+                    <a:lstStyle/>
+                    <a:p>
+                      <a:pPr algn="l" fontAlgn="b"/>
+                      <a:r>
+                        <a:rPr lang="fr-FR" sz="1100" b="0" i="0" u="none" strike="noStrike">
+                          <a:solidFill>
+                            <a:srgbClr val="FFFFFF"/>
+                          </a:solidFill>
+                          <a:effectLst/>
+                          <a:latin typeface="Calibri" panose="020F0502020204030204" pitchFamily="34" charset="0"/>
+                        </a:rPr>
+                        <a:t> </a:t>
+                      </a:r>
+                    </a:p>
+                  </a:txBody>
+                  <a:tcPr marL="6350" marR="6350" marT="6350" marB="0" anchor="b">
+                    <a:lnL w="6350" cap="flat" cmpd="sng" algn="ctr">
+                      <a:solidFill>
+                        <a:srgbClr val="000000"/>
+                      </a:solidFill>
+                      <a:prstDash val="solid"/>
+                      <a:round/>
+                      <a:headEnd type="none" w="med" len="med"/>
+                      <a:tailEnd type="none" w="med" len="med"/>
+                    </a:lnL>
+                    <a:lnR w="6350" cap="flat" cmpd="sng" algn="ctr">
+                      <a:solidFill>
+                        <a:srgbClr val="000000"/>
+                      </a:solidFill>
+                      <a:prstDash val="solid"/>
+                      <a:round/>
+                      <a:headEnd type="none" w="med" len="med"/>
+                      <a:tailEnd type="none" w="med" len="med"/>
+                    </a:lnR>
+                    <a:lnT>
+                      <a:noFill/>
+                    </a:lnT>
+                    <a:lnB>
+                      <a:noFill/>
+                    </a:lnB>
+                    <a:solidFill>
+                      <a:srgbClr val="4472C4"/>
+                    </a:solidFill>
+                  </a:tcPr>
+                </a:tc>
+                <a:tc>
+                  <a:txBody>
+                    <a:bodyPr/>
+                    <a:lstStyle/>
+                    <a:p>
+                      <a:pPr algn="l" fontAlgn="b"/>
+                      <a:r>
+                        <a:rPr lang="fr-FR" sz="1100" b="0" i="0" u="none" strike="noStrike">
+                          <a:solidFill>
+                            <a:srgbClr val="000000"/>
+                          </a:solidFill>
+                          <a:effectLst/>
+                          <a:latin typeface="Calibri" panose="020F0502020204030204" pitchFamily="34" charset="0"/>
+                        </a:rPr>
+                        <a:t>Fair</a:t>
+                      </a:r>
+                    </a:p>
+                  </a:txBody>
+                  <a:tcPr marL="6350" marR="6350" marT="6350" marB="0" anchor="b">
+                    <a:lnL w="6350" cap="flat" cmpd="sng" algn="ctr">
+                      <a:solidFill>
+                        <a:srgbClr val="000000"/>
+                      </a:solidFill>
+                      <a:prstDash val="solid"/>
+                      <a:round/>
+                      <a:headEnd type="none" w="med" len="med"/>
+                      <a:tailEnd type="none" w="med" len="med"/>
+                    </a:lnL>
+                    <a:lnR w="6350" cap="flat" cmpd="sng" algn="ctr">
+                      <a:solidFill>
+                        <a:srgbClr val="000000"/>
+                      </a:solidFill>
+                      <a:prstDash val="solid"/>
+                      <a:round/>
+                      <a:headEnd type="none" w="med" len="med"/>
+                      <a:tailEnd type="none" w="med" len="med"/>
+                    </a:lnR>
+                    <a:lnT>
+                      <a:noFill/>
+                    </a:lnT>
+                    <a:lnB>
+                      <a:noFill/>
+                    </a:lnB>
+                    <a:solidFill>
+                      <a:srgbClr val="B4C6E7"/>
+                    </a:solidFill>
+                  </a:tcPr>
+                </a:tc>
+                <a:tc>
+                  <a:txBody>
+                    <a:bodyPr/>
+                    <a:lstStyle/>
+                    <a:p>
+                      <a:pPr algn="l" fontAlgn="b"/>
+                      <a:r>
+                        <a:rPr lang="fr-FR" sz="1100" b="0" i="0" u="none" strike="noStrike">
+                          <a:solidFill>
+                            <a:srgbClr val="000000"/>
+                          </a:solidFill>
+                          <a:effectLst/>
+                          <a:latin typeface="Calibri" panose="020F0502020204030204" pitchFamily="34" charset="0"/>
+                        </a:rPr>
+                        <a:t>Fair</a:t>
+                      </a:r>
+                    </a:p>
+                  </a:txBody>
+                  <a:tcPr marL="6350" marR="6350" marT="6350" marB="0" anchor="b">
+                    <a:lnL w="6350" cap="flat" cmpd="sng" algn="ctr">
+                      <a:solidFill>
+                        <a:srgbClr val="000000"/>
+                      </a:solidFill>
+                      <a:prstDash val="solid"/>
+                      <a:round/>
+                      <a:headEnd type="none" w="med" len="med"/>
+                      <a:tailEnd type="none" w="med" len="med"/>
+                    </a:lnL>
+                    <a:lnR w="6350" cap="flat" cmpd="sng" algn="ctr">
+                      <a:solidFill>
+                        <a:srgbClr val="000000"/>
+                      </a:solidFill>
+                      <a:prstDash val="solid"/>
+                      <a:round/>
+                      <a:headEnd type="none" w="med" len="med"/>
+                      <a:tailEnd type="none" w="med" len="med"/>
+                    </a:lnR>
+                    <a:lnT>
+                      <a:noFill/>
+                    </a:lnT>
+                    <a:lnB>
+                      <a:noFill/>
+                    </a:lnB>
+                    <a:solidFill>
+                      <a:srgbClr val="B4C6E7"/>
+                    </a:solidFill>
+                  </a:tcPr>
+                </a:tc>
+                <a:tc>
+                  <a:txBody>
+                    <a:bodyPr/>
+                    <a:lstStyle/>
+                    <a:p>
+                      <a:pPr algn="l" fontAlgn="b"/>
+                      <a:r>
+                        <a:rPr lang="fr-FR" sz="1100" b="0" i="0" u="none" strike="noStrike">
+                          <a:solidFill>
+                            <a:srgbClr val="000000"/>
+                          </a:solidFill>
+                          <a:effectLst/>
+                          <a:latin typeface="Calibri" panose="020F0502020204030204" pitchFamily="34" charset="0"/>
+                        </a:rPr>
+                        <a:t>Fair</a:t>
+                      </a:r>
+                    </a:p>
+                  </a:txBody>
+                  <a:tcPr marL="6350" marR="6350" marT="6350" marB="0" anchor="b">
+                    <a:lnL w="6350" cap="flat" cmpd="sng" algn="ctr">
+                      <a:solidFill>
+                        <a:srgbClr val="000000"/>
+                      </a:solidFill>
+                      <a:prstDash val="solid"/>
+                      <a:round/>
+                      <a:headEnd type="none" w="med" len="med"/>
+                      <a:tailEnd type="none" w="med" len="med"/>
+                    </a:lnL>
+                    <a:lnR>
+                      <a:noFill/>
+                    </a:lnR>
+                    <a:lnT>
+                      <a:noFill/>
+                    </a:lnT>
+                    <a:lnB>
+                      <a:noFill/>
+                    </a:lnB>
+                    <a:solidFill>
+                      <a:srgbClr val="B4C6E7"/>
+                    </a:solidFill>
+                  </a:tcPr>
+                </a:tc>
+                <a:extLst>
+                  <a:ext uri="{0D108BD9-81ED-4DB2-BD59-A6C34878D82A}">
+                    <a16:rowId xmlns:a16="http://schemas.microsoft.com/office/drawing/2014/main" val="3898246774"/>
+                  </a:ext>
+                </a:extLst>
+              </a:tr>
+              <a:tr h="382938">
+                <a:tc>
+                  <a:txBody>
+                    <a:bodyPr/>
+                    <a:lstStyle/>
+                    <a:p>
+                      <a:pPr algn="r" fontAlgn="b"/>
+                      <a:r>
+                        <a:rPr lang="fr-FR" sz="1100" b="0" i="0" u="none" strike="noStrike">
+                          <a:solidFill>
+                            <a:srgbClr val="000000"/>
+                          </a:solidFill>
+                          <a:effectLst/>
+                          <a:latin typeface="Calibri" panose="020F0502020204030204" pitchFamily="34" charset="0"/>
+                        </a:rPr>
+                        <a:t>3</a:t>
+                      </a:r>
+                    </a:p>
+                  </a:txBody>
+                  <a:tcPr marL="6350" marR="6350" marT="6350" marB="0" anchor="b">
+                    <a:lnL w="6350" cap="flat" cmpd="sng" algn="ctr">
+                      <a:solidFill>
+                        <a:srgbClr val="000000"/>
+                      </a:solidFill>
+                      <a:prstDash val="solid"/>
+                      <a:round/>
+                      <a:headEnd type="none" w="med" len="med"/>
+                      <a:tailEnd type="none" w="med" len="med"/>
+                    </a:lnL>
+                    <a:lnR w="6350" cap="flat" cmpd="sng" algn="ctr">
+                      <a:solidFill>
+                        <a:srgbClr val="000000"/>
+                      </a:solidFill>
+                      <a:prstDash val="solid"/>
+                      <a:round/>
+                      <a:headEnd type="none" w="med" len="med"/>
+                      <a:tailEnd type="none" w="med" len="med"/>
+                    </a:lnR>
+                    <a:lnT>
+                      <a:noFill/>
+                    </a:lnT>
+                    <a:lnB>
+                      <a:noFill/>
+                    </a:lnB>
+                    <a:solidFill>
+                      <a:srgbClr val="FFFFFF"/>
+                    </a:solidFill>
+                  </a:tcPr>
+                </a:tc>
+                <a:tc>
+                  <a:txBody>
+                    <a:bodyPr/>
+                    <a:lstStyle/>
+                    <a:p>
+                      <a:pPr algn="r" fontAlgn="b"/>
+                      <a:r>
+                        <a:rPr lang="fr-FR" sz="1100" b="0" i="0" u="none" strike="noStrike">
+                          <a:solidFill>
+                            <a:srgbClr val="000000"/>
+                          </a:solidFill>
+                          <a:effectLst/>
+                          <a:latin typeface="Calibri" panose="020F0502020204030204" pitchFamily="34" charset="0"/>
+                        </a:rPr>
+                        <a:t>1220528</a:t>
+                      </a:r>
+                    </a:p>
+                  </a:txBody>
+                  <a:tcPr marL="6350" marR="6350" marT="6350" marB="0" anchor="b">
+                    <a:lnL w="6350" cap="flat" cmpd="sng" algn="ctr">
+                      <a:solidFill>
+                        <a:srgbClr val="000000"/>
+                      </a:solidFill>
+                      <a:prstDash val="solid"/>
+                      <a:round/>
+                      <a:headEnd type="none" w="med" len="med"/>
+                      <a:tailEnd type="none" w="med" len="med"/>
+                    </a:lnL>
+                    <a:lnR w="6350" cap="flat" cmpd="sng" algn="ctr">
+                      <a:solidFill>
+                        <a:srgbClr val="000000"/>
+                      </a:solidFill>
+                      <a:prstDash val="solid"/>
+                      <a:round/>
+                      <a:headEnd type="none" w="med" len="med"/>
+                      <a:tailEnd type="none" w="med" len="med"/>
+                    </a:lnR>
+                    <a:lnT>
+                      <a:noFill/>
+                    </a:lnT>
+                    <a:lnB>
+                      <a:noFill/>
+                    </a:lnB>
+                    <a:solidFill>
+                      <a:srgbClr val="FFFFFF"/>
+                    </a:solidFill>
+                  </a:tcPr>
+                </a:tc>
+                <a:tc>
+                  <a:txBody>
+                    <a:bodyPr/>
+                    <a:lstStyle/>
+                    <a:p>
+                      <a:pPr algn="l" fontAlgn="b"/>
+                      <a:r>
+                        <a:rPr lang="fr-FR" sz="1100" b="0" i="0" u="none" strike="noStrike">
+                          <a:solidFill>
+                            <a:srgbClr val="000000"/>
+                          </a:solidFill>
+                          <a:effectLst/>
+                          <a:latin typeface="Calibri" panose="020F0502020204030204" pitchFamily="34" charset="0"/>
+                        </a:rPr>
+                        <a:t>Juuso</a:t>
+                      </a:r>
+                    </a:p>
+                  </a:txBody>
+                  <a:tcPr marL="6350" marR="6350" marT="6350" marB="0" anchor="b">
+                    <a:lnL w="6350" cap="flat" cmpd="sng" algn="ctr">
+                      <a:solidFill>
+                        <a:srgbClr val="000000"/>
+                      </a:solidFill>
+                      <a:prstDash val="solid"/>
+                      <a:round/>
+                      <a:headEnd type="none" w="med" len="med"/>
+                      <a:tailEnd type="none" w="med" len="med"/>
+                    </a:lnL>
+                    <a:lnR w="6350" cap="flat" cmpd="sng" algn="ctr">
+                      <a:solidFill>
+                        <a:srgbClr val="000000"/>
+                      </a:solidFill>
+                      <a:prstDash val="solid"/>
+                      <a:round/>
+                      <a:headEnd type="none" w="med" len="med"/>
+                      <a:tailEnd type="none" w="med" len="med"/>
+                    </a:lnR>
+                    <a:lnT>
+                      <a:noFill/>
+                    </a:lnT>
+                    <a:lnB>
+                      <a:noFill/>
+                    </a:lnB>
+                    <a:solidFill>
+                      <a:srgbClr val="FFFFFF"/>
+                    </a:solidFill>
+                  </a:tcPr>
+                </a:tc>
+                <a:tc>
+                  <a:txBody>
+                    <a:bodyPr/>
+                    <a:lstStyle/>
+                    <a:p>
+                      <a:pPr algn="l" fontAlgn="b"/>
+                      <a:r>
+                        <a:rPr lang="fr-FR" sz="1100" b="0" i="0" u="none" strike="noStrike">
+                          <a:solidFill>
+                            <a:srgbClr val="000000"/>
+                          </a:solidFill>
+                          <a:effectLst/>
+                          <a:latin typeface="Calibri" panose="020F0502020204030204" pitchFamily="34" charset="0"/>
+                        </a:rPr>
+                        <a:t>Fair</a:t>
+                      </a:r>
+                    </a:p>
+                  </a:txBody>
+                  <a:tcPr marL="6350" marR="6350" marT="6350" marB="0" anchor="b">
+                    <a:lnL w="6350" cap="flat" cmpd="sng" algn="ctr">
+                      <a:solidFill>
+                        <a:srgbClr val="000000"/>
+                      </a:solidFill>
+                      <a:prstDash val="solid"/>
+                      <a:round/>
+                      <a:headEnd type="none" w="med" len="med"/>
+                      <a:tailEnd type="none" w="med" len="med"/>
+                    </a:lnL>
+                    <a:lnR w="6350" cap="flat" cmpd="sng" algn="ctr">
+                      <a:solidFill>
+                        <a:srgbClr val="000000"/>
+                      </a:solidFill>
+                      <a:prstDash val="solid"/>
+                      <a:round/>
+                      <a:headEnd type="none" w="med" len="med"/>
+                      <a:tailEnd type="none" w="med" len="med"/>
+                    </a:lnR>
+                    <a:lnT>
+                      <a:noFill/>
+                    </a:lnT>
+                    <a:lnB>
+                      <a:noFill/>
+                    </a:lnB>
+                    <a:solidFill>
+                      <a:srgbClr val="FFFFFF"/>
+                    </a:solidFill>
+                  </a:tcPr>
+                </a:tc>
+                <a:tc>
+                  <a:txBody>
+                    <a:bodyPr/>
+                    <a:lstStyle/>
+                    <a:p>
+                      <a:pPr algn="l" fontAlgn="b"/>
+                      <a:r>
+                        <a:rPr lang="fr-FR" sz="1100" b="0" i="0" u="none" strike="noStrike">
+                          <a:solidFill>
+                            <a:srgbClr val="000000"/>
+                          </a:solidFill>
+                          <a:effectLst/>
+                          <a:latin typeface="Calibri" panose="020F0502020204030204" pitchFamily="34" charset="0"/>
+                        </a:rPr>
+                        <a:t>Fair</a:t>
+                      </a:r>
+                    </a:p>
+                  </a:txBody>
+                  <a:tcPr marL="6350" marR="6350" marT="6350" marB="0" anchor="b">
+                    <a:lnL w="6350" cap="flat" cmpd="sng" algn="ctr">
+                      <a:solidFill>
+                        <a:srgbClr val="000000"/>
+                      </a:solidFill>
+                      <a:prstDash val="solid"/>
+                      <a:round/>
+                      <a:headEnd type="none" w="med" len="med"/>
+                      <a:tailEnd type="none" w="med" len="med"/>
+                    </a:lnL>
+                    <a:lnR w="6350" cap="flat" cmpd="sng" algn="ctr">
+                      <a:solidFill>
+                        <a:srgbClr val="000000"/>
+                      </a:solidFill>
+                      <a:prstDash val="solid"/>
+                      <a:round/>
+                      <a:headEnd type="none" w="med" len="med"/>
+                      <a:tailEnd type="none" w="med" len="med"/>
+                    </a:lnR>
+                    <a:lnT>
+                      <a:noFill/>
+                    </a:lnT>
+                    <a:lnB>
+                      <a:noFill/>
+                    </a:lnB>
+                    <a:solidFill>
+                      <a:srgbClr val="FFFFFF"/>
+                    </a:solidFill>
+                  </a:tcPr>
+                </a:tc>
+                <a:tc>
+                  <a:txBody>
+                    <a:bodyPr/>
+                    <a:lstStyle/>
+                    <a:p>
+                      <a:pPr algn="l" fontAlgn="b"/>
+                      <a:r>
+                        <a:rPr lang="fr-FR" sz="1100" b="0" i="0" u="none" strike="noStrike">
+                          <a:solidFill>
+                            <a:srgbClr val="000000"/>
+                          </a:solidFill>
+                          <a:effectLst/>
+                          <a:latin typeface="Calibri" panose="020F0502020204030204" pitchFamily="34" charset="0"/>
+                        </a:rPr>
+                        <a:t>Outstanding</a:t>
+                      </a:r>
+                    </a:p>
+                  </a:txBody>
+                  <a:tcPr marL="6350" marR="6350" marT="6350" marB="0" anchor="b">
+                    <a:lnL w="6350" cap="flat" cmpd="sng" algn="ctr">
+                      <a:solidFill>
+                        <a:srgbClr val="000000"/>
+                      </a:solidFill>
+                      <a:prstDash val="solid"/>
+                      <a:round/>
+                      <a:headEnd type="none" w="med" len="med"/>
+                      <a:tailEnd type="none" w="med" len="med"/>
+                    </a:lnL>
+                    <a:lnR w="6350" cap="flat" cmpd="sng" algn="ctr">
+                      <a:solidFill>
+                        <a:srgbClr val="000000"/>
+                      </a:solidFill>
+                      <a:prstDash val="solid"/>
+                      <a:round/>
+                      <a:headEnd type="none" w="med" len="med"/>
+                      <a:tailEnd type="none" w="med" len="med"/>
+                    </a:lnR>
+                    <a:lnT>
+                      <a:noFill/>
+                    </a:lnT>
+                    <a:lnB>
+                      <a:noFill/>
+                    </a:lnB>
+                    <a:solidFill>
+                      <a:srgbClr val="FFFFFF"/>
+                    </a:solidFill>
+                  </a:tcPr>
+                </a:tc>
+                <a:tc>
+                  <a:txBody>
+                    <a:bodyPr/>
+                    <a:lstStyle/>
+                    <a:p>
+                      <a:pPr algn="l" fontAlgn="b"/>
+                      <a:r>
+                        <a:rPr lang="fr-FR" sz="1100" b="0" i="0" u="none" strike="noStrike">
+                          <a:solidFill>
+                            <a:srgbClr val="FFFFFF"/>
+                          </a:solidFill>
+                          <a:effectLst/>
+                          <a:latin typeface="Calibri" panose="020F0502020204030204" pitchFamily="34" charset="0"/>
+                        </a:rPr>
+                        <a:t> </a:t>
+                      </a:r>
+                    </a:p>
+                  </a:txBody>
+                  <a:tcPr marL="6350" marR="6350" marT="6350" marB="0" anchor="b">
+                    <a:lnL w="6350" cap="flat" cmpd="sng" algn="ctr">
+                      <a:solidFill>
+                        <a:srgbClr val="000000"/>
+                      </a:solidFill>
+                      <a:prstDash val="solid"/>
+                      <a:round/>
+                      <a:headEnd type="none" w="med" len="med"/>
+                      <a:tailEnd type="none" w="med" len="med"/>
+                    </a:lnL>
+                    <a:lnR w="6350" cap="flat" cmpd="sng" algn="ctr">
+                      <a:solidFill>
+                        <a:srgbClr val="000000"/>
+                      </a:solidFill>
+                      <a:prstDash val="solid"/>
+                      <a:round/>
+                      <a:headEnd type="none" w="med" len="med"/>
+                      <a:tailEnd type="none" w="med" len="med"/>
+                    </a:lnR>
+                    <a:lnT>
+                      <a:noFill/>
+                    </a:lnT>
+                    <a:lnB>
+                      <a:noFill/>
+                    </a:lnB>
+                    <a:solidFill>
+                      <a:srgbClr val="4472C4"/>
+                    </a:solidFill>
+                  </a:tcPr>
+                </a:tc>
+                <a:tc>
+                  <a:txBody>
+                    <a:bodyPr/>
+                    <a:lstStyle/>
+                    <a:p>
+                      <a:pPr algn="l" fontAlgn="b"/>
+                      <a:r>
+                        <a:rPr lang="fr-FR" sz="1100" b="0" i="0" u="none" strike="noStrike">
+                          <a:solidFill>
+                            <a:srgbClr val="000000"/>
+                          </a:solidFill>
+                          <a:effectLst/>
+                          <a:latin typeface="Calibri" panose="020F0502020204030204" pitchFamily="34" charset="0"/>
+                        </a:rPr>
+                        <a:t>Fair</a:t>
+                      </a:r>
+                    </a:p>
+                  </a:txBody>
+                  <a:tcPr marL="6350" marR="6350" marT="6350" marB="0" anchor="b">
+                    <a:lnL w="6350" cap="flat" cmpd="sng" algn="ctr">
+                      <a:solidFill>
+                        <a:srgbClr val="000000"/>
+                      </a:solidFill>
+                      <a:prstDash val="solid"/>
+                      <a:round/>
+                      <a:headEnd type="none" w="med" len="med"/>
+                      <a:tailEnd type="none" w="med" len="med"/>
+                    </a:lnL>
+                    <a:lnR w="6350" cap="flat" cmpd="sng" algn="ctr">
+                      <a:solidFill>
+                        <a:srgbClr val="000000"/>
+                      </a:solidFill>
+                      <a:prstDash val="solid"/>
+                      <a:round/>
+                      <a:headEnd type="none" w="med" len="med"/>
+                      <a:tailEnd type="none" w="med" len="med"/>
+                    </a:lnR>
+                    <a:lnT>
+                      <a:noFill/>
+                    </a:lnT>
+                    <a:lnB>
+                      <a:noFill/>
+                    </a:lnB>
+                    <a:solidFill>
+                      <a:srgbClr val="FFFFFF"/>
+                    </a:solidFill>
+                  </a:tcPr>
+                </a:tc>
+                <a:tc>
+                  <a:txBody>
+                    <a:bodyPr/>
+                    <a:lstStyle/>
+                    <a:p>
+                      <a:pPr algn="l" fontAlgn="b"/>
+                      <a:r>
+                        <a:rPr lang="fr-FR" sz="1100" b="0" i="0" u="none" strike="noStrike">
+                          <a:solidFill>
+                            <a:srgbClr val="000000"/>
+                          </a:solidFill>
+                          <a:effectLst/>
+                          <a:latin typeface="Calibri" panose="020F0502020204030204" pitchFamily="34" charset="0"/>
+                        </a:rPr>
+                        <a:t>Fair</a:t>
+                      </a:r>
+                    </a:p>
+                  </a:txBody>
+                  <a:tcPr marL="6350" marR="6350" marT="6350" marB="0" anchor="b">
+                    <a:lnL w="6350" cap="flat" cmpd="sng" algn="ctr">
+                      <a:solidFill>
+                        <a:srgbClr val="000000"/>
+                      </a:solidFill>
+                      <a:prstDash val="solid"/>
+                      <a:round/>
+                      <a:headEnd type="none" w="med" len="med"/>
+                      <a:tailEnd type="none" w="med" len="med"/>
+                    </a:lnL>
+                    <a:lnR>
+                      <a:noFill/>
+                    </a:lnR>
+                    <a:lnT>
+                      <a:noFill/>
+                    </a:lnT>
+                    <a:lnB>
+                      <a:noFill/>
+                    </a:lnB>
+                    <a:solidFill>
+                      <a:srgbClr val="FFFFFF"/>
+                    </a:solidFill>
+                  </a:tcPr>
+                </a:tc>
+                <a:extLst>
+                  <a:ext uri="{0D108BD9-81ED-4DB2-BD59-A6C34878D82A}">
+                    <a16:rowId xmlns:a16="http://schemas.microsoft.com/office/drawing/2014/main" val="23070451"/>
+                  </a:ext>
+                </a:extLst>
+              </a:tr>
+              <a:tr h="382938">
+                <a:tc>
+                  <a:txBody>
+                    <a:bodyPr/>
+                    <a:lstStyle/>
+                    <a:p>
+                      <a:pPr algn="r" fontAlgn="b"/>
+                      <a:r>
+                        <a:rPr lang="fr-FR" sz="1100" b="0" i="0" u="none" strike="noStrike">
+                          <a:solidFill>
+                            <a:srgbClr val="000000"/>
+                          </a:solidFill>
+                          <a:effectLst/>
+                          <a:latin typeface="Calibri" panose="020F0502020204030204" pitchFamily="34" charset="0"/>
+                        </a:rPr>
+                        <a:t>4</a:t>
+                      </a:r>
+                    </a:p>
+                  </a:txBody>
+                  <a:tcPr marL="6350" marR="6350" marT="6350" marB="0" anchor="b">
+                    <a:lnL w="6350" cap="flat" cmpd="sng" algn="ctr">
+                      <a:solidFill>
+                        <a:srgbClr val="000000"/>
+                      </a:solidFill>
+                      <a:prstDash val="solid"/>
+                      <a:round/>
+                      <a:headEnd type="none" w="med" len="med"/>
+                      <a:tailEnd type="none" w="med" len="med"/>
+                    </a:lnL>
+                    <a:lnR w="6350" cap="flat" cmpd="sng" algn="ctr">
+                      <a:solidFill>
+                        <a:srgbClr val="000000"/>
+                      </a:solidFill>
+                      <a:prstDash val="solid"/>
+                      <a:round/>
+                      <a:headEnd type="none" w="med" len="med"/>
+                      <a:tailEnd type="none" w="med" len="med"/>
+                    </a:lnR>
+                    <a:lnT>
+                      <a:noFill/>
+                    </a:lnT>
+                    <a:lnB>
+                      <a:noFill/>
+                    </a:lnB>
+                    <a:solidFill>
+                      <a:srgbClr val="B4C6E7"/>
+                    </a:solidFill>
+                  </a:tcPr>
+                </a:tc>
+                <a:tc>
+                  <a:txBody>
+                    <a:bodyPr/>
+                    <a:lstStyle/>
+                    <a:p>
+                      <a:pPr algn="r" fontAlgn="b"/>
+                      <a:r>
+                        <a:rPr lang="fr-FR" sz="1100" b="0" i="0" u="none" strike="noStrike">
+                          <a:solidFill>
+                            <a:srgbClr val="000000"/>
+                          </a:solidFill>
+                          <a:effectLst/>
+                          <a:latin typeface="Calibri" panose="020F0502020204030204" pitchFamily="34" charset="0"/>
+                        </a:rPr>
+                        <a:t>1220379</a:t>
+                      </a:r>
+                    </a:p>
+                  </a:txBody>
+                  <a:tcPr marL="6350" marR="6350" marT="6350" marB="0" anchor="b">
+                    <a:lnL w="6350" cap="flat" cmpd="sng" algn="ctr">
+                      <a:solidFill>
+                        <a:srgbClr val="000000"/>
+                      </a:solidFill>
+                      <a:prstDash val="solid"/>
+                      <a:round/>
+                      <a:headEnd type="none" w="med" len="med"/>
+                      <a:tailEnd type="none" w="med" len="med"/>
+                    </a:lnL>
+                    <a:lnR w="6350" cap="flat" cmpd="sng" algn="ctr">
+                      <a:solidFill>
+                        <a:srgbClr val="000000"/>
+                      </a:solidFill>
+                      <a:prstDash val="solid"/>
+                      <a:round/>
+                      <a:headEnd type="none" w="med" len="med"/>
+                      <a:tailEnd type="none" w="med" len="med"/>
+                    </a:lnR>
+                    <a:lnT>
+                      <a:noFill/>
+                    </a:lnT>
+                    <a:lnB>
+                      <a:noFill/>
+                    </a:lnB>
+                    <a:solidFill>
+                      <a:srgbClr val="B4C6E7"/>
+                    </a:solidFill>
+                  </a:tcPr>
+                </a:tc>
+                <a:tc>
+                  <a:txBody>
+                    <a:bodyPr/>
+                    <a:lstStyle/>
+                    <a:p>
+                      <a:pPr algn="l" fontAlgn="b"/>
+                      <a:r>
+                        <a:rPr lang="fr-FR" sz="1100" b="0" i="0" u="none" strike="noStrike">
+                          <a:solidFill>
+                            <a:srgbClr val="000000"/>
+                          </a:solidFill>
+                          <a:effectLst/>
+                          <a:latin typeface="Calibri" panose="020F0502020204030204" pitchFamily="34" charset="0"/>
+                        </a:rPr>
+                        <a:t>Benjamin</a:t>
+                      </a:r>
+                    </a:p>
+                  </a:txBody>
+                  <a:tcPr marL="6350" marR="6350" marT="6350" marB="0" anchor="b">
+                    <a:lnL w="6350" cap="flat" cmpd="sng" algn="ctr">
+                      <a:solidFill>
+                        <a:srgbClr val="000000"/>
+                      </a:solidFill>
+                      <a:prstDash val="solid"/>
+                      <a:round/>
+                      <a:headEnd type="none" w="med" len="med"/>
+                      <a:tailEnd type="none" w="med" len="med"/>
+                    </a:lnL>
+                    <a:lnR w="6350" cap="flat" cmpd="sng" algn="ctr">
+                      <a:solidFill>
+                        <a:srgbClr val="000000"/>
+                      </a:solidFill>
+                      <a:prstDash val="solid"/>
+                      <a:round/>
+                      <a:headEnd type="none" w="med" len="med"/>
+                      <a:tailEnd type="none" w="med" len="med"/>
+                    </a:lnR>
+                    <a:lnT>
+                      <a:noFill/>
+                    </a:lnT>
+                    <a:lnB>
+                      <a:noFill/>
+                    </a:lnB>
+                    <a:solidFill>
+                      <a:srgbClr val="B4C6E7"/>
+                    </a:solidFill>
+                  </a:tcPr>
+                </a:tc>
+                <a:tc>
+                  <a:txBody>
+                    <a:bodyPr/>
+                    <a:lstStyle/>
+                    <a:p>
+                      <a:pPr algn="l" fontAlgn="b"/>
+                      <a:r>
+                        <a:rPr lang="fr-FR" sz="1100" b="0" i="0" u="none" strike="noStrike">
+                          <a:solidFill>
+                            <a:srgbClr val="000000"/>
+                          </a:solidFill>
+                          <a:effectLst/>
+                          <a:latin typeface="Calibri" panose="020F0502020204030204" pitchFamily="34" charset="0"/>
+                        </a:rPr>
+                        <a:t>Fair</a:t>
+                      </a:r>
+                    </a:p>
+                  </a:txBody>
+                  <a:tcPr marL="6350" marR="6350" marT="6350" marB="0" anchor="b">
+                    <a:lnL w="6350" cap="flat" cmpd="sng" algn="ctr">
+                      <a:solidFill>
+                        <a:srgbClr val="000000"/>
+                      </a:solidFill>
+                      <a:prstDash val="solid"/>
+                      <a:round/>
+                      <a:headEnd type="none" w="med" len="med"/>
+                      <a:tailEnd type="none" w="med" len="med"/>
+                    </a:lnL>
+                    <a:lnR w="6350" cap="flat" cmpd="sng" algn="ctr">
+                      <a:solidFill>
+                        <a:srgbClr val="000000"/>
+                      </a:solidFill>
+                      <a:prstDash val="solid"/>
+                      <a:round/>
+                      <a:headEnd type="none" w="med" len="med"/>
+                      <a:tailEnd type="none" w="med" len="med"/>
+                    </a:lnR>
+                    <a:lnT>
+                      <a:noFill/>
+                    </a:lnT>
+                    <a:lnB>
+                      <a:noFill/>
+                    </a:lnB>
+                    <a:solidFill>
+                      <a:srgbClr val="B4C6E7"/>
+                    </a:solidFill>
+                  </a:tcPr>
+                </a:tc>
+                <a:tc>
+                  <a:txBody>
+                    <a:bodyPr/>
+                    <a:lstStyle/>
+                    <a:p>
+                      <a:pPr algn="l" fontAlgn="b"/>
+                      <a:r>
+                        <a:rPr lang="fr-FR" sz="1100" b="0" i="0" u="none" strike="noStrike">
+                          <a:solidFill>
+                            <a:srgbClr val="000000"/>
+                          </a:solidFill>
+                          <a:effectLst/>
+                          <a:latin typeface="Calibri" panose="020F0502020204030204" pitchFamily="34" charset="0"/>
+                        </a:rPr>
+                        <a:t>Fair</a:t>
+                      </a:r>
+                    </a:p>
+                  </a:txBody>
+                  <a:tcPr marL="6350" marR="6350" marT="6350" marB="0" anchor="b">
+                    <a:lnL w="6350" cap="flat" cmpd="sng" algn="ctr">
+                      <a:solidFill>
+                        <a:srgbClr val="000000"/>
+                      </a:solidFill>
+                      <a:prstDash val="solid"/>
+                      <a:round/>
+                      <a:headEnd type="none" w="med" len="med"/>
+                      <a:tailEnd type="none" w="med" len="med"/>
+                    </a:lnL>
+                    <a:lnR w="6350" cap="flat" cmpd="sng" algn="ctr">
+                      <a:solidFill>
+                        <a:srgbClr val="000000"/>
+                      </a:solidFill>
+                      <a:prstDash val="solid"/>
+                      <a:round/>
+                      <a:headEnd type="none" w="med" len="med"/>
+                      <a:tailEnd type="none" w="med" len="med"/>
+                    </a:lnR>
+                    <a:lnT>
+                      <a:noFill/>
+                    </a:lnT>
+                    <a:lnB>
+                      <a:noFill/>
+                    </a:lnB>
+                    <a:solidFill>
+                      <a:srgbClr val="B4C6E7"/>
+                    </a:solidFill>
+                  </a:tcPr>
+                </a:tc>
+                <a:tc>
+                  <a:txBody>
+                    <a:bodyPr/>
+                    <a:lstStyle/>
+                    <a:p>
+                      <a:pPr algn="l" fontAlgn="b"/>
+                      <a:r>
+                        <a:rPr lang="fr-FR" sz="1100" b="0" i="0" u="none" strike="noStrike">
+                          <a:solidFill>
+                            <a:srgbClr val="000000"/>
+                          </a:solidFill>
+                          <a:effectLst/>
+                          <a:latin typeface="Calibri" panose="020F0502020204030204" pitchFamily="34" charset="0"/>
+                        </a:rPr>
+                        <a:t>Outstanding</a:t>
+                      </a:r>
+                    </a:p>
+                  </a:txBody>
+                  <a:tcPr marL="6350" marR="6350" marT="6350" marB="0" anchor="b">
+                    <a:lnL w="6350" cap="flat" cmpd="sng" algn="ctr">
+                      <a:solidFill>
+                        <a:srgbClr val="000000"/>
+                      </a:solidFill>
+                      <a:prstDash val="solid"/>
+                      <a:round/>
+                      <a:headEnd type="none" w="med" len="med"/>
+                      <a:tailEnd type="none" w="med" len="med"/>
+                    </a:lnL>
+                    <a:lnR w="6350" cap="flat" cmpd="sng" algn="ctr">
+                      <a:solidFill>
+                        <a:srgbClr val="000000"/>
+                      </a:solidFill>
+                      <a:prstDash val="solid"/>
+                      <a:round/>
+                      <a:headEnd type="none" w="med" len="med"/>
+                      <a:tailEnd type="none" w="med" len="med"/>
+                    </a:lnR>
+                    <a:lnT>
+                      <a:noFill/>
+                    </a:lnT>
+                    <a:lnB>
+                      <a:noFill/>
+                    </a:lnB>
+                    <a:solidFill>
+                      <a:srgbClr val="B4C6E7"/>
+                    </a:solidFill>
+                  </a:tcPr>
+                </a:tc>
+                <a:tc>
+                  <a:txBody>
+                    <a:bodyPr/>
+                    <a:lstStyle/>
+                    <a:p>
+                      <a:pPr algn="l" fontAlgn="b"/>
+                      <a:r>
+                        <a:rPr lang="fr-FR" sz="1100" b="0" i="0" u="none" strike="noStrike">
+                          <a:solidFill>
+                            <a:srgbClr val="000000"/>
+                          </a:solidFill>
+                          <a:effectLst/>
+                          <a:latin typeface="Calibri" panose="020F0502020204030204" pitchFamily="34" charset="0"/>
+                        </a:rPr>
+                        <a:t>Fair</a:t>
+                      </a:r>
+                    </a:p>
+                  </a:txBody>
+                  <a:tcPr marL="6350" marR="6350" marT="6350" marB="0" anchor="b">
+                    <a:lnL w="6350" cap="flat" cmpd="sng" algn="ctr">
+                      <a:solidFill>
+                        <a:srgbClr val="000000"/>
+                      </a:solidFill>
+                      <a:prstDash val="solid"/>
+                      <a:round/>
+                      <a:headEnd type="none" w="med" len="med"/>
+                      <a:tailEnd type="none" w="med" len="med"/>
+                    </a:lnL>
+                    <a:lnR w="6350" cap="flat" cmpd="sng" algn="ctr">
+                      <a:solidFill>
+                        <a:srgbClr val="000000"/>
+                      </a:solidFill>
+                      <a:prstDash val="solid"/>
+                      <a:round/>
+                      <a:headEnd type="none" w="med" len="med"/>
+                      <a:tailEnd type="none" w="med" len="med"/>
+                    </a:lnR>
+                    <a:lnT>
+                      <a:noFill/>
+                    </a:lnT>
+                    <a:lnB>
+                      <a:noFill/>
+                    </a:lnB>
+                    <a:solidFill>
+                      <a:srgbClr val="B4C6E7"/>
+                    </a:solidFill>
+                  </a:tcPr>
+                </a:tc>
+                <a:tc>
+                  <a:txBody>
+                    <a:bodyPr/>
+                    <a:lstStyle/>
+                    <a:p>
+                      <a:pPr algn="l" fontAlgn="b"/>
+                      <a:r>
+                        <a:rPr lang="fr-FR" sz="1100" b="0" i="0" u="none" strike="noStrike">
+                          <a:solidFill>
+                            <a:srgbClr val="FFFFFF"/>
+                          </a:solidFill>
+                          <a:effectLst/>
+                          <a:latin typeface="Calibri" panose="020F0502020204030204" pitchFamily="34" charset="0"/>
+                        </a:rPr>
+                        <a:t> </a:t>
+                      </a:r>
+                    </a:p>
+                  </a:txBody>
+                  <a:tcPr marL="6350" marR="6350" marT="6350" marB="0" anchor="b">
+                    <a:lnL w="6350" cap="flat" cmpd="sng" algn="ctr">
+                      <a:solidFill>
+                        <a:srgbClr val="000000"/>
+                      </a:solidFill>
+                      <a:prstDash val="solid"/>
+                      <a:round/>
+                      <a:headEnd type="none" w="med" len="med"/>
+                      <a:tailEnd type="none" w="med" len="med"/>
+                    </a:lnL>
+                    <a:lnR w="6350" cap="flat" cmpd="sng" algn="ctr">
+                      <a:solidFill>
+                        <a:srgbClr val="000000"/>
+                      </a:solidFill>
+                      <a:prstDash val="solid"/>
+                      <a:round/>
+                      <a:headEnd type="none" w="med" len="med"/>
+                      <a:tailEnd type="none" w="med" len="med"/>
+                    </a:lnR>
+                    <a:lnT>
+                      <a:noFill/>
+                    </a:lnT>
+                    <a:lnB>
+                      <a:noFill/>
+                    </a:lnB>
+                    <a:solidFill>
+                      <a:srgbClr val="4472C4"/>
+                    </a:solidFill>
+                  </a:tcPr>
+                </a:tc>
+                <a:tc>
+                  <a:txBody>
+                    <a:bodyPr/>
+                    <a:lstStyle/>
+                    <a:p>
+                      <a:pPr algn="l" fontAlgn="b"/>
+                      <a:r>
+                        <a:rPr lang="fr-FR" sz="1100" b="0" i="0" u="none" strike="noStrike">
+                          <a:solidFill>
+                            <a:srgbClr val="000000"/>
+                          </a:solidFill>
+                          <a:effectLst/>
+                          <a:latin typeface="Calibri" panose="020F0502020204030204" pitchFamily="34" charset="0"/>
+                        </a:rPr>
+                        <a:t>Fair</a:t>
+                      </a:r>
+                    </a:p>
+                  </a:txBody>
+                  <a:tcPr marL="6350" marR="6350" marT="6350" marB="0" anchor="b">
+                    <a:lnL w="6350" cap="flat" cmpd="sng" algn="ctr">
+                      <a:solidFill>
+                        <a:srgbClr val="000000"/>
+                      </a:solidFill>
+                      <a:prstDash val="solid"/>
+                      <a:round/>
+                      <a:headEnd type="none" w="med" len="med"/>
+                      <a:tailEnd type="none" w="med" len="med"/>
+                    </a:lnL>
+                    <a:lnR>
+                      <a:noFill/>
+                    </a:lnR>
+                    <a:lnT>
+                      <a:noFill/>
+                    </a:lnT>
+                    <a:lnB>
+                      <a:noFill/>
+                    </a:lnB>
+                    <a:solidFill>
+                      <a:srgbClr val="B4C6E7"/>
+                    </a:solidFill>
+                  </a:tcPr>
+                </a:tc>
+                <a:extLst>
+                  <a:ext uri="{0D108BD9-81ED-4DB2-BD59-A6C34878D82A}">
+                    <a16:rowId xmlns:a16="http://schemas.microsoft.com/office/drawing/2014/main" val="1181707898"/>
+                  </a:ext>
+                </a:extLst>
+              </a:tr>
+              <a:tr h="382938">
+                <a:tc>
+                  <a:txBody>
+                    <a:bodyPr/>
+                    <a:lstStyle/>
+                    <a:p>
+                      <a:pPr algn="r" fontAlgn="b"/>
+                      <a:r>
+                        <a:rPr lang="fr-FR" sz="1100" b="0" i="0" u="none" strike="noStrike">
+                          <a:solidFill>
+                            <a:srgbClr val="000000"/>
+                          </a:solidFill>
+                          <a:effectLst/>
+                          <a:latin typeface="Calibri" panose="020F0502020204030204" pitchFamily="34" charset="0"/>
+                        </a:rPr>
+                        <a:t>5</a:t>
+                      </a:r>
+                    </a:p>
+                  </a:txBody>
+                  <a:tcPr marL="6350" marR="6350" marT="6350" marB="0" anchor="b">
+                    <a:lnL w="6350" cap="flat" cmpd="sng" algn="ctr">
+                      <a:solidFill>
+                        <a:srgbClr val="000000"/>
+                      </a:solidFill>
+                      <a:prstDash val="solid"/>
+                      <a:round/>
+                      <a:headEnd type="none" w="med" len="med"/>
+                      <a:tailEnd type="none" w="med" len="med"/>
+                    </a:lnL>
+                    <a:lnR w="6350" cap="flat" cmpd="sng" algn="ctr">
+                      <a:solidFill>
+                        <a:srgbClr val="000000"/>
+                      </a:solidFill>
+                      <a:prstDash val="solid"/>
+                      <a:round/>
+                      <a:headEnd type="none" w="med" len="med"/>
+                      <a:tailEnd type="none" w="med" len="med"/>
+                    </a:lnR>
+                    <a:lnT>
+                      <a:noFill/>
+                    </a:lnT>
+                    <a:lnB w="6350" cap="flat" cmpd="sng" algn="ctr">
+                      <a:solidFill>
+                        <a:srgbClr val="000000"/>
+                      </a:solidFill>
+                      <a:prstDash val="solid"/>
+                      <a:round/>
+                      <a:headEnd type="none" w="med" len="med"/>
+                      <a:tailEnd type="none" w="med" len="med"/>
+                    </a:lnB>
+                    <a:solidFill>
+                      <a:srgbClr val="FFFFFF"/>
+                    </a:solidFill>
+                  </a:tcPr>
+                </a:tc>
+                <a:tc>
+                  <a:txBody>
+                    <a:bodyPr/>
+                    <a:lstStyle/>
+                    <a:p>
+                      <a:pPr algn="r" fontAlgn="b"/>
+                      <a:r>
+                        <a:rPr lang="fr-FR" sz="1100" b="0" i="0" u="none" strike="noStrike">
+                          <a:solidFill>
+                            <a:srgbClr val="000000"/>
+                          </a:solidFill>
+                          <a:effectLst/>
+                          <a:latin typeface="Calibri" panose="020F0502020204030204" pitchFamily="34" charset="0"/>
+                        </a:rPr>
+                        <a:t>1220459</a:t>
+                      </a:r>
+                    </a:p>
+                  </a:txBody>
+                  <a:tcPr marL="6350" marR="6350" marT="6350" marB="0" anchor="b">
+                    <a:lnL w="6350" cap="flat" cmpd="sng" algn="ctr">
+                      <a:solidFill>
+                        <a:srgbClr val="000000"/>
+                      </a:solidFill>
+                      <a:prstDash val="solid"/>
+                      <a:round/>
+                      <a:headEnd type="none" w="med" len="med"/>
+                      <a:tailEnd type="none" w="med" len="med"/>
+                    </a:lnL>
+                    <a:lnR w="6350" cap="flat" cmpd="sng" algn="ctr">
+                      <a:solidFill>
+                        <a:srgbClr val="000000"/>
+                      </a:solidFill>
+                      <a:prstDash val="solid"/>
+                      <a:round/>
+                      <a:headEnd type="none" w="med" len="med"/>
+                      <a:tailEnd type="none" w="med" len="med"/>
+                    </a:lnR>
+                    <a:lnT>
+                      <a:noFill/>
+                    </a:lnT>
+                    <a:lnB w="6350" cap="flat" cmpd="sng" algn="ctr">
+                      <a:solidFill>
+                        <a:srgbClr val="000000"/>
+                      </a:solidFill>
+                      <a:prstDash val="solid"/>
+                      <a:round/>
+                      <a:headEnd type="none" w="med" len="med"/>
+                      <a:tailEnd type="none" w="med" len="med"/>
+                    </a:lnB>
+                    <a:solidFill>
+                      <a:srgbClr val="FFFFFF"/>
+                    </a:solidFill>
+                  </a:tcPr>
+                </a:tc>
+                <a:tc>
+                  <a:txBody>
+                    <a:bodyPr/>
+                    <a:lstStyle/>
+                    <a:p>
+                      <a:pPr algn="l" fontAlgn="b"/>
+                      <a:r>
+                        <a:rPr lang="fr-FR" sz="1100" b="0" i="0" u="none" strike="noStrike">
+                          <a:solidFill>
+                            <a:srgbClr val="000000"/>
+                          </a:solidFill>
+                          <a:effectLst/>
+                          <a:latin typeface="Calibri" panose="020F0502020204030204" pitchFamily="34" charset="0"/>
+                        </a:rPr>
+                        <a:t>Patryk</a:t>
+                      </a:r>
+                    </a:p>
+                  </a:txBody>
+                  <a:tcPr marL="6350" marR="6350" marT="6350" marB="0" anchor="b">
+                    <a:lnL w="6350" cap="flat" cmpd="sng" algn="ctr">
+                      <a:solidFill>
+                        <a:srgbClr val="000000"/>
+                      </a:solidFill>
+                      <a:prstDash val="solid"/>
+                      <a:round/>
+                      <a:headEnd type="none" w="med" len="med"/>
+                      <a:tailEnd type="none" w="med" len="med"/>
+                    </a:lnL>
+                    <a:lnR w="6350" cap="flat" cmpd="sng" algn="ctr">
+                      <a:solidFill>
+                        <a:srgbClr val="000000"/>
+                      </a:solidFill>
+                      <a:prstDash val="solid"/>
+                      <a:round/>
+                      <a:headEnd type="none" w="med" len="med"/>
+                      <a:tailEnd type="none" w="med" len="med"/>
+                    </a:lnR>
+                    <a:lnT>
+                      <a:noFill/>
+                    </a:lnT>
+                    <a:lnB w="6350" cap="flat" cmpd="sng" algn="ctr">
+                      <a:solidFill>
+                        <a:srgbClr val="000000"/>
+                      </a:solidFill>
+                      <a:prstDash val="solid"/>
+                      <a:round/>
+                      <a:headEnd type="none" w="med" len="med"/>
+                      <a:tailEnd type="none" w="med" len="med"/>
+                    </a:lnB>
+                    <a:solidFill>
+                      <a:srgbClr val="FFFFFF"/>
+                    </a:solidFill>
+                  </a:tcPr>
+                </a:tc>
+                <a:tc>
+                  <a:txBody>
+                    <a:bodyPr/>
+                    <a:lstStyle/>
+                    <a:p>
+                      <a:pPr algn="l" fontAlgn="b"/>
+                      <a:r>
+                        <a:rPr lang="fr-FR" sz="1100" b="0" i="0" u="none" strike="noStrike">
+                          <a:solidFill>
+                            <a:srgbClr val="000000"/>
+                          </a:solidFill>
+                          <a:effectLst/>
+                          <a:latin typeface="Calibri" panose="020F0502020204030204" pitchFamily="34" charset="0"/>
+                        </a:rPr>
+                        <a:t>Fair</a:t>
+                      </a:r>
+                    </a:p>
+                  </a:txBody>
+                  <a:tcPr marL="6350" marR="6350" marT="6350" marB="0" anchor="b">
+                    <a:lnL w="6350" cap="flat" cmpd="sng" algn="ctr">
+                      <a:solidFill>
+                        <a:srgbClr val="000000"/>
+                      </a:solidFill>
+                      <a:prstDash val="solid"/>
+                      <a:round/>
+                      <a:headEnd type="none" w="med" len="med"/>
+                      <a:tailEnd type="none" w="med" len="med"/>
+                    </a:lnL>
+                    <a:lnR w="6350" cap="flat" cmpd="sng" algn="ctr">
+                      <a:solidFill>
+                        <a:srgbClr val="000000"/>
+                      </a:solidFill>
+                      <a:prstDash val="solid"/>
+                      <a:round/>
+                      <a:headEnd type="none" w="med" len="med"/>
+                      <a:tailEnd type="none" w="med" len="med"/>
+                    </a:lnR>
+                    <a:lnT>
+                      <a:noFill/>
+                    </a:lnT>
+                    <a:lnB w="6350" cap="flat" cmpd="sng" algn="ctr">
+                      <a:solidFill>
+                        <a:srgbClr val="000000"/>
+                      </a:solidFill>
+                      <a:prstDash val="solid"/>
+                      <a:round/>
+                      <a:headEnd type="none" w="med" len="med"/>
+                      <a:tailEnd type="none" w="med" len="med"/>
+                    </a:lnB>
+                    <a:solidFill>
+                      <a:srgbClr val="FFFFFF"/>
+                    </a:solidFill>
+                  </a:tcPr>
+                </a:tc>
+                <a:tc>
+                  <a:txBody>
+                    <a:bodyPr/>
+                    <a:lstStyle/>
+                    <a:p>
+                      <a:pPr algn="l" fontAlgn="b"/>
+                      <a:r>
+                        <a:rPr lang="fr-FR" sz="1100" b="0" i="0" u="none" strike="noStrike">
+                          <a:solidFill>
+                            <a:srgbClr val="000000"/>
+                          </a:solidFill>
+                          <a:effectLst/>
+                          <a:latin typeface="Calibri" panose="020F0502020204030204" pitchFamily="34" charset="0"/>
+                        </a:rPr>
+                        <a:t>Fair</a:t>
+                      </a:r>
+                    </a:p>
+                  </a:txBody>
+                  <a:tcPr marL="6350" marR="6350" marT="6350" marB="0" anchor="b">
+                    <a:lnL w="6350" cap="flat" cmpd="sng" algn="ctr">
+                      <a:solidFill>
+                        <a:srgbClr val="000000"/>
+                      </a:solidFill>
+                      <a:prstDash val="solid"/>
+                      <a:round/>
+                      <a:headEnd type="none" w="med" len="med"/>
+                      <a:tailEnd type="none" w="med" len="med"/>
+                    </a:lnL>
+                    <a:lnR w="6350" cap="flat" cmpd="sng" algn="ctr">
+                      <a:solidFill>
+                        <a:srgbClr val="000000"/>
+                      </a:solidFill>
+                      <a:prstDash val="solid"/>
+                      <a:round/>
+                      <a:headEnd type="none" w="med" len="med"/>
+                      <a:tailEnd type="none" w="med" len="med"/>
+                    </a:lnR>
+                    <a:lnT>
+                      <a:noFill/>
+                    </a:lnT>
+                    <a:lnB w="6350" cap="flat" cmpd="sng" algn="ctr">
+                      <a:solidFill>
+                        <a:srgbClr val="000000"/>
+                      </a:solidFill>
+                      <a:prstDash val="solid"/>
+                      <a:round/>
+                      <a:headEnd type="none" w="med" len="med"/>
+                      <a:tailEnd type="none" w="med" len="med"/>
+                    </a:lnB>
+                    <a:solidFill>
+                      <a:srgbClr val="FFFFFF"/>
+                    </a:solidFill>
+                  </a:tcPr>
+                </a:tc>
+                <a:tc>
+                  <a:txBody>
+                    <a:bodyPr/>
+                    <a:lstStyle/>
+                    <a:p>
+                      <a:pPr algn="l" fontAlgn="b"/>
+                      <a:r>
+                        <a:rPr lang="fr-FR" sz="1100" b="0" i="0" u="none" strike="noStrike">
+                          <a:solidFill>
+                            <a:srgbClr val="000000"/>
+                          </a:solidFill>
+                          <a:effectLst/>
+                          <a:latin typeface="Calibri" panose="020F0502020204030204" pitchFamily="34" charset="0"/>
+                        </a:rPr>
+                        <a:t>Outstanding</a:t>
+                      </a:r>
+                    </a:p>
+                  </a:txBody>
+                  <a:tcPr marL="6350" marR="6350" marT="6350" marB="0" anchor="b">
+                    <a:lnL w="6350" cap="flat" cmpd="sng" algn="ctr">
+                      <a:solidFill>
+                        <a:srgbClr val="000000"/>
+                      </a:solidFill>
+                      <a:prstDash val="solid"/>
+                      <a:round/>
+                      <a:headEnd type="none" w="med" len="med"/>
+                      <a:tailEnd type="none" w="med" len="med"/>
+                    </a:lnL>
+                    <a:lnR w="6350" cap="flat" cmpd="sng" algn="ctr">
+                      <a:solidFill>
+                        <a:srgbClr val="000000"/>
+                      </a:solidFill>
+                      <a:prstDash val="solid"/>
+                      <a:round/>
+                      <a:headEnd type="none" w="med" len="med"/>
+                      <a:tailEnd type="none" w="med" len="med"/>
+                    </a:lnR>
+                    <a:lnT>
+                      <a:noFill/>
+                    </a:lnT>
+                    <a:lnB w="6350" cap="flat" cmpd="sng" algn="ctr">
+                      <a:solidFill>
+                        <a:srgbClr val="000000"/>
+                      </a:solidFill>
+                      <a:prstDash val="solid"/>
+                      <a:round/>
+                      <a:headEnd type="none" w="med" len="med"/>
+                      <a:tailEnd type="none" w="med" len="med"/>
+                    </a:lnB>
+                    <a:solidFill>
+                      <a:srgbClr val="FFFFFF"/>
+                    </a:solidFill>
+                  </a:tcPr>
+                </a:tc>
+                <a:tc>
+                  <a:txBody>
+                    <a:bodyPr/>
+                    <a:lstStyle/>
+                    <a:p>
+                      <a:pPr algn="l" fontAlgn="b"/>
+                      <a:r>
+                        <a:rPr lang="fr-FR" sz="1100" b="0" i="0" u="none" strike="noStrike">
+                          <a:solidFill>
+                            <a:srgbClr val="000000"/>
+                          </a:solidFill>
+                          <a:effectLst/>
+                          <a:latin typeface="Calibri" panose="020F0502020204030204" pitchFamily="34" charset="0"/>
+                        </a:rPr>
+                        <a:t>Fair</a:t>
+                      </a:r>
+                    </a:p>
+                  </a:txBody>
+                  <a:tcPr marL="6350" marR="6350" marT="6350" marB="0" anchor="b">
+                    <a:lnL w="6350" cap="flat" cmpd="sng" algn="ctr">
+                      <a:solidFill>
+                        <a:srgbClr val="000000"/>
+                      </a:solidFill>
+                      <a:prstDash val="solid"/>
+                      <a:round/>
+                      <a:headEnd type="none" w="med" len="med"/>
+                      <a:tailEnd type="none" w="med" len="med"/>
+                    </a:lnL>
+                    <a:lnR w="6350" cap="flat" cmpd="sng" algn="ctr">
+                      <a:solidFill>
+                        <a:srgbClr val="000000"/>
+                      </a:solidFill>
+                      <a:prstDash val="solid"/>
+                      <a:round/>
+                      <a:headEnd type="none" w="med" len="med"/>
+                      <a:tailEnd type="none" w="med" len="med"/>
+                    </a:lnR>
+                    <a:lnT>
+                      <a:noFill/>
+                    </a:lnT>
+                    <a:lnB w="6350" cap="flat" cmpd="sng" algn="ctr">
+                      <a:solidFill>
+                        <a:srgbClr val="000000"/>
+                      </a:solidFill>
+                      <a:prstDash val="solid"/>
+                      <a:round/>
+                      <a:headEnd type="none" w="med" len="med"/>
+                      <a:tailEnd type="none" w="med" len="med"/>
+                    </a:lnB>
+                    <a:solidFill>
+                      <a:srgbClr val="FFFFFF"/>
+                    </a:solidFill>
+                  </a:tcPr>
+                </a:tc>
+                <a:tc>
+                  <a:txBody>
+                    <a:bodyPr/>
+                    <a:lstStyle/>
+                    <a:p>
+                      <a:pPr algn="l" fontAlgn="b"/>
+                      <a:r>
+                        <a:rPr lang="fr-FR" sz="1100" b="0" i="0" u="none" strike="noStrike">
+                          <a:solidFill>
+                            <a:srgbClr val="000000"/>
+                          </a:solidFill>
+                          <a:effectLst/>
+                          <a:latin typeface="Calibri" panose="020F0502020204030204" pitchFamily="34" charset="0"/>
+                        </a:rPr>
+                        <a:t>Fair</a:t>
+                      </a:r>
+                    </a:p>
+                  </a:txBody>
+                  <a:tcPr marL="6350" marR="6350" marT="6350" marB="0" anchor="b">
+                    <a:lnL w="6350" cap="flat" cmpd="sng" algn="ctr">
+                      <a:solidFill>
+                        <a:srgbClr val="000000"/>
+                      </a:solidFill>
+                      <a:prstDash val="solid"/>
+                      <a:round/>
+                      <a:headEnd type="none" w="med" len="med"/>
+                      <a:tailEnd type="none" w="med" len="med"/>
+                    </a:lnL>
+                    <a:lnR w="6350" cap="flat" cmpd="sng" algn="ctr">
+                      <a:solidFill>
+                        <a:srgbClr val="000000"/>
+                      </a:solidFill>
+                      <a:prstDash val="solid"/>
+                      <a:round/>
+                      <a:headEnd type="none" w="med" len="med"/>
+                      <a:tailEnd type="none" w="med" len="med"/>
+                    </a:lnR>
+                    <a:lnT>
+                      <a:noFill/>
+                    </a:lnT>
+                    <a:lnB w="6350" cap="flat" cmpd="sng" algn="ctr">
+                      <a:solidFill>
+                        <a:srgbClr val="000000"/>
+                      </a:solidFill>
+                      <a:prstDash val="solid"/>
+                      <a:round/>
+                      <a:headEnd type="none" w="med" len="med"/>
+                      <a:tailEnd type="none" w="med" len="med"/>
+                    </a:lnB>
+                    <a:solidFill>
+                      <a:srgbClr val="FFFFFF"/>
+                    </a:solidFill>
+                  </a:tcPr>
+                </a:tc>
+                <a:tc>
+                  <a:txBody>
+                    <a:bodyPr/>
+                    <a:lstStyle/>
+                    <a:p>
+                      <a:pPr algn="l" fontAlgn="b"/>
+                      <a:r>
+                        <a:rPr lang="fr-FR" sz="1100" b="0" i="0" u="none" strike="noStrike" dirty="0">
+                          <a:solidFill>
+                            <a:srgbClr val="FFFFFF"/>
+                          </a:solidFill>
+                          <a:effectLst/>
+                          <a:latin typeface="Calibri" panose="020F0502020204030204" pitchFamily="34" charset="0"/>
+                        </a:rPr>
+                        <a:t> </a:t>
+                      </a:r>
+                    </a:p>
+                  </a:txBody>
+                  <a:tcPr marL="6350" marR="6350" marT="6350" marB="0" anchor="b">
+                    <a:lnL w="6350" cap="flat" cmpd="sng" algn="ctr">
+                      <a:solidFill>
+                        <a:srgbClr val="000000"/>
+                      </a:solidFill>
+                      <a:prstDash val="solid"/>
+                      <a:round/>
+                      <a:headEnd type="none" w="med" len="med"/>
+                      <a:tailEnd type="none" w="med" len="med"/>
+                    </a:lnL>
+                    <a:lnR w="6350" cap="flat" cmpd="sng" algn="ctr">
+                      <a:solidFill>
+                        <a:srgbClr val="000000"/>
+                      </a:solidFill>
+                      <a:prstDash val="solid"/>
+                      <a:round/>
+                      <a:headEnd type="none" w="med" len="med"/>
+                      <a:tailEnd type="none" w="med" len="med"/>
+                    </a:lnR>
+                    <a:lnT>
+                      <a:noFill/>
+                    </a:lnT>
+                    <a:lnB w="6350" cap="flat" cmpd="sng" algn="ctr">
+                      <a:solidFill>
+                        <a:srgbClr val="000000"/>
+                      </a:solidFill>
+                      <a:prstDash val="solid"/>
+                      <a:round/>
+                      <a:headEnd type="none" w="med" len="med"/>
+                      <a:tailEnd type="none" w="med" len="med"/>
+                    </a:lnB>
+                    <a:solidFill>
+                      <a:srgbClr val="4472C4"/>
+                    </a:solidFill>
+                  </a:tcPr>
+                </a:tc>
+                <a:extLst>
+                  <a:ext uri="{0D108BD9-81ED-4DB2-BD59-A6C34878D82A}">
+                    <a16:rowId xmlns:a16="http://schemas.microsoft.com/office/drawing/2014/main" val="861357310"/>
+                  </a:ext>
+                </a:extLst>
+              </a:tr>
+            </a:tbl>
+          </a:graphicData>
+        </a:graphic>
+      </p:graphicFrame>
+    </p:spTree>
+    <p:extLst>
+      <p:ext uri="{BB962C8B-B14F-4D97-AF65-F5344CB8AC3E}">
+        <p14:creationId xmlns:p14="http://schemas.microsoft.com/office/powerpoint/2010/main" val="2328434891"/>
+      </p:ext>
+    </p:extLst>
+  </p:cSld>
+  <p:clrMapOvr>
+    <a:masterClrMapping/>
+  </p:clrMapOvr>
+</p:sld>
+</file>
+
+<file path=ppt/slides/slide11.xml><?xml version="1.0" encoding="utf-8"?>
+<p:sld xmlns:a="http://schemas.openxmlformats.org/drawingml/2006/main" xmlns:r="http://schemas.openxmlformats.org/officeDocument/2006/relationships" xmlns:p="http://schemas.openxmlformats.org/presentationml/2006/main">
+  <p:cSld>
+    <p:bg>
+      <p:bgPr>
+        <a:gradFill flip="none" rotWithShape="1">
+          <a:gsLst>
+            <a:gs pos="0">
+              <a:schemeClr val="accent2">
+                <a:lumMod val="94000"/>
+              </a:schemeClr>
+            </a:gs>
+            <a:gs pos="46000">
+              <a:schemeClr val="accent2">
+                <a:lumMod val="64000"/>
+              </a:schemeClr>
+            </a:gs>
+            <a:gs pos="100000">
+              <a:schemeClr val="accent2">
+                <a:lumMod val="60000"/>
+              </a:schemeClr>
+            </a:gs>
+          </a:gsLst>
+          <a:path path="circle">
+            <a:fillToRect l="50000" t="130000" r="50000" b="-30000"/>
+          </a:path>
+          <a:tileRect/>
+        </a:gradFill>
+        <a:effectLst/>
+      </p:bgPr>
+    </p:bg>
+    <p:spTree>
+      <p:nvGrpSpPr>
+        <p:cNvPr id="1" name=""/>
+        <p:cNvGrpSpPr/>
+        <p:nvPr/>
+      </p:nvGrpSpPr>
+      <p:grpSpPr>
+        <a:xfrm>
+          <a:off x="0" y="0"/>
+          <a:ext cx="0" cy="0"/>
+          <a:chOff x="0" y="0"/>
+          <a:chExt cx="0" cy="0"/>
+        </a:xfrm>
+      </p:grpSpPr>
+      <p:sp>
+        <p:nvSpPr>
+          <p:cNvPr id="2" name="Titre 1">
+            <a:extLst>
+              <a:ext uri="{FF2B5EF4-FFF2-40B4-BE49-F238E27FC236}">
+                <a16:creationId xmlns:a16="http://schemas.microsoft.com/office/drawing/2014/main" id="{04B8AE57-027B-D80E-35E3-A20E9A18B0C9}"/>
+              </a:ext>
+            </a:extLst>
+          </p:cNvPr>
+          <p:cNvSpPr>
+            <a:spLocks noGrp="1"/>
+          </p:cNvSpPr>
+          <p:nvPr>
+            <p:ph type="title"/>
+          </p:nvPr>
+        </p:nvSpPr>
+        <p:spPr/>
+        <p:txBody>
+          <a:bodyPr>
+            <a:normAutofit fontScale="90000"/>
+          </a:bodyPr>
+          <a:lstStyle/>
+          <a:p>
+            <a:r>
+              <a:rPr lang="fr-FR" dirty="0" err="1"/>
+              <a:t>Title</a:t>
+            </a:r>
+            <a:br>
+              <a:rPr lang="fr-FR" dirty="0"/>
+            </a:br>
+            <a:endParaRPr lang="fr-FR" dirty="0"/>
+          </a:p>
+        </p:txBody>
+      </p:sp>
+      <p:sp>
+        <p:nvSpPr>
+          <p:cNvPr id="3" name="Espace réservé du contenu 2">
+            <a:extLst>
+              <a:ext uri="{FF2B5EF4-FFF2-40B4-BE49-F238E27FC236}">
+                <a16:creationId xmlns:a16="http://schemas.microsoft.com/office/drawing/2014/main" id="{18625F91-2B4A-33FA-10FE-C75D20C74CEF}"/>
+              </a:ext>
+            </a:extLst>
+          </p:cNvPr>
+          <p:cNvSpPr>
+            <a:spLocks noGrp="1"/>
+          </p:cNvSpPr>
+          <p:nvPr>
+            <p:ph idx="1"/>
+          </p:nvPr>
+        </p:nvSpPr>
+        <p:spPr/>
+        <p:txBody>
+          <a:bodyPr/>
+          <a:lstStyle/>
+          <a:p>
+            <a:endParaRPr lang="fr-FR" dirty="0"/>
+          </a:p>
+        </p:txBody>
+      </p:sp>
+      <p:sp>
+        <p:nvSpPr>
+          <p:cNvPr id="4" name="Espace réservé du numéro de diapositive 3">
+            <a:extLst>
+              <a:ext uri="{FF2B5EF4-FFF2-40B4-BE49-F238E27FC236}">
+                <a16:creationId xmlns:a16="http://schemas.microsoft.com/office/drawing/2014/main" id="{F24BEE6C-26EC-EBA8-1F53-8B9C9B19143F}"/>
+              </a:ext>
+            </a:extLst>
+          </p:cNvPr>
+          <p:cNvSpPr>
+            <a:spLocks noGrp="1"/>
+          </p:cNvSpPr>
+          <p:nvPr>
+            <p:ph type="sldNum" sz="quarter" idx="12"/>
+          </p:nvPr>
+        </p:nvSpPr>
+        <p:spPr/>
+        <p:txBody>
+          <a:bodyPr/>
+          <a:lstStyle/>
+          <a:p>
+            <a:fld id="{DBA1B0FB-D917-4C8C-928F-313BD683BF39}" type="slidenum">
+              <a:rPr lang="en-US" smtClean="0"/>
+              <a:t>11</a:t>
+            </a:fld>
+            <a:endParaRPr lang="en-US"/>
+          </a:p>
+        </p:txBody>
+      </p:sp>
+    </p:spTree>
+    <p:extLst>
+      <p:ext uri="{BB962C8B-B14F-4D97-AF65-F5344CB8AC3E}">
+        <p14:creationId xmlns:p14="http://schemas.microsoft.com/office/powerpoint/2010/main" val="2376072543"/>
+      </p:ext>
+    </p:extLst>
+  </p:cSld>
+  <p:clrMapOvr>
+    <a:masterClrMapping/>
+  </p:clrMapOvr>
+</p:sld>
+</file>
+
 <file path=ppt/slides/slide2.xml><?xml version="1.0" encoding="utf-8"?>
 <p:sld xmlns:a="http://schemas.openxmlformats.org/drawingml/2006/main" xmlns:r="http://schemas.openxmlformats.org/officeDocument/2006/relationships" xmlns:p="http://schemas.openxmlformats.org/presentationml/2006/main">
   <p:cSld>
@@ -8929,41 +12620,57 @@
         </p:nvSpPr>
         <p:spPr/>
         <p:txBody>
-          <a:bodyPr/>
+          <a:bodyPr>
+            <a:normAutofit fontScale="90000"/>
+          </a:bodyPr>
           <a:lstStyle/>
           <a:p>
             <a:r>
-              <a:rPr lang="fr-FR" dirty="0"/>
-              <a:t>version control system</a:t>
+              <a:rPr lang="en-US" dirty="0"/>
+              <a:t>Agile, incremental and iterative work process</a:t>
             </a:r>
+            <a:endParaRPr lang="fr-FR" dirty="0"/>
           </a:p>
         </p:txBody>
       </p:sp>
-      <p:sp>
-        <p:nvSpPr>
-          <p:cNvPr id="3" name="Espace réservé du contenu 2">
+      <p:pic>
+        <p:nvPicPr>
+          <p:cNvPr id="6" name="Espace réservé du contenu 5" descr="Réunion avec un remplissage uni">
             <a:extLst>
               <a:ext uri="{FF2B5EF4-FFF2-40B4-BE49-F238E27FC236}">
-                <a16:creationId xmlns:a16="http://schemas.microsoft.com/office/drawing/2014/main" id="{18625F91-2B4A-33FA-10FE-C75D20C74CEF}"/>
+                <a16:creationId xmlns:a16="http://schemas.microsoft.com/office/drawing/2014/main" id="{31B37E84-B145-528D-D7D7-CA7372DB9916}"/>
               </a:ext>
             </a:extLst>
           </p:cNvPr>
-          <p:cNvSpPr>
-            <a:spLocks noGrp="1"/>
-          </p:cNvSpPr>
+          <p:cNvPicPr>
+            <a:picLocks noGrp="1" noChangeAspect="1"/>
+          </p:cNvPicPr>
           <p:nvPr>
             <p:ph idx="1"/>
           </p:nvPr>
-        </p:nvSpPr>
-        <p:spPr/>
-        <p:txBody>
-          <a:bodyPr/>
-          <a:lstStyle/>
-          <a:p>
-            <a:endParaRPr lang="fr-FR" dirty="0"/>
-          </a:p>
-        </p:txBody>
-      </p:sp>
+        </p:nvPicPr>
+        <p:blipFill>
+          <a:blip r:embed="rId2">
+            <a:extLst>
+              <a:ext uri="{28A0092B-C50C-407E-A947-70E740481C1C}">
+                <a14:useLocalDpi xmlns:a14="http://schemas.microsoft.com/office/drawing/2010/main" val="0"/>
+              </a:ext>
+              <a:ext uri="{96DAC541-7B7A-43D3-8B79-37D633B846F1}">
+                <asvg:svgBlip xmlns:asvg="http://schemas.microsoft.com/office/drawing/2016/SVG/main" r:embed="rId3"/>
+              </a:ext>
+            </a:extLst>
+          </a:blip>
+          <a:stretch>
+            <a:fillRect/>
+          </a:stretch>
+        </p:blipFill>
+        <p:spPr>
+          <a:xfrm>
+            <a:off x="9415462" y="1451133"/>
+            <a:ext cx="1603057" cy="1603057"/>
+          </a:xfrm>
+        </p:spPr>
+      </p:pic>
       <p:sp>
         <p:nvSpPr>
           <p:cNvPr id="4" name="Espace réservé du numéro de diapositive 3">
@@ -8996,7 +12703,7 @@
     </p:spTree>
     <p:extLst>
       <p:ext uri="{BB962C8B-B14F-4D97-AF65-F5344CB8AC3E}">
-        <p14:creationId xmlns:p14="http://schemas.microsoft.com/office/powerpoint/2010/main" val="963031257"/>
+        <p14:creationId xmlns:p14="http://schemas.microsoft.com/office/powerpoint/2010/main" val="269381164"/>
       </p:ext>
     </p:extLst>
   </p:cSld>
@@ -9073,37 +12780,70 @@
           <a:lstStyle/>
           <a:p>
             <a:r>
+              <a:rPr lang="fr-FR" dirty="0" err="1"/>
+              <a:t>Definition</a:t>
+            </a:r>
+            <a:r>
               <a:rPr lang="fr-FR" dirty="0"/>
-              <a:t>version control system</a:t>
+              <a:t> of </a:t>
+            </a:r>
+            <a:r>
+              <a:rPr lang="fr-FR" dirty="0" err="1"/>
+              <a:t>Ready</a:t>
+            </a:r>
+            <a:r>
+              <a:rPr lang="fr-FR" dirty="0"/>
+              <a:t> and </a:t>
+            </a:r>
+            <a:r>
+              <a:rPr lang="fr-FR" dirty="0" err="1"/>
+              <a:t>Done</a:t>
+            </a:r>
+            <a:r>
+              <a:rPr lang="fr-FR" dirty="0"/>
+              <a:t> (DOR/DOD)</a:t>
             </a:r>
           </a:p>
         </p:txBody>
       </p:sp>
-      <p:sp>
-        <p:nvSpPr>
-          <p:cNvPr id="3" name="Espace réservé du contenu 2">
+      <p:pic>
+        <p:nvPicPr>
+          <p:cNvPr id="6" name="Espace réservé du contenu 5" descr="Liste de contrôle avec un remplissage uni">
             <a:extLst>
               <a:ext uri="{FF2B5EF4-FFF2-40B4-BE49-F238E27FC236}">
-                <a16:creationId xmlns:a16="http://schemas.microsoft.com/office/drawing/2014/main" id="{18625F91-2B4A-33FA-10FE-C75D20C74CEF}"/>
+                <a16:creationId xmlns:a16="http://schemas.microsoft.com/office/drawing/2014/main" id="{8B7F4040-ED06-2C6C-8800-FE20B2272285}"/>
               </a:ext>
             </a:extLst>
           </p:cNvPr>
-          <p:cNvSpPr>
-            <a:spLocks noGrp="1"/>
-          </p:cNvSpPr>
+          <p:cNvPicPr>
+            <a:picLocks noGrp="1" noChangeAspect="1"/>
+          </p:cNvPicPr>
           <p:nvPr>
             <p:ph idx="1"/>
           </p:nvPr>
-        </p:nvSpPr>
-        <p:spPr/>
-        <p:txBody>
-          <a:bodyPr/>
-          <a:lstStyle/>
-          <a:p>
-            <a:endParaRPr lang="fr-FR" dirty="0"/>
-          </a:p>
-        </p:txBody>
-      </p:sp>
+        </p:nvPicPr>
+        <p:blipFill>
+          <a:blip r:embed="rId2">
+            <a:extLst>
+              <a:ext uri="{28A0092B-C50C-407E-A947-70E740481C1C}">
+                <a14:useLocalDpi xmlns:a14="http://schemas.microsoft.com/office/drawing/2010/main" val="0"/>
+              </a:ext>
+              <a:ext uri="{96DAC541-7B7A-43D3-8B79-37D633B846F1}">
+                <asvg:svgBlip xmlns:asvg="http://schemas.microsoft.com/office/drawing/2016/SVG/main" r:embed="rId3"/>
+              </a:ext>
+            </a:extLst>
+          </a:blip>
+          <a:stretch>
+            <a:fillRect/>
+          </a:stretch>
+        </p:blipFill>
+        <p:spPr>
+          <a:xfrm>
+            <a:off x="9166543" y="1864360"/>
+            <a:ext cx="1564640" cy="1564640"/>
+          </a:xfrm>
+        </p:spPr>
+      </p:pic>
       <p:sp>
         <p:nvSpPr>
           <p:cNvPr id="4" name="Espace réservé du numéro de diapositive 3">
@@ -9214,36 +12954,54 @@
           <a:p>
             <a:r>
               <a:rPr lang="fr-FR" dirty="0"/>
-              <a:t>version control system</a:t>
+              <a:t>Planning and </a:t>
             </a:r>
+            <a:r>
+              <a:rPr lang="fr-FR" dirty="0" err="1"/>
+              <a:t>Preparation</a:t>
+            </a:r>
+            <a:endParaRPr lang="fr-FR" dirty="0"/>
           </a:p>
         </p:txBody>
       </p:sp>
-      <p:sp>
-        <p:nvSpPr>
-          <p:cNvPr id="3" name="Espace réservé du contenu 2">
+      <p:pic>
+        <p:nvPicPr>
+          <p:cNvPr id="6" name="Espace réservé du contenu 5" descr="Diagramme de Gantt avec un remplissage uni">
             <a:extLst>
               <a:ext uri="{FF2B5EF4-FFF2-40B4-BE49-F238E27FC236}">
-                <a16:creationId xmlns:a16="http://schemas.microsoft.com/office/drawing/2014/main" id="{18625F91-2B4A-33FA-10FE-C75D20C74CEF}"/>
+                <a16:creationId xmlns:a16="http://schemas.microsoft.com/office/drawing/2014/main" id="{92470238-F78A-2ED6-1919-834BA6A19C07}"/>
               </a:ext>
             </a:extLst>
           </p:cNvPr>
-          <p:cNvSpPr>
-            <a:spLocks noGrp="1"/>
-          </p:cNvSpPr>
+          <p:cNvPicPr>
+            <a:picLocks noGrp="1" noChangeAspect="1"/>
+          </p:cNvPicPr>
           <p:nvPr>
             <p:ph idx="1"/>
           </p:nvPr>
-        </p:nvSpPr>
-        <p:spPr/>
-        <p:txBody>
-          <a:bodyPr/>
-          <a:lstStyle/>
-          <a:p>
-            <a:endParaRPr lang="fr-FR" dirty="0"/>
-          </a:p>
-        </p:txBody>
-      </p:sp>
+        </p:nvPicPr>
+        <p:blipFill>
+          <a:blip r:embed="rId2">
+            <a:extLst>
+              <a:ext uri="{28A0092B-C50C-407E-A947-70E740481C1C}">
+                <a14:useLocalDpi xmlns:a14="http://schemas.microsoft.com/office/drawing/2010/main" val="0"/>
+              </a:ext>
+              <a:ext uri="{96DAC541-7B7A-43D3-8B79-37D633B846F1}">
+                <asvg:svgBlip xmlns:asvg="http://schemas.microsoft.com/office/drawing/2016/SVG/main" r:embed="rId3"/>
+              </a:ext>
+            </a:extLst>
+          </a:blip>
+          <a:stretch>
+            <a:fillRect/>
+          </a:stretch>
+        </p:blipFill>
+        <p:spPr>
+          <a:xfrm>
+            <a:off x="8453120" y="1215275"/>
+            <a:ext cx="1879600" cy="1879600"/>
+          </a:xfrm>
+        </p:spPr>
+      </p:pic>
       <p:sp>
         <p:nvSpPr>
           <p:cNvPr id="4" name="Espace réservé du numéro de diapositive 3">
@@ -9353,9 +13111,725 @@
           <a:lstStyle/>
           <a:p>
             <a:r>
+              <a:rPr lang="fr-FR" dirty="0" err="1"/>
+              <a:t>Burndown</a:t>
+            </a:r>
+            <a:r>
               <a:rPr lang="fr-FR" dirty="0"/>
-              <a:t>version control system</a:t>
+              <a:t> Chart</a:t>
             </a:r>
+          </a:p>
+        </p:txBody>
+      </p:sp>
+      <p:pic>
+        <p:nvPicPr>
+          <p:cNvPr id="6" name="Espace réservé du contenu 5" descr="Graphique de tendance à la baisse avec un remplissage uni">
+            <a:extLst>
+              <a:ext uri="{FF2B5EF4-FFF2-40B4-BE49-F238E27FC236}">
+                <a16:creationId xmlns:a16="http://schemas.microsoft.com/office/drawing/2014/main" id="{DCA8CA24-5C3B-3D72-B552-C6EF4A6BB3ED}"/>
+              </a:ext>
+            </a:extLst>
+          </p:cNvPr>
+          <p:cNvPicPr>
+            <a:picLocks noGrp="1" noChangeAspect="1"/>
+          </p:cNvPicPr>
+          <p:nvPr>
+            <p:ph idx="1"/>
+          </p:nvPr>
+        </p:nvPicPr>
+        <p:blipFill>
+          <a:blip r:embed="rId2">
+            <a:extLst>
+              <a:ext uri="{28A0092B-C50C-407E-A947-70E740481C1C}">
+                <a14:useLocalDpi xmlns:a14="http://schemas.microsoft.com/office/drawing/2010/main" val="0"/>
+              </a:ext>
+              <a:ext uri="{96DAC541-7B7A-43D3-8B79-37D633B846F1}">
+                <asvg:svgBlip xmlns:asvg="http://schemas.microsoft.com/office/drawing/2016/SVG/main" r:embed="rId3"/>
+              </a:ext>
+            </a:extLst>
+          </a:blip>
+          <a:stretch>
+            <a:fillRect/>
+          </a:stretch>
+        </p:blipFill>
+        <p:spPr>
+          <a:xfrm>
+            <a:off x="8818879" y="1270186"/>
+            <a:ext cx="1759903" cy="1759903"/>
+          </a:xfrm>
+        </p:spPr>
+      </p:pic>
+      <p:sp>
+        <p:nvSpPr>
+          <p:cNvPr id="4" name="Espace réservé du numéro de diapositive 3">
+            <a:extLst>
+              <a:ext uri="{FF2B5EF4-FFF2-40B4-BE49-F238E27FC236}">
+                <a16:creationId xmlns:a16="http://schemas.microsoft.com/office/drawing/2014/main" id="{F24BEE6C-26EC-EBA8-1F53-8B9C9B19143F}"/>
+              </a:ext>
+            </a:extLst>
+          </p:cNvPr>
+          <p:cNvSpPr>
+            <a:spLocks noGrp="1"/>
+          </p:cNvSpPr>
+          <p:nvPr>
+            <p:ph type="sldNum" sz="quarter" idx="12"/>
+          </p:nvPr>
+        </p:nvSpPr>
+        <p:spPr/>
+        <p:txBody>
+          <a:bodyPr/>
+          <a:lstStyle/>
+          <a:p>
+            <a:fld id="{DBA1B0FB-D917-4C8C-928F-313BD683BF39}" type="slidenum">
+              <a:rPr lang="en-US" smtClean="0"/>
+              <a:t>5</a:t>
+            </a:fld>
+            <a:endParaRPr lang="en-US"/>
+          </a:p>
+        </p:txBody>
+      </p:sp>
+    </p:spTree>
+    <p:extLst>
+      <p:ext uri="{BB962C8B-B14F-4D97-AF65-F5344CB8AC3E}">
+        <p14:creationId xmlns:p14="http://schemas.microsoft.com/office/powerpoint/2010/main" val="2674168687"/>
+      </p:ext>
+    </p:extLst>
+  </p:cSld>
+  <p:clrMapOvr>
+    <a:masterClrMapping/>
+  </p:clrMapOvr>
+</p:sld>
+</file>
+
+<file path=ppt/slides/slide6.xml><?xml version="1.0" encoding="utf-8"?>
+<p:sld xmlns:a="http://schemas.openxmlformats.org/drawingml/2006/main" xmlns:r="http://schemas.openxmlformats.org/officeDocument/2006/relationships" xmlns:p="http://schemas.openxmlformats.org/presentationml/2006/main">
+  <p:cSld>
+    <p:bg>
+      <p:bgPr>
+        <a:gradFill flip="none" rotWithShape="1">
+          <a:gsLst>
+            <a:gs pos="0">
+              <a:schemeClr val="accent2">
+                <a:lumMod val="94000"/>
+              </a:schemeClr>
+            </a:gs>
+            <a:gs pos="46000">
+              <a:schemeClr val="accent2">
+                <a:lumMod val="64000"/>
+              </a:schemeClr>
+            </a:gs>
+            <a:gs pos="100000">
+              <a:schemeClr val="accent2">
+                <a:lumMod val="60000"/>
+              </a:schemeClr>
+            </a:gs>
+          </a:gsLst>
+          <a:path path="circle">
+            <a:fillToRect l="50000" t="130000" r="50000" b="-30000"/>
+          </a:path>
+          <a:tileRect/>
+        </a:gradFill>
+        <a:effectLst/>
+      </p:bgPr>
+    </p:bg>
+    <p:spTree>
+      <p:nvGrpSpPr>
+        <p:cNvPr id="1" name=""/>
+        <p:cNvGrpSpPr/>
+        <p:nvPr/>
+      </p:nvGrpSpPr>
+      <p:grpSpPr>
+        <a:xfrm>
+          <a:off x="0" y="0"/>
+          <a:ext cx="0" cy="0"/>
+          <a:chOff x="0" y="0"/>
+          <a:chExt cx="0" cy="0"/>
+        </a:xfrm>
+      </p:grpSpPr>
+      <p:sp>
+        <p:nvSpPr>
+          <p:cNvPr id="2" name="Titre 1">
+            <a:extLst>
+              <a:ext uri="{FF2B5EF4-FFF2-40B4-BE49-F238E27FC236}">
+                <a16:creationId xmlns:a16="http://schemas.microsoft.com/office/drawing/2014/main" id="{04B8AE57-027B-D80E-35E3-A20E9A18B0C9}"/>
+              </a:ext>
+            </a:extLst>
+          </p:cNvPr>
+          <p:cNvSpPr>
+            <a:spLocks noGrp="1"/>
+          </p:cNvSpPr>
+          <p:nvPr>
+            <p:ph type="title"/>
+          </p:nvPr>
+        </p:nvSpPr>
+        <p:spPr/>
+        <p:txBody>
+          <a:bodyPr>
+            <a:normAutofit/>
+          </a:bodyPr>
+          <a:lstStyle/>
+          <a:p>
+            <a:r>
+              <a:rPr lang="fr-FR" dirty="0" err="1"/>
+              <a:t>Retrospective</a:t>
+            </a:r>
+            <a:endParaRPr lang="fr-FR" dirty="0"/>
+          </a:p>
+        </p:txBody>
+      </p:sp>
+      <p:pic>
+        <p:nvPicPr>
+          <p:cNvPr id="6" name="Espace réservé du contenu 5" descr="Début avec un remplissage uni">
+            <a:extLst>
+              <a:ext uri="{FF2B5EF4-FFF2-40B4-BE49-F238E27FC236}">
+                <a16:creationId xmlns:a16="http://schemas.microsoft.com/office/drawing/2014/main" id="{EC6F4340-43D4-7738-DA91-AFE338CCBB0C}"/>
+              </a:ext>
+            </a:extLst>
+          </p:cNvPr>
+          <p:cNvPicPr>
+            <a:picLocks noGrp="1" noChangeAspect="1"/>
+          </p:cNvPicPr>
+          <p:nvPr>
+            <p:ph idx="1"/>
+          </p:nvPr>
+        </p:nvPicPr>
+        <p:blipFill>
+          <a:blip r:embed="rId2">
+            <a:extLst>
+              <a:ext uri="{28A0092B-C50C-407E-A947-70E740481C1C}">
+                <a14:useLocalDpi xmlns:a14="http://schemas.microsoft.com/office/drawing/2010/main" val="0"/>
+              </a:ext>
+              <a:ext uri="{96DAC541-7B7A-43D3-8B79-37D633B846F1}">
+                <asvg:svgBlip xmlns:asvg="http://schemas.microsoft.com/office/drawing/2016/SVG/main" r:embed="rId3"/>
+              </a:ext>
+            </a:extLst>
+          </a:blip>
+          <a:stretch>
+            <a:fillRect/>
+          </a:stretch>
+        </p:blipFill>
+        <p:spPr>
+          <a:xfrm>
+            <a:off x="9469120" y="1149755"/>
+            <a:ext cx="1463040" cy="1463040"/>
+          </a:xfrm>
+        </p:spPr>
+      </p:pic>
+      <p:sp>
+        <p:nvSpPr>
+          <p:cNvPr id="4" name="Espace réservé du numéro de diapositive 3">
+            <a:extLst>
+              <a:ext uri="{FF2B5EF4-FFF2-40B4-BE49-F238E27FC236}">
+                <a16:creationId xmlns:a16="http://schemas.microsoft.com/office/drawing/2014/main" id="{F24BEE6C-26EC-EBA8-1F53-8B9C9B19143F}"/>
+              </a:ext>
+            </a:extLst>
+          </p:cNvPr>
+          <p:cNvSpPr>
+            <a:spLocks noGrp="1"/>
+          </p:cNvSpPr>
+          <p:nvPr>
+            <p:ph type="sldNum" sz="quarter" idx="12"/>
+          </p:nvPr>
+        </p:nvSpPr>
+        <p:spPr/>
+        <p:txBody>
+          <a:bodyPr/>
+          <a:lstStyle/>
+          <a:p>
+            <a:fld id="{DBA1B0FB-D917-4C8C-928F-313BD683BF39}" type="slidenum">
+              <a:rPr lang="en-US" smtClean="0"/>
+              <a:t>6</a:t>
+            </a:fld>
+            <a:endParaRPr lang="en-US"/>
+          </a:p>
+        </p:txBody>
+      </p:sp>
+    </p:spTree>
+    <p:extLst>
+      <p:ext uri="{BB962C8B-B14F-4D97-AF65-F5344CB8AC3E}">
+        <p14:creationId xmlns:p14="http://schemas.microsoft.com/office/powerpoint/2010/main" val="585179285"/>
+      </p:ext>
+    </p:extLst>
+  </p:cSld>
+  <p:clrMapOvr>
+    <a:masterClrMapping/>
+  </p:clrMapOvr>
+</p:sld>
+</file>
+
+<file path=ppt/slides/slide7.xml><?xml version="1.0" encoding="utf-8"?>
+<p:sld xmlns:a="http://schemas.openxmlformats.org/drawingml/2006/main" xmlns:r="http://schemas.openxmlformats.org/officeDocument/2006/relationships" xmlns:p="http://schemas.openxmlformats.org/presentationml/2006/main">
+  <p:cSld>
+    <p:bg>
+      <p:bgPr>
+        <a:gradFill flip="none" rotWithShape="1">
+          <a:gsLst>
+            <a:gs pos="0">
+              <a:schemeClr val="accent2">
+                <a:lumMod val="94000"/>
+              </a:schemeClr>
+            </a:gs>
+            <a:gs pos="46000">
+              <a:schemeClr val="accent2">
+                <a:lumMod val="64000"/>
+              </a:schemeClr>
+            </a:gs>
+            <a:gs pos="100000">
+              <a:schemeClr val="accent2">
+                <a:lumMod val="60000"/>
+              </a:schemeClr>
+            </a:gs>
+          </a:gsLst>
+          <a:path path="circle">
+            <a:fillToRect l="50000" t="130000" r="50000" b="-30000"/>
+          </a:path>
+          <a:tileRect/>
+        </a:gradFill>
+        <a:effectLst/>
+      </p:bgPr>
+    </p:bg>
+    <p:spTree>
+      <p:nvGrpSpPr>
+        <p:cNvPr id="1" name=""/>
+        <p:cNvGrpSpPr/>
+        <p:nvPr/>
+      </p:nvGrpSpPr>
+      <p:grpSpPr>
+        <a:xfrm>
+          <a:off x="0" y="0"/>
+          <a:ext cx="0" cy="0"/>
+          <a:chOff x="0" y="0"/>
+          <a:chExt cx="0" cy="0"/>
+        </a:xfrm>
+      </p:grpSpPr>
+      <p:sp>
+        <p:nvSpPr>
+          <p:cNvPr id="2" name="Titre 1">
+            <a:extLst>
+              <a:ext uri="{FF2B5EF4-FFF2-40B4-BE49-F238E27FC236}">
+                <a16:creationId xmlns:a16="http://schemas.microsoft.com/office/drawing/2014/main" id="{04B8AE57-027B-D80E-35E3-A20E9A18B0C9}"/>
+              </a:ext>
+            </a:extLst>
+          </p:cNvPr>
+          <p:cNvSpPr>
+            <a:spLocks noGrp="1"/>
+          </p:cNvSpPr>
+          <p:nvPr>
+            <p:ph type="title"/>
+          </p:nvPr>
+        </p:nvSpPr>
+        <p:spPr/>
+        <p:txBody>
+          <a:bodyPr>
+            <a:normAutofit fontScale="90000"/>
+          </a:bodyPr>
+          <a:lstStyle/>
+          <a:p>
+            <a:r>
+              <a:rPr lang="fr-FR" dirty="0"/>
+              <a:t>Software engineering process</a:t>
+            </a:r>
+            <a:br>
+              <a:rPr lang="fr-FR" dirty="0"/>
+            </a:br>
+            <a:endParaRPr lang="fr-FR" dirty="0"/>
+          </a:p>
+        </p:txBody>
+      </p:sp>
+      <p:pic>
+        <p:nvPicPr>
+          <p:cNvPr id="6" name="Espace réservé du contenu 5" descr="Écran avec un remplissage uni">
+            <a:extLst>
+              <a:ext uri="{FF2B5EF4-FFF2-40B4-BE49-F238E27FC236}">
+                <a16:creationId xmlns:a16="http://schemas.microsoft.com/office/drawing/2014/main" id="{0698FAB5-8A39-FAD1-2097-C24FE16B08F0}"/>
+              </a:ext>
+            </a:extLst>
+          </p:cNvPr>
+          <p:cNvPicPr>
+            <a:picLocks noGrp="1" noChangeAspect="1"/>
+          </p:cNvPicPr>
+          <p:nvPr>
+            <p:ph idx="1"/>
+          </p:nvPr>
+        </p:nvPicPr>
+        <p:blipFill>
+          <a:blip r:embed="rId2">
+            <a:extLst>
+              <a:ext uri="{28A0092B-C50C-407E-A947-70E740481C1C}">
+                <a14:useLocalDpi xmlns:a14="http://schemas.microsoft.com/office/drawing/2010/main" val="0"/>
+              </a:ext>
+              <a:ext uri="{96DAC541-7B7A-43D3-8B79-37D633B846F1}">
+                <asvg:svgBlip xmlns:asvg="http://schemas.microsoft.com/office/drawing/2016/SVG/main" r:embed="rId3"/>
+              </a:ext>
+            </a:extLst>
+          </a:blip>
+          <a:stretch>
+            <a:fillRect/>
+          </a:stretch>
+        </p:blipFill>
+        <p:spPr>
+          <a:xfrm>
+            <a:off x="9565640" y="690809"/>
+            <a:ext cx="1828800" cy="1828800"/>
+          </a:xfrm>
+        </p:spPr>
+      </p:pic>
+      <p:sp>
+        <p:nvSpPr>
+          <p:cNvPr id="4" name="Espace réservé du numéro de diapositive 3">
+            <a:extLst>
+              <a:ext uri="{FF2B5EF4-FFF2-40B4-BE49-F238E27FC236}">
+                <a16:creationId xmlns:a16="http://schemas.microsoft.com/office/drawing/2014/main" id="{F24BEE6C-26EC-EBA8-1F53-8B9C9B19143F}"/>
+              </a:ext>
+            </a:extLst>
+          </p:cNvPr>
+          <p:cNvSpPr>
+            <a:spLocks noGrp="1"/>
+          </p:cNvSpPr>
+          <p:nvPr>
+            <p:ph type="sldNum" sz="quarter" idx="12"/>
+          </p:nvPr>
+        </p:nvSpPr>
+        <p:spPr/>
+        <p:txBody>
+          <a:bodyPr/>
+          <a:lstStyle/>
+          <a:p>
+            <a:fld id="{DBA1B0FB-D917-4C8C-928F-313BD683BF39}" type="slidenum">
+              <a:rPr lang="en-US" smtClean="0"/>
+              <a:t>7</a:t>
+            </a:fld>
+            <a:endParaRPr lang="en-US"/>
+          </a:p>
+        </p:txBody>
+      </p:sp>
+      <p:pic>
+        <p:nvPicPr>
+          <p:cNvPr id="8" name="Graphique 7" descr="Ampoule et engrenage avec un remplissage uni">
+            <a:extLst>
+              <a:ext uri="{FF2B5EF4-FFF2-40B4-BE49-F238E27FC236}">
+                <a16:creationId xmlns:a16="http://schemas.microsoft.com/office/drawing/2014/main" id="{20D678FD-F4F3-59B6-4485-4598665F2391}"/>
+              </a:ext>
+            </a:extLst>
+          </p:cNvPr>
+          <p:cNvPicPr>
+            <a:picLocks noChangeAspect="1"/>
+          </p:cNvPicPr>
+          <p:nvPr/>
+        </p:nvPicPr>
+        <p:blipFill>
+          <a:blip r:embed="rId4">
+            <a:extLst>
+              <a:ext uri="{28A0092B-C50C-407E-A947-70E740481C1C}">
+                <a14:useLocalDpi xmlns:a14="http://schemas.microsoft.com/office/drawing/2010/main" val="0"/>
+              </a:ext>
+              <a:ext uri="{96DAC541-7B7A-43D3-8B79-37D633B846F1}">
+                <asvg:svgBlip xmlns:asvg="http://schemas.microsoft.com/office/drawing/2016/SVG/main" r:embed="rId5"/>
+              </a:ext>
+            </a:extLst>
+          </a:blip>
+          <a:stretch>
+            <a:fillRect/>
+          </a:stretch>
+        </p:blipFill>
+        <p:spPr>
+          <a:xfrm>
+            <a:off x="10083800" y="1084870"/>
+            <a:ext cx="796405" cy="796405"/>
+          </a:xfrm>
+          <a:prstGeom prst="rect">
+            <a:avLst/>
+          </a:prstGeom>
+        </p:spPr>
+      </p:pic>
+      <p:pic>
+        <p:nvPicPr>
+          <p:cNvPr id="23" name="Graphique 22" descr="Ethernet avec un remplissage uni">
+            <a:extLst>
+              <a:ext uri="{FF2B5EF4-FFF2-40B4-BE49-F238E27FC236}">
+                <a16:creationId xmlns:a16="http://schemas.microsoft.com/office/drawing/2014/main" id="{474415F1-4111-8BC4-08AF-12FD279EB98F}"/>
+              </a:ext>
+            </a:extLst>
+          </p:cNvPr>
+          <p:cNvPicPr>
+            <a:picLocks noChangeAspect="1"/>
+          </p:cNvPicPr>
+          <p:nvPr/>
+        </p:nvPicPr>
+        <p:blipFill>
+          <a:blip r:embed="rId6">
+            <a:extLst>
+              <a:ext uri="{28A0092B-C50C-407E-A947-70E740481C1C}">
+                <a14:useLocalDpi xmlns:a14="http://schemas.microsoft.com/office/drawing/2010/main" val="0"/>
+              </a:ext>
+              <a:ext uri="{96DAC541-7B7A-43D3-8B79-37D633B846F1}">
+                <asvg:svgBlip xmlns:asvg="http://schemas.microsoft.com/office/drawing/2016/SVG/main" r:embed="rId7"/>
+              </a:ext>
+            </a:extLst>
+          </a:blip>
+          <a:stretch>
+            <a:fillRect/>
+          </a:stretch>
+        </p:blipFill>
+        <p:spPr>
+          <a:xfrm>
+            <a:off x="10670333" y="1520678"/>
+            <a:ext cx="460383" cy="460383"/>
+          </a:xfrm>
+          <a:prstGeom prst="rect">
+            <a:avLst/>
+          </a:prstGeom>
+        </p:spPr>
+      </p:pic>
+    </p:spTree>
+    <p:extLst>
+      <p:ext uri="{BB962C8B-B14F-4D97-AF65-F5344CB8AC3E}">
+        <p14:creationId xmlns:p14="http://schemas.microsoft.com/office/powerpoint/2010/main" val="19121730"/>
+      </p:ext>
+    </p:extLst>
+  </p:cSld>
+  <p:clrMapOvr>
+    <a:masterClrMapping/>
+  </p:clrMapOvr>
+</p:sld>
+</file>
+
+<file path=ppt/slides/slide8.xml><?xml version="1.0" encoding="utf-8"?>
+<p:sld xmlns:a="http://schemas.openxmlformats.org/drawingml/2006/main" xmlns:r="http://schemas.openxmlformats.org/officeDocument/2006/relationships" xmlns:p="http://schemas.openxmlformats.org/presentationml/2006/main">
+  <p:cSld>
+    <p:bg>
+      <p:bgPr>
+        <a:gradFill flip="none" rotWithShape="1">
+          <a:gsLst>
+            <a:gs pos="0">
+              <a:schemeClr val="accent2">
+                <a:lumMod val="94000"/>
+              </a:schemeClr>
+            </a:gs>
+            <a:gs pos="46000">
+              <a:schemeClr val="accent2">
+                <a:lumMod val="64000"/>
+              </a:schemeClr>
+            </a:gs>
+            <a:gs pos="100000">
+              <a:schemeClr val="accent2">
+                <a:lumMod val="60000"/>
+              </a:schemeClr>
+            </a:gs>
+          </a:gsLst>
+          <a:path path="circle">
+            <a:fillToRect l="50000" t="130000" r="50000" b="-30000"/>
+          </a:path>
+          <a:tileRect/>
+        </a:gradFill>
+        <a:effectLst/>
+      </p:bgPr>
+    </p:bg>
+    <p:spTree>
+      <p:nvGrpSpPr>
+        <p:cNvPr id="1" name=""/>
+        <p:cNvGrpSpPr/>
+        <p:nvPr/>
+      </p:nvGrpSpPr>
+      <p:grpSpPr>
+        <a:xfrm>
+          <a:off x="0" y="0"/>
+          <a:ext cx="0" cy="0"/>
+          <a:chOff x="0" y="0"/>
+          <a:chExt cx="0" cy="0"/>
+        </a:xfrm>
+      </p:grpSpPr>
+      <p:sp>
+        <p:nvSpPr>
+          <p:cNvPr id="2" name="Titre 1">
+            <a:extLst>
+              <a:ext uri="{FF2B5EF4-FFF2-40B4-BE49-F238E27FC236}">
+                <a16:creationId xmlns:a16="http://schemas.microsoft.com/office/drawing/2014/main" id="{04B8AE57-027B-D80E-35E3-A20E9A18B0C9}"/>
+              </a:ext>
+            </a:extLst>
+          </p:cNvPr>
+          <p:cNvSpPr>
+            <a:spLocks noGrp="1"/>
+          </p:cNvSpPr>
+          <p:nvPr>
+            <p:ph type="title"/>
+          </p:nvPr>
+        </p:nvSpPr>
+        <p:spPr/>
+        <p:txBody>
+          <a:bodyPr>
+            <a:normAutofit/>
+          </a:bodyPr>
+          <a:lstStyle/>
+          <a:p>
+            <a:r>
+              <a:rPr lang="en-US" dirty="0"/>
+              <a:t>Coherence and integration of the solution</a:t>
+            </a:r>
+            <a:endParaRPr lang="fr-FR" dirty="0"/>
+          </a:p>
+        </p:txBody>
+      </p:sp>
+      <p:pic>
+        <p:nvPicPr>
+          <p:cNvPr id="6" name="Espace réservé du contenu 5" descr="Engrenages avec un remplissage uni">
+            <a:extLst>
+              <a:ext uri="{FF2B5EF4-FFF2-40B4-BE49-F238E27FC236}">
+                <a16:creationId xmlns:a16="http://schemas.microsoft.com/office/drawing/2014/main" id="{401F2CD8-F45D-8234-16F1-E5301BED8D30}"/>
+              </a:ext>
+            </a:extLst>
+          </p:cNvPr>
+          <p:cNvPicPr>
+            <a:picLocks noGrp="1" noChangeAspect="1"/>
+          </p:cNvPicPr>
+          <p:nvPr>
+            <p:ph idx="1"/>
+          </p:nvPr>
+        </p:nvPicPr>
+        <p:blipFill>
+          <a:blip r:embed="rId2">
+            <a:extLst>
+              <a:ext uri="{28A0092B-C50C-407E-A947-70E740481C1C}">
+                <a14:useLocalDpi xmlns:a14="http://schemas.microsoft.com/office/drawing/2010/main" val="0"/>
+              </a:ext>
+              <a:ext uri="{96DAC541-7B7A-43D3-8B79-37D633B846F1}">
+                <asvg:svgBlip xmlns:asvg="http://schemas.microsoft.com/office/drawing/2016/SVG/main" r:embed="rId3"/>
+              </a:ext>
+            </a:extLst>
+          </a:blip>
+          <a:stretch>
+            <a:fillRect/>
+          </a:stretch>
+        </p:blipFill>
+        <p:spPr>
+          <a:xfrm>
+            <a:off x="10058400" y="1552734"/>
+            <a:ext cx="1259840" cy="1259840"/>
+          </a:xfrm>
+        </p:spPr>
+      </p:pic>
+      <p:sp>
+        <p:nvSpPr>
+          <p:cNvPr id="4" name="Espace réservé du numéro de diapositive 3">
+            <a:extLst>
+              <a:ext uri="{FF2B5EF4-FFF2-40B4-BE49-F238E27FC236}">
+                <a16:creationId xmlns:a16="http://schemas.microsoft.com/office/drawing/2014/main" id="{F24BEE6C-26EC-EBA8-1F53-8B9C9B19143F}"/>
+              </a:ext>
+            </a:extLst>
+          </p:cNvPr>
+          <p:cNvSpPr>
+            <a:spLocks noGrp="1"/>
+          </p:cNvSpPr>
+          <p:nvPr>
+            <p:ph type="sldNum" sz="quarter" idx="12"/>
+          </p:nvPr>
+        </p:nvSpPr>
+        <p:spPr/>
+        <p:txBody>
+          <a:bodyPr/>
+          <a:lstStyle/>
+          <a:p>
+            <a:fld id="{DBA1B0FB-D917-4C8C-928F-313BD683BF39}" type="slidenum">
+              <a:rPr lang="en-US" smtClean="0"/>
+              <a:t>8</a:t>
+            </a:fld>
+            <a:endParaRPr lang="en-US"/>
+          </a:p>
+        </p:txBody>
+      </p:sp>
+    </p:spTree>
+    <p:extLst>
+      <p:ext uri="{BB962C8B-B14F-4D97-AF65-F5344CB8AC3E}">
+        <p14:creationId xmlns:p14="http://schemas.microsoft.com/office/powerpoint/2010/main" val="4180544722"/>
+      </p:ext>
+    </p:extLst>
+  </p:cSld>
+  <p:clrMapOvr>
+    <a:masterClrMapping/>
+  </p:clrMapOvr>
+</p:sld>
+</file>
+
+<file path=ppt/slides/slide9.xml><?xml version="1.0" encoding="utf-8"?>
+<p:sld xmlns:a="http://schemas.openxmlformats.org/drawingml/2006/main" xmlns:r="http://schemas.openxmlformats.org/officeDocument/2006/relationships" xmlns:p="http://schemas.openxmlformats.org/presentationml/2006/main">
+  <p:cSld>
+    <p:bg>
+      <p:bgPr>
+        <a:gradFill flip="none" rotWithShape="1">
+          <a:gsLst>
+            <a:gs pos="0">
+              <a:schemeClr val="accent2">
+                <a:lumMod val="94000"/>
+              </a:schemeClr>
+            </a:gs>
+            <a:gs pos="46000">
+              <a:schemeClr val="accent2">
+                <a:lumMod val="64000"/>
+              </a:schemeClr>
+            </a:gs>
+            <a:gs pos="100000">
+              <a:schemeClr val="accent2">
+                <a:lumMod val="60000"/>
+              </a:schemeClr>
+            </a:gs>
+          </a:gsLst>
+          <a:path path="circle">
+            <a:fillToRect l="50000" t="130000" r="50000" b="-30000"/>
+          </a:path>
+          <a:tileRect/>
+        </a:gradFill>
+        <a:effectLst/>
+      </p:bgPr>
+    </p:bg>
+    <p:spTree>
+      <p:nvGrpSpPr>
+        <p:cNvPr id="1" name=""/>
+        <p:cNvGrpSpPr/>
+        <p:nvPr/>
+      </p:nvGrpSpPr>
+      <p:grpSpPr>
+        <a:xfrm>
+          <a:off x="0" y="0"/>
+          <a:ext cx="0" cy="0"/>
+          <a:chOff x="0" y="0"/>
+          <a:chExt cx="0" cy="0"/>
+        </a:xfrm>
+      </p:grpSpPr>
+      <p:sp>
+        <p:nvSpPr>
+          <p:cNvPr id="2" name="Titre 1">
+            <a:extLst>
+              <a:ext uri="{FF2B5EF4-FFF2-40B4-BE49-F238E27FC236}">
+                <a16:creationId xmlns:a16="http://schemas.microsoft.com/office/drawing/2014/main" id="{04B8AE57-027B-D80E-35E3-A20E9A18B0C9}"/>
+              </a:ext>
+            </a:extLst>
+          </p:cNvPr>
+          <p:cNvSpPr>
+            <a:spLocks noGrp="1"/>
+          </p:cNvSpPr>
+          <p:nvPr>
+            <p:ph type="title"/>
+          </p:nvPr>
+        </p:nvSpPr>
+        <p:spPr/>
+        <p:txBody>
+          <a:bodyPr>
+            <a:normAutofit fontScale="90000"/>
+          </a:bodyPr>
+          <a:lstStyle/>
+          <a:p>
+            <a:r>
+              <a:rPr lang="fr-FR" dirty="0" err="1"/>
+              <a:t>Demonstration</a:t>
+            </a:r>
+            <a:r>
+              <a:rPr lang="fr-FR" dirty="0"/>
+              <a:t> of the solution</a:t>
+            </a:r>
+            <a:br>
+              <a:rPr lang="fr-FR" dirty="0"/>
+            </a:br>
+            <a:endParaRPr lang="fr-FR" dirty="0"/>
           </a:p>
         </p:txBody>
       </p:sp>
@@ -9407,7 +13881,7 @@
           <a:p>
             <a:fld id="{DBA1B0FB-D917-4C8C-928F-313BD683BF39}" type="slidenum">
               <a:rPr lang="en-US" smtClean="0"/>
-              <a:t>5</a:t>
+              <a:t>9</a:t>
             </a:fld>
             <a:endParaRPr lang="en-US"/>
           </a:p>
@@ -9416,7 +13890,7 @@
     </p:spTree>
     <p:extLst>
       <p:ext uri="{BB962C8B-B14F-4D97-AF65-F5344CB8AC3E}">
-        <p14:creationId xmlns:p14="http://schemas.microsoft.com/office/powerpoint/2010/main" val="2674168687"/>
+        <p14:creationId xmlns:p14="http://schemas.microsoft.com/office/powerpoint/2010/main" val="4041871899"/>
       </p:ext>
     </p:extLst>
   </p:cSld>

</xml_diff>

<commit_message>
Edit presentation of LAPR5
</commit_message>
<xml_diff>
--- a/Documentation/presentation_lapr5_11_01_2023.pptx
+++ b/Documentation/presentation_lapr5_11_01_2023.pptx
@@ -5,7 +5,7 @@
     <p:sldMasterId id="2147483901" r:id="rId1"/>
   </p:sldMasterIdLst>
   <p:notesMasterIdLst>
-    <p:notesMasterId r:id="rId13"/>
+    <p:notesMasterId r:id="rId14"/>
   </p:notesMasterIdLst>
   <p:sldIdLst>
     <p:sldId id="256" r:id="rId2"/>
@@ -19,6 +19,7 @@
     <p:sldId id="264" r:id="rId10"/>
     <p:sldId id="265" r:id="rId11"/>
     <p:sldId id="266" r:id="rId12"/>
+    <p:sldId id="268" r:id="rId13"/>
   </p:sldIdLst>
   <p:sldSz cx="12192000" cy="6858000"/>
   <p:notesSz cx="6858000" cy="9144000"/>
@@ -12480,8 +12481,8 @@
           <a:lstStyle/>
           <a:p>
             <a:r>
-              <a:rPr lang="fr-FR" dirty="0" err="1"/>
-              <a:t>Title</a:t>
+              <a:rPr lang="fr-FR" dirty="0"/>
+              <a:t>Conclusion</a:t>
             </a:r>
             <a:br>
               <a:rPr lang="fr-FR" dirty="0"/>
@@ -12548,6 +12549,152 @@
     <p:extLst>
       <p:ext uri="{BB962C8B-B14F-4D97-AF65-F5344CB8AC3E}">
         <p14:creationId xmlns:p14="http://schemas.microsoft.com/office/powerpoint/2010/main" val="2376072543"/>
+      </p:ext>
+    </p:extLst>
+  </p:cSld>
+  <p:clrMapOvr>
+    <a:masterClrMapping/>
+  </p:clrMapOvr>
+</p:sld>
+</file>
+
+<file path=ppt/slides/slide12.xml><?xml version="1.0" encoding="utf-8"?>
+<p:sld xmlns:a="http://schemas.openxmlformats.org/drawingml/2006/main" xmlns:r="http://schemas.openxmlformats.org/officeDocument/2006/relationships" xmlns:p="http://schemas.openxmlformats.org/presentationml/2006/main">
+  <p:cSld>
+    <p:bg>
+      <p:bgPr>
+        <a:gradFill flip="none" rotWithShape="1">
+          <a:gsLst>
+            <a:gs pos="0">
+              <a:schemeClr val="accent2">
+                <a:lumMod val="94000"/>
+              </a:schemeClr>
+            </a:gs>
+            <a:gs pos="46000">
+              <a:schemeClr val="accent2">
+                <a:lumMod val="64000"/>
+              </a:schemeClr>
+            </a:gs>
+            <a:gs pos="100000">
+              <a:schemeClr val="accent2">
+                <a:lumMod val="60000"/>
+              </a:schemeClr>
+            </a:gs>
+          </a:gsLst>
+          <a:path path="circle">
+            <a:fillToRect l="50000" t="130000" r="50000" b="-30000"/>
+          </a:path>
+          <a:tileRect/>
+        </a:gradFill>
+        <a:effectLst/>
+      </p:bgPr>
+    </p:bg>
+    <p:spTree>
+      <p:nvGrpSpPr>
+        <p:cNvPr id="1" name=""/>
+        <p:cNvGrpSpPr/>
+        <p:nvPr/>
+      </p:nvGrpSpPr>
+      <p:grpSpPr>
+        <a:xfrm>
+          <a:off x="0" y="0"/>
+          <a:ext cx="0" cy="0"/>
+          <a:chOff x="0" y="0"/>
+          <a:chExt cx="0" cy="0"/>
+        </a:xfrm>
+      </p:grpSpPr>
+      <p:sp>
+        <p:nvSpPr>
+          <p:cNvPr id="2" name="Titre 1">
+            <a:extLst>
+              <a:ext uri="{FF2B5EF4-FFF2-40B4-BE49-F238E27FC236}">
+                <a16:creationId xmlns:a16="http://schemas.microsoft.com/office/drawing/2014/main" id="{04B8AE57-027B-D80E-35E3-A20E9A18B0C9}"/>
+              </a:ext>
+            </a:extLst>
+          </p:cNvPr>
+          <p:cNvSpPr>
+            <a:spLocks noGrp="1"/>
+          </p:cNvSpPr>
+          <p:nvPr>
+            <p:ph type="title"/>
+          </p:nvPr>
+        </p:nvSpPr>
+        <p:spPr/>
+        <p:txBody>
+          <a:bodyPr>
+            <a:normAutofit fontScale="90000"/>
+          </a:bodyPr>
+          <a:lstStyle/>
+          <a:p>
+            <a:r>
+              <a:rPr lang="fr-FR" dirty="0" err="1"/>
+              <a:t>Title</a:t>
+            </a:r>
+            <a:br>
+              <a:rPr lang="fr-FR" dirty="0"/>
+            </a:br>
+            <a:endParaRPr lang="fr-FR" dirty="0"/>
+          </a:p>
+        </p:txBody>
+      </p:sp>
+      <p:sp>
+        <p:nvSpPr>
+          <p:cNvPr id="3" name="Espace réservé du contenu 2">
+            <a:extLst>
+              <a:ext uri="{FF2B5EF4-FFF2-40B4-BE49-F238E27FC236}">
+                <a16:creationId xmlns:a16="http://schemas.microsoft.com/office/drawing/2014/main" id="{18625F91-2B4A-33FA-10FE-C75D20C74CEF}"/>
+              </a:ext>
+            </a:extLst>
+          </p:cNvPr>
+          <p:cNvSpPr>
+            <a:spLocks noGrp="1"/>
+          </p:cNvSpPr>
+          <p:nvPr>
+            <p:ph idx="1"/>
+          </p:nvPr>
+        </p:nvSpPr>
+        <p:spPr/>
+        <p:txBody>
+          <a:bodyPr/>
+          <a:lstStyle/>
+          <a:p>
+            <a:endParaRPr lang="fr-FR" dirty="0"/>
+          </a:p>
+        </p:txBody>
+      </p:sp>
+      <p:sp>
+        <p:nvSpPr>
+          <p:cNvPr id="4" name="Espace réservé du numéro de diapositive 3">
+            <a:extLst>
+              <a:ext uri="{FF2B5EF4-FFF2-40B4-BE49-F238E27FC236}">
+                <a16:creationId xmlns:a16="http://schemas.microsoft.com/office/drawing/2014/main" id="{F24BEE6C-26EC-EBA8-1F53-8B9C9B19143F}"/>
+              </a:ext>
+            </a:extLst>
+          </p:cNvPr>
+          <p:cNvSpPr>
+            <a:spLocks noGrp="1"/>
+          </p:cNvSpPr>
+          <p:nvPr>
+            <p:ph type="sldNum" sz="quarter" idx="12"/>
+          </p:nvPr>
+        </p:nvSpPr>
+        <p:spPr/>
+        <p:txBody>
+          <a:bodyPr/>
+          <a:lstStyle/>
+          <a:p>
+            <a:fld id="{DBA1B0FB-D917-4C8C-928F-313BD683BF39}" type="slidenum">
+              <a:rPr lang="en-US" smtClean="0"/>
+              <a:t>12</a:t>
+            </a:fld>
+            <a:endParaRPr lang="en-US"/>
+          </a:p>
+        </p:txBody>
+      </p:sp>
+    </p:spTree>
+    <p:extLst>
+      <p:ext uri="{BB962C8B-B14F-4D97-AF65-F5344CB8AC3E}">
+        <p14:creationId xmlns:p14="http://schemas.microsoft.com/office/powerpoint/2010/main" val="487791044"/>
       </p:ext>
     </p:extLst>
   </p:cSld>

</xml_diff>